<commit_message>
added: core members page
</commit_message>
<xml_diff>
--- a/docs/find_me.pptx
+++ b/docs/find_me.pptx
@@ -5,27 +5,29 @@
     <p:sldMasterId id="2147483672" r:id="rId4"/>
   </p:sldMasterIdLst>
   <p:notesMasterIdLst>
-    <p:notesMasterId r:id="rId20"/>
+    <p:notesMasterId r:id="rId22"/>
   </p:notesMasterIdLst>
   <p:handoutMasterIdLst>
-    <p:handoutMasterId r:id="rId21"/>
+    <p:handoutMasterId r:id="rId23"/>
   </p:handoutMasterIdLst>
   <p:sldIdLst>
     <p:sldId id="256" r:id="rId5"/>
-    <p:sldId id="262" r:id="rId6"/>
-    <p:sldId id="263" r:id="rId7"/>
-    <p:sldId id="273" r:id="rId8"/>
-    <p:sldId id="264" r:id="rId9"/>
-    <p:sldId id="265" r:id="rId10"/>
-    <p:sldId id="266" r:id="rId11"/>
-    <p:sldId id="268" r:id="rId12"/>
-    <p:sldId id="269" r:id="rId13"/>
-    <p:sldId id="270" r:id="rId14"/>
-    <p:sldId id="267" r:id="rId15"/>
-    <p:sldId id="260" r:id="rId16"/>
-    <p:sldId id="271" r:id="rId17"/>
-    <p:sldId id="272" r:id="rId18"/>
-    <p:sldId id="259" r:id="rId19"/>
+    <p:sldId id="274" r:id="rId6"/>
+    <p:sldId id="275" r:id="rId7"/>
+    <p:sldId id="262" r:id="rId8"/>
+    <p:sldId id="263" r:id="rId9"/>
+    <p:sldId id="273" r:id="rId10"/>
+    <p:sldId id="264" r:id="rId11"/>
+    <p:sldId id="265" r:id="rId12"/>
+    <p:sldId id="266" r:id="rId13"/>
+    <p:sldId id="268" r:id="rId14"/>
+    <p:sldId id="269" r:id="rId15"/>
+    <p:sldId id="270" r:id="rId16"/>
+    <p:sldId id="267" r:id="rId17"/>
+    <p:sldId id="260" r:id="rId18"/>
+    <p:sldId id="271" r:id="rId19"/>
+    <p:sldId id="272" r:id="rId20"/>
+    <p:sldId id="259" r:id="rId21"/>
   </p:sldIdLst>
   <p:sldSz cx="12192000" cy="6858000"/>
   <p:notesSz cx="6858000" cy="9144000"/>
@@ -885,7 +887,7 @@
 </file>
 
 <file path=ppt/diagrams/colors2.xml><?xml version="1.0" encoding="utf-8"?>
-<dgm:colorsDef xmlns:dgm="http://schemas.openxmlformats.org/drawingml/2006/diagram" xmlns:a="http://schemas.openxmlformats.org/drawingml/2006/main" uniqueId="urn:microsoft.com/office/officeart/2005/8/colors/accent2_2">
+<dgm:colorsDef xmlns:dgm="http://schemas.openxmlformats.org/drawingml/2006/diagram" xmlns:a="http://schemas.openxmlformats.org/drawingml/2006/main" uniqueId="urn:microsoft.com/office/officeart/2018/5/colors/Iconchunking_neutralbg_accent2_2">
   <dgm:title val=""/>
   <dgm:desc val=""/>
   <dgm:catLst>
@@ -908,7 +910,9 @@
       <a:schemeClr val="accent2"/>
     </dgm:fillClrLst>
     <dgm:linClrLst meth="repeat">
-      <a:schemeClr val="lt1"/>
+      <a:schemeClr val="lt1">
+        <a:alpha val="0"/>
+      </a:schemeClr>
     </dgm:linClrLst>
     <dgm:effectClrLst/>
     <dgm:txLinClrLst/>
@@ -1547,8 +1551,8 @@
   </dgm:styleLbl>
   <dgm:styleLbl name="bgShp">
     <dgm:fillClrLst meth="repeat">
-      <a:schemeClr val="accent2">
-        <a:tint val="40000"/>
+      <a:schemeClr val="bg1">
+        <a:lumMod val="95000"/>
       </a:schemeClr>
     </dgm:fillClrLst>
     <dgm:linClrLst meth="repeat">
@@ -1631,7 +1635,1096 @@
 </dgm:colorsDef>
 </file>
 
+<file path=ppt/diagrams/colors3.xml><?xml version="1.0" encoding="utf-8"?>
+<dgm:colorsDef xmlns:dgm="http://schemas.openxmlformats.org/drawingml/2006/diagram" xmlns:a="http://schemas.openxmlformats.org/drawingml/2006/main" uniqueId="urn:microsoft.com/office/officeart/2005/8/colors/accent2_2">
+  <dgm:title val=""/>
+  <dgm:desc val=""/>
+  <dgm:catLst>
+    <dgm:cat type="accent2" pri="11200"/>
+  </dgm:catLst>
+  <dgm:styleLbl name="node0">
+    <dgm:fillClrLst meth="repeat">
+      <a:schemeClr val="accent2"/>
+    </dgm:fillClrLst>
+    <dgm:linClrLst meth="repeat">
+      <a:schemeClr val="lt1"/>
+    </dgm:linClrLst>
+    <dgm:effectClrLst/>
+    <dgm:txLinClrLst/>
+    <dgm:txFillClrLst/>
+    <dgm:txEffectClrLst/>
+  </dgm:styleLbl>
+  <dgm:styleLbl name="node1">
+    <dgm:fillClrLst meth="repeat">
+      <a:schemeClr val="accent2"/>
+    </dgm:fillClrLst>
+    <dgm:linClrLst meth="repeat">
+      <a:schemeClr val="lt1"/>
+    </dgm:linClrLst>
+    <dgm:effectClrLst/>
+    <dgm:txLinClrLst/>
+    <dgm:txFillClrLst/>
+    <dgm:txEffectClrLst/>
+  </dgm:styleLbl>
+  <dgm:styleLbl name="alignNode1">
+    <dgm:fillClrLst meth="repeat">
+      <a:schemeClr val="accent2"/>
+    </dgm:fillClrLst>
+    <dgm:linClrLst meth="repeat">
+      <a:schemeClr val="accent2"/>
+    </dgm:linClrLst>
+    <dgm:effectClrLst/>
+    <dgm:txLinClrLst/>
+    <dgm:txFillClrLst/>
+    <dgm:txEffectClrLst/>
+  </dgm:styleLbl>
+  <dgm:styleLbl name="lnNode1">
+    <dgm:fillClrLst meth="repeat">
+      <a:schemeClr val="accent2"/>
+    </dgm:fillClrLst>
+    <dgm:linClrLst meth="repeat">
+      <a:schemeClr val="lt1"/>
+    </dgm:linClrLst>
+    <dgm:effectClrLst/>
+    <dgm:txLinClrLst/>
+    <dgm:txFillClrLst/>
+    <dgm:txEffectClrLst/>
+  </dgm:styleLbl>
+  <dgm:styleLbl name="vennNode1">
+    <dgm:fillClrLst meth="repeat">
+      <a:schemeClr val="accent2">
+        <a:alpha val="50000"/>
+      </a:schemeClr>
+    </dgm:fillClrLst>
+    <dgm:linClrLst meth="repeat">
+      <a:schemeClr val="lt1"/>
+    </dgm:linClrLst>
+    <dgm:effectClrLst/>
+    <dgm:txLinClrLst/>
+    <dgm:txFillClrLst/>
+    <dgm:txEffectClrLst/>
+  </dgm:styleLbl>
+  <dgm:styleLbl name="node2">
+    <dgm:fillClrLst meth="repeat">
+      <a:schemeClr val="accent2"/>
+    </dgm:fillClrLst>
+    <dgm:linClrLst meth="repeat">
+      <a:schemeClr val="lt1"/>
+    </dgm:linClrLst>
+    <dgm:effectClrLst/>
+    <dgm:txLinClrLst/>
+    <dgm:txFillClrLst/>
+    <dgm:txEffectClrLst/>
+  </dgm:styleLbl>
+  <dgm:styleLbl name="node3">
+    <dgm:fillClrLst meth="repeat">
+      <a:schemeClr val="accent2"/>
+    </dgm:fillClrLst>
+    <dgm:linClrLst meth="repeat">
+      <a:schemeClr val="lt1"/>
+    </dgm:linClrLst>
+    <dgm:effectClrLst/>
+    <dgm:txLinClrLst/>
+    <dgm:txFillClrLst/>
+    <dgm:txEffectClrLst/>
+  </dgm:styleLbl>
+  <dgm:styleLbl name="node4">
+    <dgm:fillClrLst meth="repeat">
+      <a:schemeClr val="accent2"/>
+    </dgm:fillClrLst>
+    <dgm:linClrLst meth="repeat">
+      <a:schemeClr val="lt1"/>
+    </dgm:linClrLst>
+    <dgm:effectClrLst/>
+    <dgm:txLinClrLst/>
+    <dgm:txFillClrLst/>
+    <dgm:txEffectClrLst/>
+  </dgm:styleLbl>
+  <dgm:styleLbl name="fgImgPlace1">
+    <dgm:fillClrLst meth="repeat">
+      <a:schemeClr val="accent2">
+        <a:tint val="50000"/>
+      </a:schemeClr>
+    </dgm:fillClrLst>
+    <dgm:linClrLst meth="repeat">
+      <a:schemeClr val="lt1"/>
+    </dgm:linClrLst>
+    <dgm:effectClrLst/>
+    <dgm:txLinClrLst/>
+    <dgm:txFillClrLst meth="repeat">
+      <a:schemeClr val="lt1"/>
+    </dgm:txFillClrLst>
+    <dgm:txEffectClrLst/>
+  </dgm:styleLbl>
+  <dgm:styleLbl name="alignImgPlace1">
+    <dgm:fillClrLst meth="repeat">
+      <a:schemeClr val="accent2">
+        <a:tint val="50000"/>
+      </a:schemeClr>
+    </dgm:fillClrLst>
+    <dgm:linClrLst meth="repeat">
+      <a:schemeClr val="lt1"/>
+    </dgm:linClrLst>
+    <dgm:effectClrLst/>
+    <dgm:txLinClrLst/>
+    <dgm:txFillClrLst meth="repeat">
+      <a:schemeClr val="lt1"/>
+    </dgm:txFillClrLst>
+    <dgm:txEffectClrLst/>
+  </dgm:styleLbl>
+  <dgm:styleLbl name="bgImgPlace1">
+    <dgm:fillClrLst meth="repeat">
+      <a:schemeClr val="accent2">
+        <a:tint val="50000"/>
+      </a:schemeClr>
+    </dgm:fillClrLst>
+    <dgm:linClrLst meth="repeat">
+      <a:schemeClr val="lt1"/>
+    </dgm:linClrLst>
+    <dgm:effectClrLst/>
+    <dgm:txLinClrLst/>
+    <dgm:txFillClrLst meth="repeat">
+      <a:schemeClr val="lt1"/>
+    </dgm:txFillClrLst>
+    <dgm:txEffectClrLst/>
+  </dgm:styleLbl>
+  <dgm:styleLbl name="sibTrans2D1">
+    <dgm:fillClrLst meth="repeat">
+      <a:schemeClr val="accent2">
+        <a:tint val="60000"/>
+      </a:schemeClr>
+    </dgm:fillClrLst>
+    <dgm:linClrLst meth="repeat">
+      <a:schemeClr val="accent2">
+        <a:tint val="60000"/>
+      </a:schemeClr>
+    </dgm:linClrLst>
+    <dgm:effectClrLst/>
+    <dgm:txLinClrLst/>
+    <dgm:txFillClrLst/>
+    <dgm:txEffectClrLst/>
+  </dgm:styleLbl>
+  <dgm:styleLbl name="fgSibTrans2D1">
+    <dgm:fillClrLst meth="repeat">
+      <a:schemeClr val="accent2">
+        <a:tint val="60000"/>
+      </a:schemeClr>
+    </dgm:fillClrLst>
+    <dgm:linClrLst meth="repeat">
+      <a:schemeClr val="accent2">
+        <a:tint val="60000"/>
+      </a:schemeClr>
+    </dgm:linClrLst>
+    <dgm:effectClrLst/>
+    <dgm:txLinClrLst/>
+    <dgm:txFillClrLst/>
+    <dgm:txEffectClrLst/>
+  </dgm:styleLbl>
+  <dgm:styleLbl name="bgSibTrans2D1">
+    <dgm:fillClrLst meth="repeat">
+      <a:schemeClr val="accent2">
+        <a:tint val="60000"/>
+      </a:schemeClr>
+    </dgm:fillClrLst>
+    <dgm:linClrLst meth="repeat">
+      <a:schemeClr val="accent2">
+        <a:tint val="60000"/>
+      </a:schemeClr>
+    </dgm:linClrLst>
+    <dgm:effectClrLst/>
+    <dgm:txLinClrLst/>
+    <dgm:txFillClrLst/>
+    <dgm:txEffectClrLst/>
+  </dgm:styleLbl>
+  <dgm:styleLbl name="sibTrans1D1">
+    <dgm:fillClrLst meth="repeat">
+      <a:schemeClr val="accent2"/>
+    </dgm:fillClrLst>
+    <dgm:linClrLst meth="repeat">
+      <a:schemeClr val="accent2"/>
+    </dgm:linClrLst>
+    <dgm:effectClrLst/>
+    <dgm:txLinClrLst/>
+    <dgm:txFillClrLst meth="repeat">
+      <a:schemeClr val="tx1"/>
+    </dgm:txFillClrLst>
+    <dgm:txEffectClrLst/>
+  </dgm:styleLbl>
+  <dgm:styleLbl name="callout">
+    <dgm:fillClrLst meth="repeat">
+      <a:schemeClr val="accent2"/>
+    </dgm:fillClrLst>
+    <dgm:linClrLst meth="repeat">
+      <a:schemeClr val="accent2">
+        <a:tint val="50000"/>
+      </a:schemeClr>
+    </dgm:linClrLst>
+    <dgm:effectClrLst/>
+    <dgm:txLinClrLst/>
+    <dgm:txFillClrLst meth="repeat">
+      <a:schemeClr val="tx1"/>
+    </dgm:txFillClrLst>
+    <dgm:txEffectClrLst/>
+  </dgm:styleLbl>
+  <dgm:styleLbl name="asst0">
+    <dgm:fillClrLst meth="repeat">
+      <a:schemeClr val="accent2"/>
+    </dgm:fillClrLst>
+    <dgm:linClrLst meth="repeat">
+      <a:schemeClr val="lt1"/>
+    </dgm:linClrLst>
+    <dgm:effectClrLst/>
+    <dgm:txLinClrLst/>
+    <dgm:txFillClrLst/>
+    <dgm:txEffectClrLst/>
+  </dgm:styleLbl>
+  <dgm:styleLbl name="asst1">
+    <dgm:fillClrLst meth="repeat">
+      <a:schemeClr val="accent2"/>
+    </dgm:fillClrLst>
+    <dgm:linClrLst meth="repeat">
+      <a:schemeClr val="lt1"/>
+    </dgm:linClrLst>
+    <dgm:effectClrLst/>
+    <dgm:txLinClrLst/>
+    <dgm:txFillClrLst/>
+    <dgm:txEffectClrLst/>
+  </dgm:styleLbl>
+  <dgm:styleLbl name="asst2">
+    <dgm:fillClrLst meth="repeat">
+      <a:schemeClr val="accent2"/>
+    </dgm:fillClrLst>
+    <dgm:linClrLst meth="repeat">
+      <a:schemeClr val="lt1"/>
+    </dgm:linClrLst>
+    <dgm:effectClrLst/>
+    <dgm:txLinClrLst/>
+    <dgm:txFillClrLst/>
+    <dgm:txEffectClrLst/>
+  </dgm:styleLbl>
+  <dgm:styleLbl name="asst3">
+    <dgm:fillClrLst meth="repeat">
+      <a:schemeClr val="accent2"/>
+    </dgm:fillClrLst>
+    <dgm:linClrLst meth="repeat">
+      <a:schemeClr val="lt1"/>
+    </dgm:linClrLst>
+    <dgm:effectClrLst/>
+    <dgm:txLinClrLst/>
+    <dgm:txFillClrLst/>
+    <dgm:txEffectClrLst/>
+  </dgm:styleLbl>
+  <dgm:styleLbl name="asst4">
+    <dgm:fillClrLst meth="repeat">
+      <a:schemeClr val="accent2"/>
+    </dgm:fillClrLst>
+    <dgm:linClrLst meth="repeat">
+      <a:schemeClr val="lt1"/>
+    </dgm:linClrLst>
+    <dgm:effectClrLst/>
+    <dgm:txLinClrLst/>
+    <dgm:txFillClrLst/>
+    <dgm:txEffectClrLst/>
+  </dgm:styleLbl>
+  <dgm:styleLbl name="parChTrans2D1">
+    <dgm:fillClrLst meth="repeat">
+      <a:schemeClr val="accent2">
+        <a:tint val="60000"/>
+      </a:schemeClr>
+    </dgm:fillClrLst>
+    <dgm:linClrLst meth="repeat">
+      <a:schemeClr val="accent2">
+        <a:tint val="60000"/>
+      </a:schemeClr>
+    </dgm:linClrLst>
+    <dgm:effectClrLst/>
+    <dgm:txLinClrLst/>
+    <dgm:txFillClrLst meth="repeat">
+      <a:schemeClr val="lt1"/>
+    </dgm:txFillClrLst>
+    <dgm:txEffectClrLst/>
+  </dgm:styleLbl>
+  <dgm:styleLbl name="parChTrans2D2">
+    <dgm:fillClrLst meth="repeat">
+      <a:schemeClr val="accent2"/>
+    </dgm:fillClrLst>
+    <dgm:linClrLst meth="repeat">
+      <a:schemeClr val="accent2"/>
+    </dgm:linClrLst>
+    <dgm:effectClrLst/>
+    <dgm:txLinClrLst/>
+    <dgm:txFillClrLst meth="repeat">
+      <a:schemeClr val="lt1"/>
+    </dgm:txFillClrLst>
+    <dgm:txEffectClrLst/>
+  </dgm:styleLbl>
+  <dgm:styleLbl name="parChTrans2D3">
+    <dgm:fillClrLst meth="repeat">
+      <a:schemeClr val="accent2"/>
+    </dgm:fillClrLst>
+    <dgm:linClrLst meth="repeat">
+      <a:schemeClr val="accent2"/>
+    </dgm:linClrLst>
+    <dgm:effectClrLst/>
+    <dgm:txLinClrLst/>
+    <dgm:txFillClrLst meth="repeat">
+      <a:schemeClr val="lt1"/>
+    </dgm:txFillClrLst>
+    <dgm:txEffectClrLst/>
+  </dgm:styleLbl>
+  <dgm:styleLbl name="parChTrans2D4">
+    <dgm:fillClrLst meth="repeat">
+      <a:schemeClr val="accent2"/>
+    </dgm:fillClrLst>
+    <dgm:linClrLst meth="repeat">
+      <a:schemeClr val="accent2"/>
+    </dgm:linClrLst>
+    <dgm:effectClrLst/>
+    <dgm:txLinClrLst/>
+    <dgm:txFillClrLst meth="repeat">
+      <a:schemeClr val="lt1"/>
+    </dgm:txFillClrLst>
+    <dgm:txEffectClrLst/>
+  </dgm:styleLbl>
+  <dgm:styleLbl name="parChTrans1D1">
+    <dgm:fillClrLst meth="repeat">
+      <a:schemeClr val="accent2"/>
+    </dgm:fillClrLst>
+    <dgm:linClrLst meth="repeat">
+      <a:schemeClr val="accent2">
+        <a:shade val="60000"/>
+      </a:schemeClr>
+    </dgm:linClrLst>
+    <dgm:effectClrLst/>
+    <dgm:txLinClrLst/>
+    <dgm:txFillClrLst meth="repeat">
+      <a:schemeClr val="tx1"/>
+    </dgm:txFillClrLst>
+    <dgm:txEffectClrLst/>
+  </dgm:styleLbl>
+  <dgm:styleLbl name="parChTrans1D2">
+    <dgm:fillClrLst meth="repeat">
+      <a:schemeClr val="accent2"/>
+    </dgm:fillClrLst>
+    <dgm:linClrLst meth="repeat">
+      <a:schemeClr val="accent2">
+        <a:shade val="60000"/>
+      </a:schemeClr>
+    </dgm:linClrLst>
+    <dgm:effectClrLst/>
+    <dgm:txLinClrLst/>
+    <dgm:txFillClrLst meth="repeat">
+      <a:schemeClr val="tx1"/>
+    </dgm:txFillClrLst>
+    <dgm:txEffectClrLst/>
+  </dgm:styleLbl>
+  <dgm:styleLbl name="parChTrans1D3">
+    <dgm:fillClrLst meth="repeat">
+      <a:schemeClr val="accent2"/>
+    </dgm:fillClrLst>
+    <dgm:linClrLst meth="repeat">
+      <a:schemeClr val="accent2">
+        <a:shade val="80000"/>
+      </a:schemeClr>
+    </dgm:linClrLst>
+    <dgm:effectClrLst/>
+    <dgm:txLinClrLst/>
+    <dgm:txFillClrLst meth="repeat">
+      <a:schemeClr val="tx1"/>
+    </dgm:txFillClrLst>
+    <dgm:txEffectClrLst/>
+  </dgm:styleLbl>
+  <dgm:styleLbl name="parChTrans1D4">
+    <dgm:fillClrLst meth="repeat">
+      <a:schemeClr val="accent2"/>
+    </dgm:fillClrLst>
+    <dgm:linClrLst meth="repeat">
+      <a:schemeClr val="accent2">
+        <a:shade val="80000"/>
+      </a:schemeClr>
+    </dgm:linClrLst>
+    <dgm:effectClrLst/>
+    <dgm:txLinClrLst/>
+    <dgm:txFillClrLst meth="repeat">
+      <a:schemeClr val="tx1"/>
+    </dgm:txFillClrLst>
+    <dgm:txEffectClrLst/>
+  </dgm:styleLbl>
+  <dgm:styleLbl name="fgAcc1">
+    <dgm:fillClrLst meth="repeat">
+      <a:schemeClr val="lt1">
+        <a:alpha val="90000"/>
+      </a:schemeClr>
+    </dgm:fillClrLst>
+    <dgm:linClrLst meth="repeat">
+      <a:schemeClr val="accent2"/>
+    </dgm:linClrLst>
+    <dgm:effectClrLst/>
+    <dgm:txLinClrLst/>
+    <dgm:txFillClrLst meth="repeat">
+      <a:schemeClr val="dk1"/>
+    </dgm:txFillClrLst>
+    <dgm:txEffectClrLst/>
+  </dgm:styleLbl>
+  <dgm:styleLbl name="conFgAcc1">
+    <dgm:fillClrLst meth="repeat">
+      <a:schemeClr val="lt1">
+        <a:alpha val="90000"/>
+      </a:schemeClr>
+    </dgm:fillClrLst>
+    <dgm:linClrLst meth="repeat">
+      <a:schemeClr val="accent2"/>
+    </dgm:linClrLst>
+    <dgm:effectClrLst/>
+    <dgm:txLinClrLst/>
+    <dgm:txFillClrLst meth="repeat">
+      <a:schemeClr val="dk1"/>
+    </dgm:txFillClrLst>
+    <dgm:txEffectClrLst/>
+  </dgm:styleLbl>
+  <dgm:styleLbl name="alignAcc1">
+    <dgm:fillClrLst meth="repeat">
+      <a:schemeClr val="lt1">
+        <a:alpha val="90000"/>
+      </a:schemeClr>
+    </dgm:fillClrLst>
+    <dgm:linClrLst meth="repeat">
+      <a:schemeClr val="accent2"/>
+    </dgm:linClrLst>
+    <dgm:effectClrLst/>
+    <dgm:txLinClrLst/>
+    <dgm:txFillClrLst meth="repeat">
+      <a:schemeClr val="dk1"/>
+    </dgm:txFillClrLst>
+    <dgm:txEffectClrLst/>
+  </dgm:styleLbl>
+  <dgm:styleLbl name="trAlignAcc1">
+    <dgm:fillClrLst meth="repeat">
+      <a:schemeClr val="lt1">
+        <a:alpha val="40000"/>
+      </a:schemeClr>
+    </dgm:fillClrLst>
+    <dgm:linClrLst meth="repeat">
+      <a:schemeClr val="accent2"/>
+    </dgm:linClrLst>
+    <dgm:effectClrLst/>
+    <dgm:txLinClrLst/>
+    <dgm:txFillClrLst meth="repeat">
+      <a:schemeClr val="dk1"/>
+    </dgm:txFillClrLst>
+    <dgm:txEffectClrLst/>
+  </dgm:styleLbl>
+  <dgm:styleLbl name="bgAcc1">
+    <dgm:fillClrLst meth="repeat">
+      <a:schemeClr val="lt1">
+        <a:alpha val="90000"/>
+      </a:schemeClr>
+    </dgm:fillClrLst>
+    <dgm:linClrLst meth="repeat">
+      <a:schemeClr val="accent2"/>
+    </dgm:linClrLst>
+    <dgm:effectClrLst/>
+    <dgm:txLinClrLst/>
+    <dgm:txFillClrLst meth="repeat">
+      <a:schemeClr val="dk1"/>
+    </dgm:txFillClrLst>
+    <dgm:txEffectClrLst/>
+  </dgm:styleLbl>
+  <dgm:styleLbl name="solidFgAcc1">
+    <dgm:fillClrLst meth="repeat">
+      <a:schemeClr val="lt1"/>
+    </dgm:fillClrLst>
+    <dgm:linClrLst meth="repeat">
+      <a:schemeClr val="accent2"/>
+    </dgm:linClrLst>
+    <dgm:effectClrLst/>
+    <dgm:txLinClrLst/>
+    <dgm:txFillClrLst meth="repeat">
+      <a:schemeClr val="dk1"/>
+    </dgm:txFillClrLst>
+    <dgm:txEffectClrLst/>
+  </dgm:styleLbl>
+  <dgm:styleLbl name="solidAlignAcc1">
+    <dgm:fillClrLst meth="repeat">
+      <a:schemeClr val="lt1"/>
+    </dgm:fillClrLst>
+    <dgm:linClrLst meth="repeat">
+      <a:schemeClr val="accent2"/>
+    </dgm:linClrLst>
+    <dgm:effectClrLst/>
+    <dgm:txLinClrLst/>
+    <dgm:txFillClrLst meth="repeat">
+      <a:schemeClr val="dk1"/>
+    </dgm:txFillClrLst>
+    <dgm:txEffectClrLst/>
+  </dgm:styleLbl>
+  <dgm:styleLbl name="solidBgAcc1">
+    <dgm:fillClrLst meth="repeat">
+      <a:schemeClr val="lt1"/>
+    </dgm:fillClrLst>
+    <dgm:linClrLst meth="repeat">
+      <a:schemeClr val="accent2"/>
+    </dgm:linClrLst>
+    <dgm:effectClrLst/>
+    <dgm:txLinClrLst/>
+    <dgm:txFillClrLst meth="repeat">
+      <a:schemeClr val="dk1"/>
+    </dgm:txFillClrLst>
+    <dgm:txEffectClrLst/>
+  </dgm:styleLbl>
+  <dgm:styleLbl name="fgAccFollowNode1">
+    <dgm:fillClrLst meth="repeat">
+      <a:schemeClr val="accent2">
+        <a:alpha val="90000"/>
+        <a:tint val="40000"/>
+      </a:schemeClr>
+    </dgm:fillClrLst>
+    <dgm:linClrLst meth="repeat">
+      <a:schemeClr val="accent2">
+        <a:alpha val="90000"/>
+        <a:tint val="40000"/>
+      </a:schemeClr>
+    </dgm:linClrLst>
+    <dgm:effectClrLst/>
+    <dgm:txLinClrLst/>
+    <dgm:txFillClrLst meth="repeat">
+      <a:schemeClr val="dk1"/>
+    </dgm:txFillClrLst>
+    <dgm:txEffectClrLst/>
+  </dgm:styleLbl>
+  <dgm:styleLbl name="alignAccFollowNode1">
+    <dgm:fillClrLst meth="repeat">
+      <a:schemeClr val="accent2">
+        <a:alpha val="90000"/>
+        <a:tint val="40000"/>
+      </a:schemeClr>
+    </dgm:fillClrLst>
+    <dgm:linClrLst meth="repeat">
+      <a:schemeClr val="accent2">
+        <a:alpha val="90000"/>
+        <a:tint val="40000"/>
+      </a:schemeClr>
+    </dgm:linClrLst>
+    <dgm:effectClrLst/>
+    <dgm:txLinClrLst/>
+    <dgm:txFillClrLst meth="repeat">
+      <a:schemeClr val="dk1"/>
+    </dgm:txFillClrLst>
+    <dgm:txEffectClrLst/>
+  </dgm:styleLbl>
+  <dgm:styleLbl name="bgAccFollowNode1">
+    <dgm:fillClrLst meth="repeat">
+      <a:schemeClr val="accent2">
+        <a:alpha val="90000"/>
+        <a:tint val="40000"/>
+      </a:schemeClr>
+    </dgm:fillClrLst>
+    <dgm:linClrLst meth="repeat">
+      <a:schemeClr val="accent2">
+        <a:alpha val="90000"/>
+        <a:tint val="40000"/>
+      </a:schemeClr>
+    </dgm:linClrLst>
+    <dgm:effectClrLst/>
+    <dgm:txLinClrLst/>
+    <dgm:txFillClrLst meth="repeat">
+      <a:schemeClr val="dk1"/>
+    </dgm:txFillClrLst>
+    <dgm:txEffectClrLst/>
+  </dgm:styleLbl>
+  <dgm:styleLbl name="fgAcc0">
+    <dgm:fillClrLst meth="repeat">
+      <a:schemeClr val="lt1">
+        <a:alpha val="90000"/>
+      </a:schemeClr>
+    </dgm:fillClrLst>
+    <dgm:linClrLst meth="repeat">
+      <a:schemeClr val="accent2"/>
+    </dgm:linClrLst>
+    <dgm:effectClrLst/>
+    <dgm:txLinClrLst/>
+    <dgm:txFillClrLst meth="repeat">
+      <a:schemeClr val="dk1"/>
+    </dgm:txFillClrLst>
+    <dgm:txEffectClrLst/>
+  </dgm:styleLbl>
+  <dgm:styleLbl name="fgAcc2">
+    <dgm:fillClrLst meth="repeat">
+      <a:schemeClr val="lt1">
+        <a:alpha val="90000"/>
+      </a:schemeClr>
+    </dgm:fillClrLst>
+    <dgm:linClrLst meth="repeat">
+      <a:schemeClr val="accent2"/>
+    </dgm:linClrLst>
+    <dgm:effectClrLst/>
+    <dgm:txLinClrLst/>
+    <dgm:txFillClrLst meth="repeat">
+      <a:schemeClr val="dk1"/>
+    </dgm:txFillClrLst>
+    <dgm:txEffectClrLst/>
+  </dgm:styleLbl>
+  <dgm:styleLbl name="fgAcc3">
+    <dgm:fillClrLst meth="repeat">
+      <a:schemeClr val="lt1">
+        <a:alpha val="90000"/>
+      </a:schemeClr>
+    </dgm:fillClrLst>
+    <dgm:linClrLst meth="repeat">
+      <a:schemeClr val="accent2"/>
+    </dgm:linClrLst>
+    <dgm:effectClrLst/>
+    <dgm:txLinClrLst/>
+    <dgm:txFillClrLst meth="repeat">
+      <a:schemeClr val="dk1"/>
+    </dgm:txFillClrLst>
+    <dgm:txEffectClrLst/>
+  </dgm:styleLbl>
+  <dgm:styleLbl name="fgAcc4">
+    <dgm:fillClrLst meth="repeat">
+      <a:schemeClr val="lt1">
+        <a:alpha val="90000"/>
+      </a:schemeClr>
+    </dgm:fillClrLst>
+    <dgm:linClrLst meth="repeat">
+      <a:schemeClr val="accent2"/>
+    </dgm:linClrLst>
+    <dgm:effectClrLst/>
+    <dgm:txLinClrLst/>
+    <dgm:txFillClrLst meth="repeat">
+      <a:schemeClr val="dk1"/>
+    </dgm:txFillClrLst>
+    <dgm:txEffectClrLst/>
+  </dgm:styleLbl>
+  <dgm:styleLbl name="bgShp">
+    <dgm:fillClrLst meth="repeat">
+      <a:schemeClr val="accent2">
+        <a:tint val="40000"/>
+      </a:schemeClr>
+    </dgm:fillClrLst>
+    <dgm:linClrLst meth="repeat">
+      <a:schemeClr val="accent2"/>
+    </dgm:linClrLst>
+    <dgm:effectClrLst/>
+    <dgm:txLinClrLst/>
+    <dgm:txFillClrLst meth="repeat">
+      <a:schemeClr val="dk1"/>
+    </dgm:txFillClrLst>
+    <dgm:txEffectClrLst/>
+  </dgm:styleLbl>
+  <dgm:styleLbl name="dkBgShp">
+    <dgm:fillClrLst meth="repeat">
+      <a:schemeClr val="accent2">
+        <a:shade val="80000"/>
+      </a:schemeClr>
+    </dgm:fillClrLst>
+    <dgm:linClrLst meth="repeat">
+      <a:schemeClr val="accent2"/>
+    </dgm:linClrLst>
+    <dgm:effectClrLst/>
+    <dgm:txLinClrLst/>
+    <dgm:txFillClrLst meth="repeat">
+      <a:schemeClr val="lt1"/>
+    </dgm:txFillClrLst>
+    <dgm:txEffectClrLst/>
+  </dgm:styleLbl>
+  <dgm:styleLbl name="trBgShp">
+    <dgm:fillClrLst meth="repeat">
+      <a:schemeClr val="accent2">
+        <a:tint val="50000"/>
+        <a:alpha val="40000"/>
+      </a:schemeClr>
+    </dgm:fillClrLst>
+    <dgm:linClrLst meth="repeat">
+      <a:schemeClr val="accent2"/>
+    </dgm:linClrLst>
+    <dgm:effectClrLst/>
+    <dgm:txLinClrLst/>
+    <dgm:txFillClrLst meth="repeat">
+      <a:schemeClr val="lt1"/>
+    </dgm:txFillClrLst>
+    <dgm:txEffectClrLst/>
+  </dgm:styleLbl>
+  <dgm:styleLbl name="fgShp">
+    <dgm:fillClrLst meth="repeat">
+      <a:schemeClr val="accent2">
+        <a:tint val="60000"/>
+      </a:schemeClr>
+    </dgm:fillClrLst>
+    <dgm:linClrLst meth="repeat">
+      <a:schemeClr val="lt1"/>
+    </dgm:linClrLst>
+    <dgm:effectClrLst/>
+    <dgm:txLinClrLst/>
+    <dgm:txFillClrLst meth="repeat">
+      <a:schemeClr val="dk1"/>
+    </dgm:txFillClrLst>
+    <dgm:txEffectClrLst/>
+  </dgm:styleLbl>
+  <dgm:styleLbl name="revTx">
+    <dgm:fillClrLst meth="repeat">
+      <a:schemeClr val="lt1">
+        <a:alpha val="0"/>
+      </a:schemeClr>
+    </dgm:fillClrLst>
+    <dgm:linClrLst meth="repeat">
+      <a:schemeClr val="dk1">
+        <a:alpha val="0"/>
+      </a:schemeClr>
+    </dgm:linClrLst>
+    <dgm:effectClrLst/>
+    <dgm:txLinClrLst/>
+    <dgm:txFillClrLst meth="repeat">
+      <a:schemeClr val="tx1"/>
+    </dgm:txFillClrLst>
+    <dgm:txEffectClrLst/>
+  </dgm:styleLbl>
+</dgm:colorsDef>
+</file>
+
 <file path=ppt/diagrams/data1.xml><?xml version="1.0" encoding="utf-8"?>
+<dgm:dataModel xmlns:dgm="http://schemas.openxmlformats.org/drawingml/2006/diagram" xmlns:a="http://schemas.openxmlformats.org/drawingml/2006/main">
+  <dgm:ptLst>
+    <dgm:pt modelId="{7D9C16A6-8C48-4165-8DAF-8C957C12A8FA}" type="doc">
+      <dgm:prSet loTypeId="urn:microsoft.com/office/officeart/2018/2/layout/IconLabelList" loCatId="icon" qsTypeId="urn:microsoft.com/office/officeart/2005/8/quickstyle/simple1" qsCatId="simple" csTypeId="urn:microsoft.com/office/officeart/2018/5/colors/Iconchunking_neutralbg_accent2_2" csCatId="accent2" phldr="1"/>
+      <dgm:spPr/>
+      <dgm:t>
+        <a:bodyPr/>
+        <a:lstStyle/>
+        <a:p>
+          <a:endParaRPr lang="en-US"/>
+        </a:p>
+      </dgm:t>
+    </dgm:pt>
+    <dgm:pt modelId="{701D68F5-42F8-47BC-8FED-84C50F595DF0}">
+      <dgm:prSet phldrT="[Text]"/>
+      <dgm:spPr/>
+      <dgm:t>
+        <a:bodyPr/>
+        <a:lstStyle/>
+        <a:p>
+          <a:r>
+            <a:rPr lang="en-ZA" dirty="0" err="1"/>
+            <a:t>Bunnarith</a:t>
+          </a:r>
+          <a:r>
+            <a:rPr lang="en-ZA" dirty="0"/>
+            <a:t> </a:t>
+          </a:r>
+          <a:r>
+            <a:rPr lang="en-ZA" dirty="0" err="1"/>
+            <a:t>Heang</a:t>
+          </a:r>
+          <a:endParaRPr lang="en-US" dirty="0"/>
+        </a:p>
+      </dgm:t>
+    </dgm:pt>
+    <dgm:pt modelId="{9617668C-C38C-4017-8DDF-37855B15D110}" type="parTrans" cxnId="{C4BA385D-31ED-40EF-A5D6-98DFBA64E71A}">
+      <dgm:prSet/>
+      <dgm:spPr/>
+      <dgm:t>
+        <a:bodyPr/>
+        <a:lstStyle/>
+        <a:p>
+          <a:endParaRPr lang="en-US"/>
+        </a:p>
+      </dgm:t>
+    </dgm:pt>
+    <dgm:pt modelId="{0C95B389-AC0C-4055-9AA3-38815EFC8B0A}" type="sibTrans" cxnId="{C4BA385D-31ED-40EF-A5D6-98DFBA64E71A}">
+      <dgm:prSet/>
+      <dgm:spPr/>
+      <dgm:t>
+        <a:bodyPr/>
+        <a:lstStyle/>
+        <a:p>
+          <a:endParaRPr lang="en-US"/>
+        </a:p>
+      </dgm:t>
+    </dgm:pt>
+    <dgm:pt modelId="{91A66877-AC1C-46D9-BF2C-6024B638DEA9}">
+      <dgm:prSet phldrT="[Text]"/>
+      <dgm:spPr/>
+      <dgm:t>
+        <a:bodyPr/>
+        <a:lstStyle/>
+        <a:p>
+          <a:r>
+            <a:rPr lang="en-US" dirty="0" err="1"/>
+            <a:t>Monespiseth</a:t>
+          </a:r>
+          <a:r>
+            <a:rPr lang="en-US" dirty="0"/>
+            <a:t> Ly</a:t>
+          </a:r>
+        </a:p>
+      </dgm:t>
+    </dgm:pt>
+    <dgm:pt modelId="{913FED05-DF41-48A7-B1F8-81937A468EF9}" type="parTrans" cxnId="{7F0DAB6F-9257-4F2D-B31A-3418F73F6952}">
+      <dgm:prSet/>
+      <dgm:spPr/>
+      <dgm:t>
+        <a:bodyPr/>
+        <a:lstStyle/>
+        <a:p>
+          <a:endParaRPr lang="en-US"/>
+        </a:p>
+      </dgm:t>
+    </dgm:pt>
+    <dgm:pt modelId="{BFCE4A28-C381-46FF-935A-B11534EF7D87}" type="sibTrans" cxnId="{7F0DAB6F-9257-4F2D-B31A-3418F73F6952}">
+      <dgm:prSet/>
+      <dgm:spPr/>
+      <dgm:t>
+        <a:bodyPr/>
+        <a:lstStyle/>
+        <a:p>
+          <a:endParaRPr lang="en-US"/>
+        </a:p>
+      </dgm:t>
+    </dgm:pt>
+    <dgm:pt modelId="{76CC3289-2662-43F0-A3C6-BA04A135F08C}">
+      <dgm:prSet phldrT="[Text]"/>
+      <dgm:spPr/>
+      <dgm:t>
+        <a:bodyPr/>
+        <a:lstStyle/>
+        <a:p>
+          <a:r>
+            <a:rPr lang="en-US" dirty="0"/>
+            <a:t>Seakmeng Chheang</a:t>
+          </a:r>
+        </a:p>
+      </dgm:t>
+    </dgm:pt>
+    <dgm:pt modelId="{D46DB4DA-1442-4ECE-89FE-BBB1E3489E3D}" type="parTrans" cxnId="{0400886E-8A1A-44C2-95A7-DB0EF4911494}">
+      <dgm:prSet/>
+      <dgm:spPr/>
+      <dgm:t>
+        <a:bodyPr/>
+        <a:lstStyle/>
+        <a:p>
+          <a:endParaRPr lang="en-US"/>
+        </a:p>
+      </dgm:t>
+    </dgm:pt>
+    <dgm:pt modelId="{FA28C9D6-476E-43CD-BA23-D6D990FD78D0}" type="sibTrans" cxnId="{0400886E-8A1A-44C2-95A7-DB0EF4911494}">
+      <dgm:prSet/>
+      <dgm:spPr/>
+      <dgm:t>
+        <a:bodyPr/>
+        <a:lstStyle/>
+        <a:p>
+          <a:endParaRPr lang="en-US"/>
+        </a:p>
+      </dgm:t>
+    </dgm:pt>
+    <dgm:pt modelId="{8994D886-A75F-411A-A9D7-D31991FF12BD}" type="pres">
+      <dgm:prSet presAssocID="{7D9C16A6-8C48-4165-8DAF-8C957C12A8FA}" presName="root" presStyleCnt="0">
+        <dgm:presLayoutVars>
+          <dgm:dir/>
+          <dgm:resizeHandles val="exact"/>
+        </dgm:presLayoutVars>
+      </dgm:prSet>
+      <dgm:spPr/>
+    </dgm:pt>
+    <dgm:pt modelId="{E1DBA6D5-BD14-4CD2-A0CC-80F867FEFA81}" type="pres">
+      <dgm:prSet presAssocID="{701D68F5-42F8-47BC-8FED-84C50F595DF0}" presName="compNode" presStyleCnt="0"/>
+      <dgm:spPr/>
+    </dgm:pt>
+    <dgm:pt modelId="{19A8DC21-3E65-409D-AD53-DA51BB9198A0}" type="pres">
+      <dgm:prSet presAssocID="{701D68F5-42F8-47BC-8FED-84C50F595DF0}" presName="iconRect" presStyleLbl="node1" presStyleIdx="0" presStyleCnt="3" custScaleX="157625" custScaleY="157625"/>
+      <dgm:spPr>
+        <a:blipFill rotWithShape="1">
+          <a:blip xmlns:r="http://schemas.openxmlformats.org/officeDocument/2006/relationships" r:embed="rId1">
+            <a:duotone>
+              <a:schemeClr val="accent2">
+                <a:hueOff val="0"/>
+                <a:satOff val="0"/>
+                <a:lumOff val="0"/>
+                <a:alphaOff val="0"/>
+                <a:shade val="20000"/>
+                <a:satMod val="200000"/>
+              </a:schemeClr>
+              <a:schemeClr val="accent2">
+                <a:hueOff val="0"/>
+                <a:satOff val="0"/>
+                <a:lumOff val="0"/>
+                <a:alphaOff val="0"/>
+                <a:tint val="12000"/>
+                <a:satMod val="190000"/>
+              </a:schemeClr>
+            </a:duotone>
+          </a:blip>
+          <a:srcRect/>
+          <a:stretch>
+            <a:fillRect/>
+          </a:stretch>
+        </a:blipFill>
+        <a:ln>
+          <a:noFill/>
+        </a:ln>
+      </dgm:spPr>
+    </dgm:pt>
+    <dgm:pt modelId="{B9F90A48-FF94-4C94-A587-0190406F6FD3}" type="pres">
+      <dgm:prSet presAssocID="{701D68F5-42F8-47BC-8FED-84C50F595DF0}" presName="spaceRect" presStyleCnt="0"/>
+      <dgm:spPr/>
+    </dgm:pt>
+    <dgm:pt modelId="{A99B5DD6-89E9-4537-B415-4205CEB9323A}" type="pres">
+      <dgm:prSet presAssocID="{701D68F5-42F8-47BC-8FED-84C50F595DF0}" presName="textRect" presStyleLbl="revTx" presStyleIdx="0" presStyleCnt="3">
+        <dgm:presLayoutVars>
+          <dgm:chMax val="1"/>
+          <dgm:chPref val="1"/>
+        </dgm:presLayoutVars>
+      </dgm:prSet>
+      <dgm:spPr/>
+    </dgm:pt>
+    <dgm:pt modelId="{8B391436-B9B0-45BD-A57F-792D6376D868}" type="pres">
+      <dgm:prSet presAssocID="{0C95B389-AC0C-4055-9AA3-38815EFC8B0A}" presName="sibTrans" presStyleCnt="0"/>
+      <dgm:spPr/>
+    </dgm:pt>
+    <dgm:pt modelId="{95872155-C45D-46D3-874C-D838089A06F8}" type="pres">
+      <dgm:prSet presAssocID="{91A66877-AC1C-46D9-BF2C-6024B638DEA9}" presName="compNode" presStyleCnt="0"/>
+      <dgm:spPr/>
+    </dgm:pt>
+    <dgm:pt modelId="{CE9DF0E8-B0DE-4E1E-9FF4-6006AD8428DB}" type="pres">
+      <dgm:prSet presAssocID="{91A66877-AC1C-46D9-BF2C-6024B638DEA9}" presName="iconRect" presStyleLbl="node1" presStyleIdx="1" presStyleCnt="3" custScaleX="157625" custScaleY="157625"/>
+      <dgm:spPr>
+        <a:blipFill rotWithShape="1">
+          <a:blip xmlns:r="http://schemas.openxmlformats.org/officeDocument/2006/relationships" r:embed="rId2">
+            <a:duotone>
+              <a:schemeClr val="accent2">
+                <a:hueOff val="0"/>
+                <a:satOff val="0"/>
+                <a:lumOff val="0"/>
+                <a:alphaOff val="0"/>
+                <a:shade val="20000"/>
+                <a:satMod val="200000"/>
+              </a:schemeClr>
+              <a:schemeClr val="accent2">
+                <a:hueOff val="0"/>
+                <a:satOff val="0"/>
+                <a:lumOff val="0"/>
+                <a:alphaOff val="0"/>
+                <a:tint val="12000"/>
+                <a:satMod val="190000"/>
+              </a:schemeClr>
+            </a:duotone>
+          </a:blip>
+          <a:srcRect/>
+          <a:stretch>
+            <a:fillRect/>
+          </a:stretch>
+        </a:blipFill>
+        <a:ln>
+          <a:noFill/>
+        </a:ln>
+      </dgm:spPr>
+    </dgm:pt>
+    <dgm:pt modelId="{AA0423A1-55B2-45E9-BFE7-3FBE5BDA65ED}" type="pres">
+      <dgm:prSet presAssocID="{91A66877-AC1C-46D9-BF2C-6024B638DEA9}" presName="spaceRect" presStyleCnt="0"/>
+      <dgm:spPr/>
+    </dgm:pt>
+    <dgm:pt modelId="{55120873-6F5C-4053-8EAD-6287A7F1097E}" type="pres">
+      <dgm:prSet presAssocID="{91A66877-AC1C-46D9-BF2C-6024B638DEA9}" presName="textRect" presStyleLbl="revTx" presStyleIdx="1" presStyleCnt="3">
+        <dgm:presLayoutVars>
+          <dgm:chMax val="1"/>
+          <dgm:chPref val="1"/>
+        </dgm:presLayoutVars>
+      </dgm:prSet>
+      <dgm:spPr/>
+    </dgm:pt>
+    <dgm:pt modelId="{F679C986-30E4-4F0A-A3A6-CAE528BFED76}" type="pres">
+      <dgm:prSet presAssocID="{BFCE4A28-C381-46FF-935A-B11534EF7D87}" presName="sibTrans" presStyleCnt="0"/>
+      <dgm:spPr/>
+    </dgm:pt>
+    <dgm:pt modelId="{2EC2FDE3-8908-45C7-A3FD-EB370213FE69}" type="pres">
+      <dgm:prSet presAssocID="{76CC3289-2662-43F0-A3C6-BA04A135F08C}" presName="compNode" presStyleCnt="0"/>
+      <dgm:spPr/>
+    </dgm:pt>
+    <dgm:pt modelId="{6DB1FE51-13D0-4A38-AD6E-48D4371A1AF3}" type="pres">
+      <dgm:prSet presAssocID="{76CC3289-2662-43F0-A3C6-BA04A135F08C}" presName="iconRect" presStyleLbl="node1" presStyleIdx="2" presStyleCnt="3" custScaleX="157625" custScaleY="157625"/>
+      <dgm:spPr>
+        <a:blipFill rotWithShape="1">
+          <a:blip xmlns:r="http://schemas.openxmlformats.org/officeDocument/2006/relationships" r:embed="rId3">
+            <a:duotone>
+              <a:schemeClr val="accent2">
+                <a:hueOff val="0"/>
+                <a:satOff val="0"/>
+                <a:lumOff val="0"/>
+                <a:alphaOff val="0"/>
+                <a:shade val="20000"/>
+                <a:satMod val="200000"/>
+              </a:schemeClr>
+              <a:schemeClr val="accent2">
+                <a:hueOff val="0"/>
+                <a:satOff val="0"/>
+                <a:lumOff val="0"/>
+                <a:alphaOff val="0"/>
+                <a:tint val="12000"/>
+                <a:satMod val="190000"/>
+              </a:schemeClr>
+            </a:duotone>
+          </a:blip>
+          <a:srcRect/>
+          <a:stretch>
+            <a:fillRect/>
+          </a:stretch>
+        </a:blipFill>
+        <a:ln>
+          <a:noFill/>
+        </a:ln>
+      </dgm:spPr>
+    </dgm:pt>
+    <dgm:pt modelId="{0928538A-05CC-4A79-BD5D-92F985D1EEE5}" type="pres">
+      <dgm:prSet presAssocID="{76CC3289-2662-43F0-A3C6-BA04A135F08C}" presName="spaceRect" presStyleCnt="0"/>
+      <dgm:spPr/>
+    </dgm:pt>
+    <dgm:pt modelId="{133097FC-B1F8-4953-B0AB-E8E73D968D1C}" type="pres">
+      <dgm:prSet presAssocID="{76CC3289-2662-43F0-A3C6-BA04A135F08C}" presName="textRect" presStyleLbl="revTx" presStyleIdx="2" presStyleCnt="3">
+        <dgm:presLayoutVars>
+          <dgm:chMax val="1"/>
+          <dgm:chPref val="1"/>
+        </dgm:presLayoutVars>
+      </dgm:prSet>
+      <dgm:spPr/>
+    </dgm:pt>
+  </dgm:ptLst>
+  <dgm:cxnLst>
+    <dgm:cxn modelId="{1B8CB22C-9648-419B-97E9-4AA6C3555723}" type="presOf" srcId="{701D68F5-42F8-47BC-8FED-84C50F595DF0}" destId="{A99B5DD6-89E9-4537-B415-4205CEB9323A}" srcOrd="0" destOrd="0" presId="urn:microsoft.com/office/officeart/2018/2/layout/IconLabelList"/>
+    <dgm:cxn modelId="{C4BA385D-31ED-40EF-A5D6-98DFBA64E71A}" srcId="{7D9C16A6-8C48-4165-8DAF-8C957C12A8FA}" destId="{701D68F5-42F8-47BC-8FED-84C50F595DF0}" srcOrd="0" destOrd="0" parTransId="{9617668C-C38C-4017-8DDF-37855B15D110}" sibTransId="{0C95B389-AC0C-4055-9AA3-38815EFC8B0A}"/>
+    <dgm:cxn modelId="{5574CC64-4BF2-43BE-BABC-6DF1E58A4C74}" type="presOf" srcId="{7D9C16A6-8C48-4165-8DAF-8C957C12A8FA}" destId="{8994D886-A75F-411A-A9D7-D31991FF12BD}" srcOrd="0" destOrd="0" presId="urn:microsoft.com/office/officeart/2018/2/layout/IconLabelList"/>
+    <dgm:cxn modelId="{0400886E-8A1A-44C2-95A7-DB0EF4911494}" srcId="{7D9C16A6-8C48-4165-8DAF-8C957C12A8FA}" destId="{76CC3289-2662-43F0-A3C6-BA04A135F08C}" srcOrd="2" destOrd="0" parTransId="{D46DB4DA-1442-4ECE-89FE-BBB1E3489E3D}" sibTransId="{FA28C9D6-476E-43CD-BA23-D6D990FD78D0}"/>
+    <dgm:cxn modelId="{7F0DAB6F-9257-4F2D-B31A-3418F73F6952}" srcId="{7D9C16A6-8C48-4165-8DAF-8C957C12A8FA}" destId="{91A66877-AC1C-46D9-BF2C-6024B638DEA9}" srcOrd="1" destOrd="0" parTransId="{913FED05-DF41-48A7-B1F8-81937A468EF9}" sibTransId="{BFCE4A28-C381-46FF-935A-B11534EF7D87}"/>
+    <dgm:cxn modelId="{EC5C6E85-C523-4B60-976B-342F12E3A6CB}" type="presOf" srcId="{91A66877-AC1C-46D9-BF2C-6024B638DEA9}" destId="{55120873-6F5C-4053-8EAD-6287A7F1097E}" srcOrd="0" destOrd="0" presId="urn:microsoft.com/office/officeart/2018/2/layout/IconLabelList"/>
+    <dgm:cxn modelId="{6E31C6AB-C9E6-448F-A8CC-566A63619D4D}" type="presOf" srcId="{76CC3289-2662-43F0-A3C6-BA04A135F08C}" destId="{133097FC-B1F8-4953-B0AB-E8E73D968D1C}" srcOrd="0" destOrd="0" presId="urn:microsoft.com/office/officeart/2018/2/layout/IconLabelList"/>
+    <dgm:cxn modelId="{2AD6E781-3ED2-484E-B438-73386D2C583D}" type="presParOf" srcId="{8994D886-A75F-411A-A9D7-D31991FF12BD}" destId="{E1DBA6D5-BD14-4CD2-A0CC-80F867FEFA81}" srcOrd="0" destOrd="0" presId="urn:microsoft.com/office/officeart/2018/2/layout/IconLabelList"/>
+    <dgm:cxn modelId="{10B2B212-528C-471D-ABD0-D66ED992B833}" type="presParOf" srcId="{E1DBA6D5-BD14-4CD2-A0CC-80F867FEFA81}" destId="{19A8DC21-3E65-409D-AD53-DA51BB9198A0}" srcOrd="0" destOrd="0" presId="urn:microsoft.com/office/officeart/2018/2/layout/IconLabelList"/>
+    <dgm:cxn modelId="{2A8FB3D0-F98B-4F5A-BACA-4315E38776FB}" type="presParOf" srcId="{E1DBA6D5-BD14-4CD2-A0CC-80F867FEFA81}" destId="{B9F90A48-FF94-4C94-A587-0190406F6FD3}" srcOrd="1" destOrd="0" presId="urn:microsoft.com/office/officeart/2018/2/layout/IconLabelList"/>
+    <dgm:cxn modelId="{95FEF629-9884-451C-89B4-41B897ABE3D6}" type="presParOf" srcId="{E1DBA6D5-BD14-4CD2-A0CC-80F867FEFA81}" destId="{A99B5DD6-89E9-4537-B415-4205CEB9323A}" srcOrd="2" destOrd="0" presId="urn:microsoft.com/office/officeart/2018/2/layout/IconLabelList"/>
+    <dgm:cxn modelId="{0FE6827F-DE80-4F8A-8E9D-7F88C0F7EF29}" type="presParOf" srcId="{8994D886-A75F-411A-A9D7-D31991FF12BD}" destId="{8B391436-B9B0-45BD-A57F-792D6376D868}" srcOrd="1" destOrd="0" presId="urn:microsoft.com/office/officeart/2018/2/layout/IconLabelList"/>
+    <dgm:cxn modelId="{4857BE3A-D518-473D-AC79-7B9BF18B9824}" type="presParOf" srcId="{8994D886-A75F-411A-A9D7-D31991FF12BD}" destId="{95872155-C45D-46D3-874C-D838089A06F8}" srcOrd="2" destOrd="0" presId="urn:microsoft.com/office/officeart/2018/2/layout/IconLabelList"/>
+    <dgm:cxn modelId="{B4B325C4-81F2-4B3E-8CBF-4532B0BFA343}" type="presParOf" srcId="{95872155-C45D-46D3-874C-D838089A06F8}" destId="{CE9DF0E8-B0DE-4E1E-9FF4-6006AD8428DB}" srcOrd="0" destOrd="0" presId="urn:microsoft.com/office/officeart/2018/2/layout/IconLabelList"/>
+    <dgm:cxn modelId="{0AE6D335-6E55-47E1-BAD8-0368620AB8F6}" type="presParOf" srcId="{95872155-C45D-46D3-874C-D838089A06F8}" destId="{AA0423A1-55B2-45E9-BFE7-3FBE5BDA65ED}" srcOrd="1" destOrd="0" presId="urn:microsoft.com/office/officeart/2018/2/layout/IconLabelList"/>
+    <dgm:cxn modelId="{AFEE8CCD-97FE-4EFA-A584-DF6AFDAD2B20}" type="presParOf" srcId="{95872155-C45D-46D3-874C-D838089A06F8}" destId="{55120873-6F5C-4053-8EAD-6287A7F1097E}" srcOrd="2" destOrd="0" presId="urn:microsoft.com/office/officeart/2018/2/layout/IconLabelList"/>
+    <dgm:cxn modelId="{26649F18-C204-4047-8300-905486AB3755}" type="presParOf" srcId="{8994D886-A75F-411A-A9D7-D31991FF12BD}" destId="{F679C986-30E4-4F0A-A3A6-CAE528BFED76}" srcOrd="3" destOrd="0" presId="urn:microsoft.com/office/officeart/2018/2/layout/IconLabelList"/>
+    <dgm:cxn modelId="{898D629F-DA37-435F-A0B2-0617605D711A}" type="presParOf" srcId="{8994D886-A75F-411A-A9D7-D31991FF12BD}" destId="{2EC2FDE3-8908-45C7-A3FD-EB370213FE69}" srcOrd="4" destOrd="0" presId="urn:microsoft.com/office/officeart/2018/2/layout/IconLabelList"/>
+    <dgm:cxn modelId="{2BDADB1C-15B1-4763-9B35-3792147F8F87}" type="presParOf" srcId="{2EC2FDE3-8908-45C7-A3FD-EB370213FE69}" destId="{6DB1FE51-13D0-4A38-AD6E-48D4371A1AF3}" srcOrd="0" destOrd="0" presId="urn:microsoft.com/office/officeart/2018/2/layout/IconLabelList"/>
+    <dgm:cxn modelId="{F692F1E6-C6EC-4391-8432-EB6C34194240}" type="presParOf" srcId="{2EC2FDE3-8908-45C7-A3FD-EB370213FE69}" destId="{0928538A-05CC-4A79-BD5D-92F985D1EEE5}" srcOrd="1" destOrd="0" presId="urn:microsoft.com/office/officeart/2018/2/layout/IconLabelList"/>
+    <dgm:cxn modelId="{0E6AF6C4-A4E5-4234-9E16-F9F2334264CD}" type="presParOf" srcId="{2EC2FDE3-8908-45C7-A3FD-EB370213FE69}" destId="{133097FC-B1F8-4953-B0AB-E8E73D968D1C}" srcOrd="2" destOrd="0" presId="urn:microsoft.com/office/officeart/2018/2/layout/IconLabelList"/>
+  </dgm:cxnLst>
+  <dgm:bg/>
+  <dgm:whole/>
+  <dgm:extLst>
+    <a:ext uri="http://schemas.microsoft.com/office/drawing/2008/diagram">
+      <dsp:dataModelExt xmlns:dsp="http://schemas.microsoft.com/office/drawing/2008/diagram" relId="rId7" minVer="http://schemas.openxmlformats.org/drawingml/2006/diagram"/>
+    </a:ext>
+    <a:ext uri="{C62137D5-CB1D-491B-B009-E17868A290BF}">
+      <dgm14:recolorImg xmlns:dgm14="http://schemas.microsoft.com/office/drawing/2010/diagram" val="1"/>
+    </a:ext>
+  </dgm:extLst>
+</dgm:dataModel>
+</file>
+
+<file path=ppt/diagrams/data2.xml><?xml version="1.0" encoding="utf-8"?>
 <dgm:dataModel xmlns:dgm="http://schemas.openxmlformats.org/drawingml/2006/diagram" xmlns:a="http://schemas.openxmlformats.org/drawingml/2006/main">
   <dgm:ptLst>
     <dgm:pt modelId="{7D9C16A6-8C48-4165-8DAF-8C957C12A8FA}" type="doc">
@@ -1976,7 +3069,7 @@
 </dgm:dataModel>
 </file>
 
-<file path=ppt/diagrams/data2.xml><?xml version="1.0" encoding="utf-8"?>
+<file path=ppt/diagrams/data3.xml><?xml version="1.0" encoding="utf-8"?>
 <dgm:dataModel xmlns:dgm="http://schemas.openxmlformats.org/drawingml/2006/diagram" xmlns:a="http://schemas.openxmlformats.org/drawingml/2006/main">
   <dgm:ptLst>
     <dgm:pt modelId="{7E5AA53B-3EEE-4DE4-BB81-9044890C2946}" type="doc">
@@ -2232,6 +3325,391 @@
 </file>
 
 <file path=ppt/diagrams/drawing1.xml><?xml version="1.0" encoding="utf-8"?>
+<dsp:drawing xmlns:dgm="http://schemas.openxmlformats.org/drawingml/2006/diagram" xmlns:dsp="http://schemas.microsoft.com/office/drawing/2008/diagram" xmlns:a="http://schemas.openxmlformats.org/drawingml/2006/main">
+  <dsp:spTree>
+    <dsp:nvGrpSpPr>
+      <dsp:cNvPr id="0" name=""/>
+      <dsp:cNvGrpSpPr/>
+    </dsp:nvGrpSpPr>
+    <dsp:grpSpPr/>
+    <dsp:sp modelId="{19A8DC21-3E65-409D-AD53-DA51BB9198A0}">
+      <dsp:nvSpPr>
+        <dsp:cNvPr id="0" name=""/>
+        <dsp:cNvSpPr/>
+      </dsp:nvSpPr>
+      <dsp:spPr>
+        <a:xfrm>
+          <a:off x="523237" y="494935"/>
+          <a:ext cx="2285995" cy="2285995"/>
+        </a:xfrm>
+        <a:prstGeom prst="rect">
+          <a:avLst/>
+        </a:prstGeom>
+        <a:blipFill rotWithShape="1">
+          <a:blip xmlns:r="http://schemas.openxmlformats.org/officeDocument/2006/relationships" r:embed="rId1">
+            <a:duotone>
+              <a:schemeClr val="accent2">
+                <a:hueOff val="0"/>
+                <a:satOff val="0"/>
+                <a:lumOff val="0"/>
+                <a:alphaOff val="0"/>
+                <a:shade val="20000"/>
+                <a:satMod val="200000"/>
+              </a:schemeClr>
+              <a:schemeClr val="accent2">
+                <a:hueOff val="0"/>
+                <a:satOff val="0"/>
+                <a:lumOff val="0"/>
+                <a:alphaOff val="0"/>
+                <a:tint val="12000"/>
+                <a:satMod val="190000"/>
+              </a:schemeClr>
+            </a:duotone>
+          </a:blip>
+          <a:srcRect/>
+          <a:stretch>
+            <a:fillRect/>
+          </a:stretch>
+        </a:blipFill>
+        <a:ln w="22225" cap="rnd" cmpd="sng" algn="ctr">
+          <a:noFill/>
+          <a:prstDash val="solid"/>
+        </a:ln>
+        <a:effectLst/>
+      </dsp:spPr>
+      <dsp:style>
+        <a:lnRef idx="2">
+          <a:scrgbClr r="0" g="0" b="0"/>
+        </a:lnRef>
+        <a:fillRef idx="1">
+          <a:scrgbClr r="0" g="0" b="0"/>
+        </a:fillRef>
+        <a:effectRef idx="0">
+          <a:scrgbClr r="0" g="0" b="0"/>
+        </a:effectRef>
+        <a:fontRef idx="minor">
+          <a:schemeClr val="lt1"/>
+        </a:fontRef>
+      </dsp:style>
+    </dsp:sp>
+    <dsp:sp modelId="{A99B5DD6-89E9-4537-B415-4205CEB9323A}">
+      <dsp:nvSpPr>
+        <dsp:cNvPr id="0" name=""/>
+        <dsp:cNvSpPr/>
+      </dsp:nvSpPr>
+      <dsp:spPr>
+        <a:xfrm>
+          <a:off x="54818" y="2746269"/>
+          <a:ext cx="3222832" cy="720000"/>
+        </a:xfrm>
+        <a:prstGeom prst="rect">
+          <a:avLst/>
+        </a:prstGeom>
+        <a:noFill/>
+        <a:ln>
+          <a:noFill/>
+        </a:ln>
+        <a:effectLst/>
+      </dsp:spPr>
+      <dsp:style>
+        <a:lnRef idx="0">
+          <a:scrgbClr r="0" g="0" b="0"/>
+        </a:lnRef>
+        <a:fillRef idx="0">
+          <a:scrgbClr r="0" g="0" b="0"/>
+        </a:fillRef>
+        <a:effectRef idx="0">
+          <a:scrgbClr r="0" g="0" b="0"/>
+        </a:effectRef>
+        <a:fontRef idx="minor"/>
+      </dsp:style>
+      <dsp:txBody>
+        <a:bodyPr spcFirstLastPara="0" vert="horz" wrap="square" lIns="0" tIns="0" rIns="0" bIns="0" numCol="1" spcCol="1270" anchor="t" anchorCtr="0">
+          <a:noAutofit/>
+        </a:bodyPr>
+        <a:lstStyle/>
+        <a:p>
+          <a:pPr marL="0" lvl="0" indent="0" algn="ctr" defTabSz="1422400">
+            <a:lnSpc>
+              <a:spcPct val="90000"/>
+            </a:lnSpc>
+            <a:spcBef>
+              <a:spcPct val="0"/>
+            </a:spcBef>
+            <a:spcAft>
+              <a:spcPct val="35000"/>
+            </a:spcAft>
+            <a:buNone/>
+          </a:pPr>
+          <a:r>
+            <a:rPr lang="en-ZA" sz="3200" kern="1200" dirty="0" err="1"/>
+            <a:t>Bunnarith</a:t>
+          </a:r>
+          <a:r>
+            <a:rPr lang="en-ZA" sz="3200" kern="1200" dirty="0"/>
+            <a:t> </a:t>
+          </a:r>
+          <a:r>
+            <a:rPr lang="en-ZA" sz="3200" kern="1200" dirty="0" err="1"/>
+            <a:t>Heang</a:t>
+          </a:r>
+          <a:endParaRPr lang="en-US" sz="3200" kern="1200" dirty="0"/>
+        </a:p>
+      </dsp:txBody>
+      <dsp:txXfrm>
+        <a:off x="54818" y="2746269"/>
+        <a:ext cx="3222832" cy="720000"/>
+      </dsp:txXfrm>
+    </dsp:sp>
+    <dsp:sp modelId="{CE9DF0E8-B0DE-4E1E-9FF4-6006AD8428DB}">
+      <dsp:nvSpPr>
+        <dsp:cNvPr id="0" name=""/>
+        <dsp:cNvSpPr/>
+      </dsp:nvSpPr>
+      <dsp:spPr>
+        <a:xfrm>
+          <a:off x="4310064" y="494935"/>
+          <a:ext cx="2285995" cy="2285995"/>
+        </a:xfrm>
+        <a:prstGeom prst="rect">
+          <a:avLst/>
+        </a:prstGeom>
+        <a:blipFill rotWithShape="1">
+          <a:blip xmlns:r="http://schemas.openxmlformats.org/officeDocument/2006/relationships" r:embed="rId2">
+            <a:duotone>
+              <a:schemeClr val="accent2">
+                <a:hueOff val="0"/>
+                <a:satOff val="0"/>
+                <a:lumOff val="0"/>
+                <a:alphaOff val="0"/>
+                <a:shade val="20000"/>
+                <a:satMod val="200000"/>
+              </a:schemeClr>
+              <a:schemeClr val="accent2">
+                <a:hueOff val="0"/>
+                <a:satOff val="0"/>
+                <a:lumOff val="0"/>
+                <a:alphaOff val="0"/>
+                <a:tint val="12000"/>
+                <a:satMod val="190000"/>
+              </a:schemeClr>
+            </a:duotone>
+          </a:blip>
+          <a:srcRect/>
+          <a:stretch>
+            <a:fillRect/>
+          </a:stretch>
+        </a:blipFill>
+        <a:ln w="22225" cap="rnd" cmpd="sng" algn="ctr">
+          <a:noFill/>
+          <a:prstDash val="solid"/>
+        </a:ln>
+        <a:effectLst/>
+      </dsp:spPr>
+      <dsp:style>
+        <a:lnRef idx="2">
+          <a:scrgbClr r="0" g="0" b="0"/>
+        </a:lnRef>
+        <a:fillRef idx="1">
+          <a:scrgbClr r="0" g="0" b="0"/>
+        </a:fillRef>
+        <a:effectRef idx="0">
+          <a:scrgbClr r="0" g="0" b="0"/>
+        </a:effectRef>
+        <a:fontRef idx="minor">
+          <a:schemeClr val="lt1"/>
+        </a:fontRef>
+      </dsp:style>
+    </dsp:sp>
+    <dsp:sp modelId="{55120873-6F5C-4053-8EAD-6287A7F1097E}">
+      <dsp:nvSpPr>
+        <dsp:cNvPr id="0" name=""/>
+        <dsp:cNvSpPr/>
+      </dsp:nvSpPr>
+      <dsp:spPr>
+        <a:xfrm>
+          <a:off x="3841646" y="2746269"/>
+          <a:ext cx="3222832" cy="720000"/>
+        </a:xfrm>
+        <a:prstGeom prst="rect">
+          <a:avLst/>
+        </a:prstGeom>
+        <a:noFill/>
+        <a:ln>
+          <a:noFill/>
+        </a:ln>
+        <a:effectLst/>
+      </dsp:spPr>
+      <dsp:style>
+        <a:lnRef idx="0">
+          <a:scrgbClr r="0" g="0" b="0"/>
+        </a:lnRef>
+        <a:fillRef idx="0">
+          <a:scrgbClr r="0" g="0" b="0"/>
+        </a:fillRef>
+        <a:effectRef idx="0">
+          <a:scrgbClr r="0" g="0" b="0"/>
+        </a:effectRef>
+        <a:fontRef idx="minor"/>
+      </dsp:style>
+      <dsp:txBody>
+        <a:bodyPr spcFirstLastPara="0" vert="horz" wrap="square" lIns="0" tIns="0" rIns="0" bIns="0" numCol="1" spcCol="1270" anchor="t" anchorCtr="0">
+          <a:noAutofit/>
+        </a:bodyPr>
+        <a:lstStyle/>
+        <a:p>
+          <a:pPr marL="0" lvl="0" indent="0" algn="ctr" defTabSz="1422400">
+            <a:lnSpc>
+              <a:spcPct val="90000"/>
+            </a:lnSpc>
+            <a:spcBef>
+              <a:spcPct val="0"/>
+            </a:spcBef>
+            <a:spcAft>
+              <a:spcPct val="35000"/>
+            </a:spcAft>
+            <a:buNone/>
+          </a:pPr>
+          <a:r>
+            <a:rPr lang="en-US" sz="3200" kern="1200" dirty="0" err="1"/>
+            <a:t>Monespiseth</a:t>
+          </a:r>
+          <a:r>
+            <a:rPr lang="en-US" sz="3200" kern="1200" dirty="0"/>
+            <a:t> Ly</a:t>
+          </a:r>
+        </a:p>
+      </dsp:txBody>
+      <dsp:txXfrm>
+        <a:off x="3841646" y="2746269"/>
+        <a:ext cx="3222832" cy="720000"/>
+      </dsp:txXfrm>
+    </dsp:sp>
+    <dsp:sp modelId="{6DB1FE51-13D0-4A38-AD6E-48D4371A1AF3}">
+      <dsp:nvSpPr>
+        <dsp:cNvPr id="0" name=""/>
+        <dsp:cNvSpPr/>
+      </dsp:nvSpPr>
+      <dsp:spPr>
+        <a:xfrm>
+          <a:off x="8096892" y="494935"/>
+          <a:ext cx="2285995" cy="2285995"/>
+        </a:xfrm>
+        <a:prstGeom prst="rect">
+          <a:avLst/>
+        </a:prstGeom>
+        <a:blipFill rotWithShape="1">
+          <a:blip xmlns:r="http://schemas.openxmlformats.org/officeDocument/2006/relationships" r:embed="rId3">
+            <a:duotone>
+              <a:schemeClr val="accent2">
+                <a:hueOff val="0"/>
+                <a:satOff val="0"/>
+                <a:lumOff val="0"/>
+                <a:alphaOff val="0"/>
+                <a:shade val="20000"/>
+                <a:satMod val="200000"/>
+              </a:schemeClr>
+              <a:schemeClr val="accent2">
+                <a:hueOff val="0"/>
+                <a:satOff val="0"/>
+                <a:lumOff val="0"/>
+                <a:alphaOff val="0"/>
+                <a:tint val="12000"/>
+                <a:satMod val="190000"/>
+              </a:schemeClr>
+            </a:duotone>
+          </a:blip>
+          <a:srcRect/>
+          <a:stretch>
+            <a:fillRect/>
+          </a:stretch>
+        </a:blipFill>
+        <a:ln w="22225" cap="rnd" cmpd="sng" algn="ctr">
+          <a:noFill/>
+          <a:prstDash val="solid"/>
+        </a:ln>
+        <a:effectLst/>
+      </dsp:spPr>
+      <dsp:style>
+        <a:lnRef idx="2">
+          <a:scrgbClr r="0" g="0" b="0"/>
+        </a:lnRef>
+        <a:fillRef idx="1">
+          <a:scrgbClr r="0" g="0" b="0"/>
+        </a:fillRef>
+        <a:effectRef idx="0">
+          <a:scrgbClr r="0" g="0" b="0"/>
+        </a:effectRef>
+        <a:fontRef idx="minor">
+          <a:schemeClr val="lt1"/>
+        </a:fontRef>
+      </dsp:style>
+    </dsp:sp>
+    <dsp:sp modelId="{133097FC-B1F8-4953-B0AB-E8E73D968D1C}">
+      <dsp:nvSpPr>
+        <dsp:cNvPr id="0" name=""/>
+        <dsp:cNvSpPr/>
+      </dsp:nvSpPr>
+      <dsp:spPr>
+        <a:xfrm>
+          <a:off x="7628474" y="2746269"/>
+          <a:ext cx="3222832" cy="720000"/>
+        </a:xfrm>
+        <a:prstGeom prst="rect">
+          <a:avLst/>
+        </a:prstGeom>
+        <a:noFill/>
+        <a:ln>
+          <a:noFill/>
+        </a:ln>
+        <a:effectLst/>
+      </dsp:spPr>
+      <dsp:style>
+        <a:lnRef idx="0">
+          <a:scrgbClr r="0" g="0" b="0"/>
+        </a:lnRef>
+        <a:fillRef idx="0">
+          <a:scrgbClr r="0" g="0" b="0"/>
+        </a:fillRef>
+        <a:effectRef idx="0">
+          <a:scrgbClr r="0" g="0" b="0"/>
+        </a:effectRef>
+        <a:fontRef idx="minor"/>
+      </dsp:style>
+      <dsp:txBody>
+        <a:bodyPr spcFirstLastPara="0" vert="horz" wrap="square" lIns="0" tIns="0" rIns="0" bIns="0" numCol="1" spcCol="1270" anchor="t" anchorCtr="0">
+          <a:noAutofit/>
+        </a:bodyPr>
+        <a:lstStyle/>
+        <a:p>
+          <a:pPr marL="0" lvl="0" indent="0" algn="ctr" defTabSz="1422400">
+            <a:lnSpc>
+              <a:spcPct val="90000"/>
+            </a:lnSpc>
+            <a:spcBef>
+              <a:spcPct val="0"/>
+            </a:spcBef>
+            <a:spcAft>
+              <a:spcPct val="35000"/>
+            </a:spcAft>
+            <a:buNone/>
+          </a:pPr>
+          <a:r>
+            <a:rPr lang="en-US" sz="3200" kern="1200" dirty="0"/>
+            <a:t>Seakmeng Chheang</a:t>
+          </a:r>
+        </a:p>
+      </dsp:txBody>
+      <dsp:txXfrm>
+        <a:off x="7628474" y="2746269"/>
+        <a:ext cx="3222832" cy="720000"/>
+      </dsp:txXfrm>
+    </dsp:sp>
+  </dsp:spTree>
+</dsp:drawing>
+</file>
+
+<file path=ppt/diagrams/drawing2.xml><?xml version="1.0" encoding="utf-8"?>
 <dsp:drawing xmlns:dgm="http://schemas.openxmlformats.org/drawingml/2006/diagram" xmlns:dsp="http://schemas.microsoft.com/office/drawing/2008/diagram" xmlns:a="http://schemas.openxmlformats.org/drawingml/2006/main">
   <dsp:spTree>
     <dsp:nvGrpSpPr>
@@ -2619,7 +4097,7 @@
 </dsp:drawing>
 </file>
 
-<file path=ppt/diagrams/drawing2.xml><?xml version="1.0" encoding="utf-8"?>
+<file path=ppt/diagrams/drawing3.xml><?xml version="1.0" encoding="utf-8"?>
 <dsp:drawing xmlns:dgm="http://schemas.openxmlformats.org/drawingml/2006/diagram" xmlns:dsp="http://schemas.microsoft.com/office/drawing/2008/diagram" xmlns:a="http://schemas.openxmlformats.org/drawingml/2006/main">
   <dsp:spTree>
     <dsp:nvGrpSpPr>
@@ -3284,6 +4762,196 @@
 </file>
 
 <file path=ppt/diagrams/layout2.xml><?xml version="1.0" encoding="utf-8"?>
+<dgm:layoutDef xmlns:dgm="http://schemas.openxmlformats.org/drawingml/2006/diagram" xmlns:a="http://schemas.openxmlformats.org/drawingml/2006/main" uniqueId="urn:microsoft.com/office/officeart/2018/2/layout/IconLabelList">
+  <dgm:title val="Icon Label List"/>
+  <dgm:desc val="Use to show non-sequential or grouped chunks of information accompanied by a related visuals. Works best with icons or small pictures with short text captions."/>
+  <dgm:catLst>
+    <dgm:cat type="icon" pri="500"/>
+  </dgm:catLst>
+  <dgm:sampData useDef="1">
+    <dgm:dataModel>
+      <dgm:ptLst/>
+      <dgm:bg/>
+      <dgm:whole/>
+    </dgm:dataModel>
+  </dgm:sampData>
+  <dgm:styleData useDef="1">
+    <dgm:dataModel>
+      <dgm:ptLst/>
+      <dgm:bg/>
+      <dgm:whole/>
+    </dgm:dataModel>
+  </dgm:styleData>
+  <dgm:clrData useDef="1">
+    <dgm:dataModel>
+      <dgm:ptLst/>
+      <dgm:bg/>
+      <dgm:whole/>
+    </dgm:dataModel>
+  </dgm:clrData>
+  <dgm:layoutNode name="root">
+    <dgm:varLst>
+      <dgm:dir/>
+      <dgm:resizeHandles val="exact"/>
+    </dgm:varLst>
+    <dgm:choose name="Name0">
+      <dgm:if name="Name1" axis="self" func="var" arg="dir" op="equ" val="norm">
+        <dgm:alg type="snake">
+          <dgm:param type="grDir" val="tL"/>
+          <dgm:param type="flowDir" val="row"/>
+          <dgm:param type="contDir" val="sameDir"/>
+          <dgm:param type="off" val="ctr"/>
+          <dgm:param type="vertAlign" val="mid"/>
+          <dgm:param type="horzAlign" val="ctr"/>
+        </dgm:alg>
+      </dgm:if>
+      <dgm:else name="Name2">
+        <dgm:alg type="snake">
+          <dgm:param type="grDir" val="tR"/>
+          <dgm:param type="flowDir" val="row"/>
+          <dgm:param type="contDir" val="sameDir"/>
+          <dgm:param type="off" val="ctr"/>
+          <dgm:param type="vertAlign" val="mid"/>
+          <dgm:param type="horzAlign" val="ctr"/>
+        </dgm:alg>
+      </dgm:else>
+    </dgm:choose>
+    <dgm:shape xmlns:r="http://schemas.openxmlformats.org/officeDocument/2006/relationships" r:blip="">
+      <dgm:adjLst/>
+    </dgm:shape>
+    <dgm:presOf/>
+    <dgm:choose name="Name3">
+      <dgm:if name="Name4" axis="ch" ptType="node" func="cnt" op="lte" val="2">
+        <dgm:constrLst>
+          <dgm:constr type="h" for="ch" forName="compNode" refType="h" fact="0.4"/>
+          <dgm:constr type="w" for="ch" forName="compNode" val="120"/>
+          <dgm:constr type="w" for="ch" forName="sibTrans" refType="w" refFor="ch" refForName="compNode" fact="0.175"/>
+          <dgm:constr type="sp" refType="w" refFor="ch" refForName="compNode" op="equ" fact="0.25"/>
+          <dgm:constr type="primFontSz" for="des" ptType="node" op="equ" val="50"/>
+          <dgm:constr type="h" for="des" forName="compNode" op="equ"/>
+          <dgm:constr type="h" for="des" forName="textRect" op="equ"/>
+        </dgm:constrLst>
+      </dgm:if>
+      <dgm:if name="Name5" axis="ch" ptType="node" func="cnt" op="lte" val="4">
+        <dgm:constrLst>
+          <dgm:constr type="h" for="ch" forName="compNode" refType="h" fact="0.4"/>
+          <dgm:constr type="w" for="ch" forName="compNode" refType="w"/>
+          <dgm:constr type="w" for="ch" forName="sibTrans" refType="w" refFor="ch" refForName="compNode" fact="0.175"/>
+          <dgm:constr type="sp" refType="w" refFor="ch" refForName="compNode" op="equ" fact="0.25"/>
+          <dgm:constr type="primFontSz" for="des" ptType="node" op="equ" val="36"/>
+          <dgm:constr type="h" for="des" forName="compNode" op="equ"/>
+          <dgm:constr type="h" for="des" forName="textRect" op="equ"/>
+        </dgm:constrLst>
+      </dgm:if>
+      <dgm:else name="Name6">
+        <dgm:constrLst>
+          <dgm:constr type="h" for="ch" forName="compNode" refType="h" fact="0.4"/>
+          <dgm:constr type="w" for="ch" forName="compNode" refType="w"/>
+          <dgm:constr type="w" for="ch" forName="sibTrans" refType="w" refFor="ch" refForName="compNode" fact="0.175"/>
+          <dgm:constr type="sp" refType="w" refFor="ch" refForName="compNode" op="equ" fact="0.25"/>
+          <dgm:constr type="primFontSz" for="des" ptType="node" op="equ" val="24"/>
+          <dgm:constr type="h" for="des" forName="compNode" op="equ"/>
+          <dgm:constr type="h" for="des" forName="textRect" op="equ"/>
+        </dgm:constrLst>
+      </dgm:else>
+    </dgm:choose>
+    <dgm:ruleLst>
+      <dgm:rule type="w" for="ch" forName="compNode" val="50" fact="NaN" max="NaN"/>
+    </dgm:ruleLst>
+    <dgm:forEach name="Name7" axis="ch" ptType="node">
+      <dgm:layoutNode name="compNode">
+        <dgm:alg type="composite"/>
+        <dgm:shape xmlns:r="http://schemas.openxmlformats.org/officeDocument/2006/relationships" r:blip="">
+          <dgm:adjLst/>
+        </dgm:shape>
+        <dgm:presOf axis="self"/>
+        <dgm:constrLst>
+          <dgm:constr type="w" for="ch" forName="iconRect" refType="w" fact="0.45"/>
+          <dgm:constr type="h" for="ch" forName="iconRect" refType="w" refFor="ch" refForName="iconRect"/>
+          <dgm:constr type="ctrX" for="ch" forName="iconRect" refType="w" fact="0.5"/>
+          <dgm:constr type="t" for="ch" forName="iconRect"/>
+          <dgm:constr type="h" for="ch" forName="spaceRect" refType="h" fact="0.15"/>
+          <dgm:constr type="w" for="ch" forName="spaceRect" refType="w"/>
+          <dgm:constr type="l" for="ch" forName="spaceRect"/>
+          <dgm:constr type="t" for="ch" forName="spaceRect" refType="b" refFor="ch" refForName="iconRect"/>
+          <dgm:constr type="h" for="ch" forName="textRect" val="20"/>
+          <dgm:constr type="w" for="ch" forName="textRect" refType="w"/>
+          <dgm:constr type="l" for="ch" forName="textRect"/>
+          <dgm:constr type="t" for="ch" forName="textRect" refType="b" refFor="ch" refForName="spaceRect"/>
+        </dgm:constrLst>
+        <dgm:ruleLst>
+          <dgm:rule type="h" val="INF" fact="NaN" max="NaN"/>
+        </dgm:ruleLst>
+        <dgm:layoutNode name="iconRect" styleLbl="node1">
+          <dgm:alg type="sp"/>
+          <dgm:shape xmlns:r="http://schemas.openxmlformats.org/officeDocument/2006/relationships" type="rect" r:blip="" blipPhldr="1">
+            <dgm:adjLst/>
+          </dgm:shape>
+          <dgm:presOf/>
+          <dgm:constrLst/>
+          <dgm:ruleLst/>
+        </dgm:layoutNode>
+        <dgm:layoutNode name="spaceRect">
+          <dgm:alg type="sp"/>
+          <dgm:shape xmlns:r="http://schemas.openxmlformats.org/officeDocument/2006/relationships" r:blip="">
+            <dgm:adjLst/>
+          </dgm:shape>
+          <dgm:presOf/>
+          <dgm:constrLst/>
+          <dgm:ruleLst/>
+        </dgm:layoutNode>
+        <dgm:layoutNode name="textRect" styleLbl="revTx">
+          <dgm:varLst>
+            <dgm:chMax val="1"/>
+            <dgm:chPref val="1"/>
+          </dgm:varLst>
+          <dgm:alg type="tx">
+            <dgm:param type="txAnchorVert" val="t"/>
+          </dgm:alg>
+          <dgm:shape xmlns:r="http://schemas.openxmlformats.org/officeDocument/2006/relationships" type="rect" r:blip="">
+            <dgm:adjLst/>
+          </dgm:shape>
+          <dgm:presOf axis="self" ptType="node"/>
+          <dgm:constrLst>
+            <dgm:constr type="lMarg"/>
+            <dgm:constr type="rMarg"/>
+            <dgm:constr type="tMarg"/>
+            <dgm:constr type="bMarg"/>
+          </dgm:constrLst>
+          <dgm:ruleLst>
+            <dgm:rule type="primFontSz" val="11" fact="NaN" max="NaN"/>
+            <dgm:rule type="h" val="INF" fact="NaN" max="NaN"/>
+          </dgm:ruleLst>
+        </dgm:layoutNode>
+      </dgm:layoutNode>
+      <dgm:forEach name="Name8" axis="followSib" ptType="sibTrans" cnt="1">
+        <dgm:layoutNode name="sibTrans">
+          <dgm:alg type="sp"/>
+          <dgm:shape xmlns:r="http://schemas.openxmlformats.org/officeDocument/2006/relationships" r:blip="">
+            <dgm:adjLst/>
+          </dgm:shape>
+          <dgm:presOf axis="self"/>
+          <dgm:constrLst/>
+          <dgm:ruleLst/>
+        </dgm:layoutNode>
+      </dgm:forEach>
+    </dgm:forEach>
+  </dgm:layoutNode>
+  <dgm:extLst>
+    <a:ext uri="{68A01E43-0DF5-4B5B-8FA6-DAF915123BFB}">
+      <dgm1612:lstStyle xmlns:dgm1612="http://schemas.microsoft.com/office/drawing/2016/12/diagram">
+        <a:lvl1pPr>
+          <a:lnSpc>
+            <a:spcPct val="100000"/>
+          </a:lnSpc>
+        </a:lvl1pPr>
+      </dgm1612:lstStyle>
+    </a:ext>
+  </dgm:extLst>
+</dgm:layoutDef>
+</file>
+
+<file path=ppt/diagrams/layout3.xml><?xml version="1.0" encoding="utf-8"?>
 <dgm:layoutDef xmlns:dgm="http://schemas.openxmlformats.org/drawingml/2006/diagram" xmlns:a="http://schemas.openxmlformats.org/drawingml/2006/main" uniqueId="urn:microsoft.com/office/officeart/2008/layout/VerticalCurvedList">
   <dgm:title val=""/>
   <dgm:desc val=""/>
@@ -5596,6 +7264,1040 @@
 </file>
 
 <file path=ppt/diagrams/quickStyle2.xml><?xml version="1.0" encoding="utf-8"?>
+<dgm:styleDef xmlns:dgm="http://schemas.openxmlformats.org/drawingml/2006/diagram" xmlns:a="http://schemas.openxmlformats.org/drawingml/2006/main" uniqueId="urn:microsoft.com/office/officeart/2005/8/quickstyle/simple1">
+  <dgm:title val=""/>
+  <dgm:desc val=""/>
+  <dgm:catLst>
+    <dgm:cat type="simple" pri="10100"/>
+  </dgm:catLst>
+  <dgm:scene3d>
+    <a:camera prst="orthographicFront"/>
+    <a:lightRig rig="threePt" dir="t"/>
+  </dgm:scene3d>
+  <dgm:styleLbl name="node0">
+    <dgm:scene3d>
+      <a:camera prst="orthographicFront"/>
+      <a:lightRig rig="threePt" dir="t"/>
+    </dgm:scene3d>
+    <dgm:sp3d/>
+    <dgm:txPr/>
+    <dgm:style>
+      <a:lnRef idx="2">
+        <a:scrgbClr r="0" g="0" b="0"/>
+      </a:lnRef>
+      <a:fillRef idx="1">
+        <a:scrgbClr r="0" g="0" b="0"/>
+      </a:fillRef>
+      <a:effectRef idx="0">
+        <a:scrgbClr r="0" g="0" b="0"/>
+      </a:effectRef>
+      <a:fontRef idx="minor">
+        <a:schemeClr val="lt1"/>
+      </a:fontRef>
+    </dgm:style>
+  </dgm:styleLbl>
+  <dgm:styleLbl name="lnNode1">
+    <dgm:scene3d>
+      <a:camera prst="orthographicFront"/>
+      <a:lightRig rig="threePt" dir="t"/>
+    </dgm:scene3d>
+    <dgm:sp3d/>
+    <dgm:txPr/>
+    <dgm:style>
+      <a:lnRef idx="2">
+        <a:scrgbClr r="0" g="0" b="0"/>
+      </a:lnRef>
+      <a:fillRef idx="1">
+        <a:scrgbClr r="0" g="0" b="0"/>
+      </a:fillRef>
+      <a:effectRef idx="0">
+        <a:scrgbClr r="0" g="0" b="0"/>
+      </a:effectRef>
+      <a:fontRef idx="minor">
+        <a:schemeClr val="lt1"/>
+      </a:fontRef>
+    </dgm:style>
+  </dgm:styleLbl>
+  <dgm:styleLbl name="vennNode1">
+    <dgm:scene3d>
+      <a:camera prst="orthographicFront"/>
+      <a:lightRig rig="threePt" dir="t"/>
+    </dgm:scene3d>
+    <dgm:sp3d/>
+    <dgm:txPr/>
+    <dgm:style>
+      <a:lnRef idx="2">
+        <a:scrgbClr r="0" g="0" b="0"/>
+      </a:lnRef>
+      <a:fillRef idx="1">
+        <a:scrgbClr r="0" g="0" b="0"/>
+      </a:fillRef>
+      <a:effectRef idx="0">
+        <a:scrgbClr r="0" g="0" b="0"/>
+      </a:effectRef>
+      <a:fontRef idx="minor">
+        <a:schemeClr val="tx1"/>
+      </a:fontRef>
+    </dgm:style>
+  </dgm:styleLbl>
+  <dgm:styleLbl name="alignNode1">
+    <dgm:scene3d>
+      <a:camera prst="orthographicFront"/>
+      <a:lightRig rig="threePt" dir="t"/>
+    </dgm:scene3d>
+    <dgm:sp3d/>
+    <dgm:txPr/>
+    <dgm:style>
+      <a:lnRef idx="2">
+        <a:scrgbClr r="0" g="0" b="0"/>
+      </a:lnRef>
+      <a:fillRef idx="1">
+        <a:scrgbClr r="0" g="0" b="0"/>
+      </a:fillRef>
+      <a:effectRef idx="0">
+        <a:scrgbClr r="0" g="0" b="0"/>
+      </a:effectRef>
+      <a:fontRef idx="minor">
+        <a:schemeClr val="lt1"/>
+      </a:fontRef>
+    </dgm:style>
+  </dgm:styleLbl>
+  <dgm:styleLbl name="node1">
+    <dgm:scene3d>
+      <a:camera prst="orthographicFront"/>
+      <a:lightRig rig="threePt" dir="t"/>
+    </dgm:scene3d>
+    <dgm:sp3d/>
+    <dgm:txPr/>
+    <dgm:style>
+      <a:lnRef idx="2">
+        <a:scrgbClr r="0" g="0" b="0"/>
+      </a:lnRef>
+      <a:fillRef idx="1">
+        <a:scrgbClr r="0" g="0" b="0"/>
+      </a:fillRef>
+      <a:effectRef idx="0">
+        <a:scrgbClr r="0" g="0" b="0"/>
+      </a:effectRef>
+      <a:fontRef idx="minor">
+        <a:schemeClr val="lt1"/>
+      </a:fontRef>
+    </dgm:style>
+  </dgm:styleLbl>
+  <dgm:styleLbl name="node2">
+    <dgm:scene3d>
+      <a:camera prst="orthographicFront"/>
+      <a:lightRig rig="threePt" dir="t"/>
+    </dgm:scene3d>
+    <dgm:sp3d/>
+    <dgm:txPr/>
+    <dgm:style>
+      <a:lnRef idx="2">
+        <a:scrgbClr r="0" g="0" b="0"/>
+      </a:lnRef>
+      <a:fillRef idx="1">
+        <a:scrgbClr r="0" g="0" b="0"/>
+      </a:fillRef>
+      <a:effectRef idx="0">
+        <a:scrgbClr r="0" g="0" b="0"/>
+      </a:effectRef>
+      <a:fontRef idx="minor">
+        <a:schemeClr val="lt1"/>
+      </a:fontRef>
+    </dgm:style>
+  </dgm:styleLbl>
+  <dgm:styleLbl name="node3">
+    <dgm:scene3d>
+      <a:camera prst="orthographicFront"/>
+      <a:lightRig rig="threePt" dir="t"/>
+    </dgm:scene3d>
+    <dgm:sp3d/>
+    <dgm:txPr/>
+    <dgm:style>
+      <a:lnRef idx="2">
+        <a:scrgbClr r="0" g="0" b="0"/>
+      </a:lnRef>
+      <a:fillRef idx="1">
+        <a:scrgbClr r="0" g="0" b="0"/>
+      </a:fillRef>
+      <a:effectRef idx="0">
+        <a:scrgbClr r="0" g="0" b="0"/>
+      </a:effectRef>
+      <a:fontRef idx="minor">
+        <a:schemeClr val="lt1"/>
+      </a:fontRef>
+    </dgm:style>
+  </dgm:styleLbl>
+  <dgm:styleLbl name="node4">
+    <dgm:scene3d>
+      <a:camera prst="orthographicFront"/>
+      <a:lightRig rig="threePt" dir="t"/>
+    </dgm:scene3d>
+    <dgm:sp3d/>
+    <dgm:txPr/>
+    <dgm:style>
+      <a:lnRef idx="2">
+        <a:scrgbClr r="0" g="0" b="0"/>
+      </a:lnRef>
+      <a:fillRef idx="1">
+        <a:scrgbClr r="0" g="0" b="0"/>
+      </a:fillRef>
+      <a:effectRef idx="0">
+        <a:scrgbClr r="0" g="0" b="0"/>
+      </a:effectRef>
+      <a:fontRef idx="minor">
+        <a:schemeClr val="lt1"/>
+      </a:fontRef>
+    </dgm:style>
+  </dgm:styleLbl>
+  <dgm:styleLbl name="fgImgPlace1">
+    <dgm:scene3d>
+      <a:camera prst="orthographicFront"/>
+      <a:lightRig rig="threePt" dir="t"/>
+    </dgm:scene3d>
+    <dgm:sp3d/>
+    <dgm:txPr/>
+    <dgm:style>
+      <a:lnRef idx="2">
+        <a:scrgbClr r="0" g="0" b="0"/>
+      </a:lnRef>
+      <a:fillRef idx="1">
+        <a:scrgbClr r="0" g="0" b="0"/>
+      </a:fillRef>
+      <a:effectRef idx="0">
+        <a:scrgbClr r="0" g="0" b="0"/>
+      </a:effectRef>
+      <a:fontRef idx="minor"/>
+    </dgm:style>
+  </dgm:styleLbl>
+  <dgm:styleLbl name="alignImgPlace1">
+    <dgm:scene3d>
+      <a:camera prst="orthographicFront"/>
+      <a:lightRig rig="threePt" dir="t"/>
+    </dgm:scene3d>
+    <dgm:sp3d/>
+    <dgm:txPr/>
+    <dgm:style>
+      <a:lnRef idx="2">
+        <a:scrgbClr r="0" g="0" b="0"/>
+      </a:lnRef>
+      <a:fillRef idx="1">
+        <a:scrgbClr r="0" g="0" b="0"/>
+      </a:fillRef>
+      <a:effectRef idx="0">
+        <a:scrgbClr r="0" g="0" b="0"/>
+      </a:effectRef>
+      <a:fontRef idx="minor"/>
+    </dgm:style>
+  </dgm:styleLbl>
+  <dgm:styleLbl name="bgImgPlace1">
+    <dgm:scene3d>
+      <a:camera prst="orthographicFront"/>
+      <a:lightRig rig="threePt" dir="t"/>
+    </dgm:scene3d>
+    <dgm:sp3d/>
+    <dgm:txPr/>
+    <dgm:style>
+      <a:lnRef idx="2">
+        <a:scrgbClr r="0" g="0" b="0"/>
+      </a:lnRef>
+      <a:fillRef idx="1">
+        <a:scrgbClr r="0" g="0" b="0"/>
+      </a:fillRef>
+      <a:effectRef idx="0">
+        <a:scrgbClr r="0" g="0" b="0"/>
+      </a:effectRef>
+      <a:fontRef idx="minor"/>
+    </dgm:style>
+  </dgm:styleLbl>
+  <dgm:styleLbl name="sibTrans2D1">
+    <dgm:scene3d>
+      <a:camera prst="orthographicFront"/>
+      <a:lightRig rig="threePt" dir="t"/>
+    </dgm:scene3d>
+    <dgm:sp3d/>
+    <dgm:txPr/>
+    <dgm:style>
+      <a:lnRef idx="0">
+        <a:scrgbClr r="0" g="0" b="0"/>
+      </a:lnRef>
+      <a:fillRef idx="1">
+        <a:scrgbClr r="0" g="0" b="0"/>
+      </a:fillRef>
+      <a:effectRef idx="0">
+        <a:scrgbClr r="0" g="0" b="0"/>
+      </a:effectRef>
+      <a:fontRef idx="minor">
+        <a:schemeClr val="lt1"/>
+      </a:fontRef>
+    </dgm:style>
+  </dgm:styleLbl>
+  <dgm:styleLbl name="fgSibTrans2D1">
+    <dgm:scene3d>
+      <a:camera prst="orthographicFront"/>
+      <a:lightRig rig="threePt" dir="t"/>
+    </dgm:scene3d>
+    <dgm:sp3d/>
+    <dgm:txPr/>
+    <dgm:style>
+      <a:lnRef idx="0">
+        <a:scrgbClr r="0" g="0" b="0"/>
+      </a:lnRef>
+      <a:fillRef idx="1">
+        <a:scrgbClr r="0" g="0" b="0"/>
+      </a:fillRef>
+      <a:effectRef idx="0">
+        <a:scrgbClr r="0" g="0" b="0"/>
+      </a:effectRef>
+      <a:fontRef idx="minor">
+        <a:schemeClr val="lt1"/>
+      </a:fontRef>
+    </dgm:style>
+  </dgm:styleLbl>
+  <dgm:styleLbl name="bgSibTrans2D1">
+    <dgm:scene3d>
+      <a:camera prst="orthographicFront"/>
+      <a:lightRig rig="threePt" dir="t"/>
+    </dgm:scene3d>
+    <dgm:sp3d/>
+    <dgm:txPr/>
+    <dgm:style>
+      <a:lnRef idx="0">
+        <a:scrgbClr r="0" g="0" b="0"/>
+      </a:lnRef>
+      <a:fillRef idx="1">
+        <a:scrgbClr r="0" g="0" b="0"/>
+      </a:fillRef>
+      <a:effectRef idx="0">
+        <a:scrgbClr r="0" g="0" b="0"/>
+      </a:effectRef>
+      <a:fontRef idx="minor">
+        <a:schemeClr val="lt1"/>
+      </a:fontRef>
+    </dgm:style>
+  </dgm:styleLbl>
+  <dgm:styleLbl name="sibTrans1D1">
+    <dgm:scene3d>
+      <a:camera prst="orthographicFront"/>
+      <a:lightRig rig="threePt" dir="t"/>
+    </dgm:scene3d>
+    <dgm:sp3d/>
+    <dgm:txPr/>
+    <dgm:style>
+      <a:lnRef idx="1">
+        <a:scrgbClr r="0" g="0" b="0"/>
+      </a:lnRef>
+      <a:fillRef idx="0">
+        <a:scrgbClr r="0" g="0" b="0"/>
+      </a:fillRef>
+      <a:effectRef idx="0">
+        <a:scrgbClr r="0" g="0" b="0"/>
+      </a:effectRef>
+      <a:fontRef idx="minor"/>
+    </dgm:style>
+  </dgm:styleLbl>
+  <dgm:styleLbl name="callout">
+    <dgm:scene3d>
+      <a:camera prst="orthographicFront"/>
+      <a:lightRig rig="threePt" dir="t"/>
+    </dgm:scene3d>
+    <dgm:sp3d/>
+    <dgm:txPr/>
+    <dgm:style>
+      <a:lnRef idx="2">
+        <a:scrgbClr r="0" g="0" b="0"/>
+      </a:lnRef>
+      <a:fillRef idx="1">
+        <a:scrgbClr r="0" g="0" b="0"/>
+      </a:fillRef>
+      <a:effectRef idx="0">
+        <a:scrgbClr r="0" g="0" b="0"/>
+      </a:effectRef>
+      <a:fontRef idx="minor"/>
+    </dgm:style>
+  </dgm:styleLbl>
+  <dgm:styleLbl name="asst0">
+    <dgm:scene3d>
+      <a:camera prst="orthographicFront"/>
+      <a:lightRig rig="threePt" dir="t"/>
+    </dgm:scene3d>
+    <dgm:sp3d/>
+    <dgm:txPr/>
+    <dgm:style>
+      <a:lnRef idx="2">
+        <a:scrgbClr r="0" g="0" b="0"/>
+      </a:lnRef>
+      <a:fillRef idx="1">
+        <a:scrgbClr r="0" g="0" b="0"/>
+      </a:fillRef>
+      <a:effectRef idx="0">
+        <a:scrgbClr r="0" g="0" b="0"/>
+      </a:effectRef>
+      <a:fontRef idx="minor">
+        <a:schemeClr val="lt1"/>
+      </a:fontRef>
+    </dgm:style>
+  </dgm:styleLbl>
+  <dgm:styleLbl name="asst1">
+    <dgm:scene3d>
+      <a:camera prst="orthographicFront"/>
+      <a:lightRig rig="threePt" dir="t"/>
+    </dgm:scene3d>
+    <dgm:sp3d/>
+    <dgm:txPr/>
+    <dgm:style>
+      <a:lnRef idx="2">
+        <a:scrgbClr r="0" g="0" b="0"/>
+      </a:lnRef>
+      <a:fillRef idx="1">
+        <a:scrgbClr r="0" g="0" b="0"/>
+      </a:fillRef>
+      <a:effectRef idx="0">
+        <a:scrgbClr r="0" g="0" b="0"/>
+      </a:effectRef>
+      <a:fontRef idx="minor">
+        <a:schemeClr val="lt1"/>
+      </a:fontRef>
+    </dgm:style>
+  </dgm:styleLbl>
+  <dgm:styleLbl name="asst2">
+    <dgm:scene3d>
+      <a:camera prst="orthographicFront"/>
+      <a:lightRig rig="threePt" dir="t"/>
+    </dgm:scene3d>
+    <dgm:sp3d/>
+    <dgm:txPr/>
+    <dgm:style>
+      <a:lnRef idx="2">
+        <a:scrgbClr r="0" g="0" b="0"/>
+      </a:lnRef>
+      <a:fillRef idx="1">
+        <a:scrgbClr r="0" g="0" b="0"/>
+      </a:fillRef>
+      <a:effectRef idx="0">
+        <a:scrgbClr r="0" g="0" b="0"/>
+      </a:effectRef>
+      <a:fontRef idx="minor">
+        <a:schemeClr val="lt1"/>
+      </a:fontRef>
+    </dgm:style>
+  </dgm:styleLbl>
+  <dgm:styleLbl name="asst3">
+    <dgm:scene3d>
+      <a:camera prst="orthographicFront"/>
+      <a:lightRig rig="threePt" dir="t"/>
+    </dgm:scene3d>
+    <dgm:sp3d/>
+    <dgm:txPr/>
+    <dgm:style>
+      <a:lnRef idx="2">
+        <a:scrgbClr r="0" g="0" b="0"/>
+      </a:lnRef>
+      <a:fillRef idx="1">
+        <a:scrgbClr r="0" g="0" b="0"/>
+      </a:fillRef>
+      <a:effectRef idx="0">
+        <a:scrgbClr r="0" g="0" b="0"/>
+      </a:effectRef>
+      <a:fontRef idx="minor">
+        <a:schemeClr val="lt1"/>
+      </a:fontRef>
+    </dgm:style>
+  </dgm:styleLbl>
+  <dgm:styleLbl name="asst4">
+    <dgm:scene3d>
+      <a:camera prst="orthographicFront"/>
+      <a:lightRig rig="threePt" dir="t"/>
+    </dgm:scene3d>
+    <dgm:sp3d/>
+    <dgm:txPr/>
+    <dgm:style>
+      <a:lnRef idx="2">
+        <a:scrgbClr r="0" g="0" b="0"/>
+      </a:lnRef>
+      <a:fillRef idx="1">
+        <a:scrgbClr r="0" g="0" b="0"/>
+      </a:fillRef>
+      <a:effectRef idx="0">
+        <a:scrgbClr r="0" g="0" b="0"/>
+      </a:effectRef>
+      <a:fontRef idx="minor">
+        <a:schemeClr val="lt1"/>
+      </a:fontRef>
+    </dgm:style>
+  </dgm:styleLbl>
+  <dgm:styleLbl name="parChTrans2D1">
+    <dgm:scene3d>
+      <a:camera prst="orthographicFront"/>
+      <a:lightRig rig="threePt" dir="t"/>
+    </dgm:scene3d>
+    <dgm:sp3d/>
+    <dgm:txPr/>
+    <dgm:style>
+      <a:lnRef idx="2">
+        <a:scrgbClr r="0" g="0" b="0"/>
+      </a:lnRef>
+      <a:fillRef idx="1">
+        <a:scrgbClr r="0" g="0" b="0"/>
+      </a:fillRef>
+      <a:effectRef idx="0">
+        <a:scrgbClr r="0" g="0" b="0"/>
+      </a:effectRef>
+      <a:fontRef idx="minor">
+        <a:schemeClr val="lt1"/>
+      </a:fontRef>
+    </dgm:style>
+  </dgm:styleLbl>
+  <dgm:styleLbl name="parChTrans2D2">
+    <dgm:scene3d>
+      <a:camera prst="orthographicFront"/>
+      <a:lightRig rig="threePt" dir="t"/>
+    </dgm:scene3d>
+    <dgm:sp3d/>
+    <dgm:txPr/>
+    <dgm:style>
+      <a:lnRef idx="2">
+        <a:scrgbClr r="0" g="0" b="0"/>
+      </a:lnRef>
+      <a:fillRef idx="1">
+        <a:scrgbClr r="0" g="0" b="0"/>
+      </a:fillRef>
+      <a:effectRef idx="0">
+        <a:scrgbClr r="0" g="0" b="0"/>
+      </a:effectRef>
+      <a:fontRef idx="minor">
+        <a:schemeClr val="lt1"/>
+      </a:fontRef>
+    </dgm:style>
+  </dgm:styleLbl>
+  <dgm:styleLbl name="parChTrans2D3">
+    <dgm:scene3d>
+      <a:camera prst="orthographicFront"/>
+      <a:lightRig rig="threePt" dir="t"/>
+    </dgm:scene3d>
+    <dgm:sp3d/>
+    <dgm:txPr/>
+    <dgm:style>
+      <a:lnRef idx="2">
+        <a:scrgbClr r="0" g="0" b="0"/>
+      </a:lnRef>
+      <a:fillRef idx="1">
+        <a:scrgbClr r="0" g="0" b="0"/>
+      </a:fillRef>
+      <a:effectRef idx="0">
+        <a:scrgbClr r="0" g="0" b="0"/>
+      </a:effectRef>
+      <a:fontRef idx="minor">
+        <a:schemeClr val="lt1"/>
+      </a:fontRef>
+    </dgm:style>
+  </dgm:styleLbl>
+  <dgm:styleLbl name="parChTrans2D4">
+    <dgm:scene3d>
+      <a:camera prst="orthographicFront"/>
+      <a:lightRig rig="threePt" dir="t"/>
+    </dgm:scene3d>
+    <dgm:sp3d/>
+    <dgm:txPr/>
+    <dgm:style>
+      <a:lnRef idx="2">
+        <a:scrgbClr r="0" g="0" b="0"/>
+      </a:lnRef>
+      <a:fillRef idx="1">
+        <a:scrgbClr r="0" g="0" b="0"/>
+      </a:fillRef>
+      <a:effectRef idx="0">
+        <a:scrgbClr r="0" g="0" b="0"/>
+      </a:effectRef>
+      <a:fontRef idx="minor">
+        <a:schemeClr val="lt1"/>
+      </a:fontRef>
+    </dgm:style>
+  </dgm:styleLbl>
+  <dgm:styleLbl name="parChTrans1D1">
+    <dgm:scene3d>
+      <a:camera prst="orthographicFront"/>
+      <a:lightRig rig="threePt" dir="t"/>
+    </dgm:scene3d>
+    <dgm:sp3d/>
+    <dgm:txPr/>
+    <dgm:style>
+      <a:lnRef idx="2">
+        <a:scrgbClr r="0" g="0" b="0"/>
+      </a:lnRef>
+      <a:fillRef idx="0">
+        <a:scrgbClr r="0" g="0" b="0"/>
+      </a:fillRef>
+      <a:effectRef idx="0">
+        <a:scrgbClr r="0" g="0" b="0"/>
+      </a:effectRef>
+      <a:fontRef idx="minor"/>
+    </dgm:style>
+  </dgm:styleLbl>
+  <dgm:styleLbl name="parChTrans1D2">
+    <dgm:scene3d>
+      <a:camera prst="orthographicFront"/>
+      <a:lightRig rig="threePt" dir="t"/>
+    </dgm:scene3d>
+    <dgm:sp3d/>
+    <dgm:txPr/>
+    <dgm:style>
+      <a:lnRef idx="2">
+        <a:scrgbClr r="0" g="0" b="0"/>
+      </a:lnRef>
+      <a:fillRef idx="0">
+        <a:scrgbClr r="0" g="0" b="0"/>
+      </a:fillRef>
+      <a:effectRef idx="0">
+        <a:scrgbClr r="0" g="0" b="0"/>
+      </a:effectRef>
+      <a:fontRef idx="minor"/>
+    </dgm:style>
+  </dgm:styleLbl>
+  <dgm:styleLbl name="parChTrans1D3">
+    <dgm:scene3d>
+      <a:camera prst="orthographicFront"/>
+      <a:lightRig rig="threePt" dir="t"/>
+    </dgm:scene3d>
+    <dgm:sp3d/>
+    <dgm:txPr/>
+    <dgm:style>
+      <a:lnRef idx="2">
+        <a:scrgbClr r="0" g="0" b="0"/>
+      </a:lnRef>
+      <a:fillRef idx="0">
+        <a:scrgbClr r="0" g="0" b="0"/>
+      </a:fillRef>
+      <a:effectRef idx="0">
+        <a:scrgbClr r="0" g="0" b="0"/>
+      </a:effectRef>
+      <a:fontRef idx="minor"/>
+    </dgm:style>
+  </dgm:styleLbl>
+  <dgm:styleLbl name="parChTrans1D4">
+    <dgm:scene3d>
+      <a:camera prst="orthographicFront"/>
+      <a:lightRig rig="threePt" dir="t"/>
+    </dgm:scene3d>
+    <dgm:sp3d/>
+    <dgm:txPr/>
+    <dgm:style>
+      <a:lnRef idx="2">
+        <a:scrgbClr r="0" g="0" b="0"/>
+      </a:lnRef>
+      <a:fillRef idx="0">
+        <a:scrgbClr r="0" g="0" b="0"/>
+      </a:fillRef>
+      <a:effectRef idx="0">
+        <a:scrgbClr r="0" g="0" b="0"/>
+      </a:effectRef>
+      <a:fontRef idx="minor"/>
+    </dgm:style>
+  </dgm:styleLbl>
+  <dgm:styleLbl name="fgAcc1">
+    <dgm:scene3d>
+      <a:camera prst="orthographicFront"/>
+      <a:lightRig rig="threePt" dir="t"/>
+    </dgm:scene3d>
+    <dgm:sp3d/>
+    <dgm:txPr/>
+    <dgm:style>
+      <a:lnRef idx="2">
+        <a:scrgbClr r="0" g="0" b="0"/>
+      </a:lnRef>
+      <a:fillRef idx="1">
+        <a:scrgbClr r="0" g="0" b="0"/>
+      </a:fillRef>
+      <a:effectRef idx="0">
+        <a:scrgbClr r="0" g="0" b="0"/>
+      </a:effectRef>
+      <a:fontRef idx="minor"/>
+    </dgm:style>
+  </dgm:styleLbl>
+  <dgm:styleLbl name="conFgAcc1">
+    <dgm:scene3d>
+      <a:camera prst="orthographicFront"/>
+      <a:lightRig rig="threePt" dir="t"/>
+    </dgm:scene3d>
+    <dgm:sp3d/>
+    <dgm:txPr/>
+    <dgm:style>
+      <a:lnRef idx="2">
+        <a:scrgbClr r="0" g="0" b="0"/>
+      </a:lnRef>
+      <a:fillRef idx="1">
+        <a:scrgbClr r="0" g="0" b="0"/>
+      </a:fillRef>
+      <a:effectRef idx="0">
+        <a:scrgbClr r="0" g="0" b="0"/>
+      </a:effectRef>
+      <a:fontRef idx="minor"/>
+    </dgm:style>
+  </dgm:styleLbl>
+  <dgm:styleLbl name="alignAcc1">
+    <dgm:scene3d>
+      <a:camera prst="orthographicFront"/>
+      <a:lightRig rig="threePt" dir="t"/>
+    </dgm:scene3d>
+    <dgm:sp3d/>
+    <dgm:txPr/>
+    <dgm:style>
+      <a:lnRef idx="2">
+        <a:scrgbClr r="0" g="0" b="0"/>
+      </a:lnRef>
+      <a:fillRef idx="1">
+        <a:scrgbClr r="0" g="0" b="0"/>
+      </a:fillRef>
+      <a:effectRef idx="0">
+        <a:scrgbClr r="0" g="0" b="0"/>
+      </a:effectRef>
+      <a:fontRef idx="minor"/>
+    </dgm:style>
+  </dgm:styleLbl>
+  <dgm:styleLbl name="trAlignAcc1">
+    <dgm:scene3d>
+      <a:camera prst="orthographicFront"/>
+      <a:lightRig rig="threePt" dir="t"/>
+    </dgm:scene3d>
+    <dgm:sp3d/>
+    <dgm:txPr/>
+    <dgm:style>
+      <a:lnRef idx="1">
+        <a:scrgbClr r="0" g="0" b="0"/>
+      </a:lnRef>
+      <a:fillRef idx="1">
+        <a:scrgbClr r="0" g="0" b="0"/>
+      </a:fillRef>
+      <a:effectRef idx="0">
+        <a:scrgbClr r="0" g="0" b="0"/>
+      </a:effectRef>
+      <a:fontRef idx="minor"/>
+    </dgm:style>
+  </dgm:styleLbl>
+  <dgm:styleLbl name="bgAcc1">
+    <dgm:scene3d>
+      <a:camera prst="orthographicFront"/>
+      <a:lightRig rig="threePt" dir="t"/>
+    </dgm:scene3d>
+    <dgm:sp3d/>
+    <dgm:txPr/>
+    <dgm:style>
+      <a:lnRef idx="2">
+        <a:scrgbClr r="0" g="0" b="0"/>
+      </a:lnRef>
+      <a:fillRef idx="1">
+        <a:scrgbClr r="0" g="0" b="0"/>
+      </a:fillRef>
+      <a:effectRef idx="0">
+        <a:scrgbClr r="0" g="0" b="0"/>
+      </a:effectRef>
+      <a:fontRef idx="minor"/>
+    </dgm:style>
+  </dgm:styleLbl>
+  <dgm:styleLbl name="solidFgAcc1">
+    <dgm:scene3d>
+      <a:camera prst="orthographicFront"/>
+      <a:lightRig rig="threePt" dir="t"/>
+    </dgm:scene3d>
+    <dgm:sp3d/>
+    <dgm:txPr/>
+    <dgm:style>
+      <a:lnRef idx="2">
+        <a:scrgbClr r="0" g="0" b="0"/>
+      </a:lnRef>
+      <a:fillRef idx="1">
+        <a:scrgbClr r="0" g="0" b="0"/>
+      </a:fillRef>
+      <a:effectRef idx="0">
+        <a:scrgbClr r="0" g="0" b="0"/>
+      </a:effectRef>
+      <a:fontRef idx="minor"/>
+    </dgm:style>
+  </dgm:styleLbl>
+  <dgm:styleLbl name="solidAlignAcc1">
+    <dgm:scene3d>
+      <a:camera prst="orthographicFront"/>
+      <a:lightRig rig="threePt" dir="t"/>
+    </dgm:scene3d>
+    <dgm:sp3d/>
+    <dgm:txPr/>
+    <dgm:style>
+      <a:lnRef idx="2">
+        <a:scrgbClr r="0" g="0" b="0"/>
+      </a:lnRef>
+      <a:fillRef idx="1">
+        <a:scrgbClr r="0" g="0" b="0"/>
+      </a:fillRef>
+      <a:effectRef idx="0">
+        <a:scrgbClr r="0" g="0" b="0"/>
+      </a:effectRef>
+      <a:fontRef idx="minor"/>
+    </dgm:style>
+  </dgm:styleLbl>
+  <dgm:styleLbl name="solidBgAcc1">
+    <dgm:scene3d>
+      <a:camera prst="orthographicFront"/>
+      <a:lightRig rig="threePt" dir="t"/>
+    </dgm:scene3d>
+    <dgm:sp3d/>
+    <dgm:txPr/>
+    <dgm:style>
+      <a:lnRef idx="2">
+        <a:scrgbClr r="0" g="0" b="0"/>
+      </a:lnRef>
+      <a:fillRef idx="1">
+        <a:scrgbClr r="0" g="0" b="0"/>
+      </a:fillRef>
+      <a:effectRef idx="0">
+        <a:scrgbClr r="0" g="0" b="0"/>
+      </a:effectRef>
+      <a:fontRef idx="minor"/>
+    </dgm:style>
+  </dgm:styleLbl>
+  <dgm:styleLbl name="fgAccFollowNode1">
+    <dgm:scene3d>
+      <a:camera prst="orthographicFront"/>
+      <a:lightRig rig="threePt" dir="t"/>
+    </dgm:scene3d>
+    <dgm:sp3d/>
+    <dgm:txPr/>
+    <dgm:style>
+      <a:lnRef idx="2">
+        <a:scrgbClr r="0" g="0" b="0"/>
+      </a:lnRef>
+      <a:fillRef idx="1">
+        <a:scrgbClr r="0" g="0" b="0"/>
+      </a:fillRef>
+      <a:effectRef idx="0">
+        <a:scrgbClr r="0" g="0" b="0"/>
+      </a:effectRef>
+      <a:fontRef idx="minor"/>
+    </dgm:style>
+  </dgm:styleLbl>
+  <dgm:styleLbl name="alignAccFollowNode1">
+    <dgm:scene3d>
+      <a:camera prst="orthographicFront"/>
+      <a:lightRig rig="threePt" dir="t"/>
+    </dgm:scene3d>
+    <dgm:sp3d/>
+    <dgm:txPr/>
+    <dgm:style>
+      <a:lnRef idx="2">
+        <a:scrgbClr r="0" g="0" b="0"/>
+      </a:lnRef>
+      <a:fillRef idx="1">
+        <a:scrgbClr r="0" g="0" b="0"/>
+      </a:fillRef>
+      <a:effectRef idx="0">
+        <a:scrgbClr r="0" g="0" b="0"/>
+      </a:effectRef>
+      <a:fontRef idx="minor"/>
+    </dgm:style>
+  </dgm:styleLbl>
+  <dgm:styleLbl name="bgAccFollowNode1">
+    <dgm:scene3d>
+      <a:camera prst="orthographicFront"/>
+      <a:lightRig rig="threePt" dir="t"/>
+    </dgm:scene3d>
+    <dgm:sp3d/>
+    <dgm:txPr/>
+    <dgm:style>
+      <a:lnRef idx="2">
+        <a:scrgbClr r="0" g="0" b="0"/>
+      </a:lnRef>
+      <a:fillRef idx="1">
+        <a:scrgbClr r="0" g="0" b="0"/>
+      </a:fillRef>
+      <a:effectRef idx="0">
+        <a:scrgbClr r="0" g="0" b="0"/>
+      </a:effectRef>
+      <a:fontRef idx="minor"/>
+    </dgm:style>
+  </dgm:styleLbl>
+  <dgm:styleLbl name="fgAcc0">
+    <dgm:scene3d>
+      <a:camera prst="orthographicFront"/>
+      <a:lightRig rig="threePt" dir="t"/>
+    </dgm:scene3d>
+    <dgm:sp3d/>
+    <dgm:txPr/>
+    <dgm:style>
+      <a:lnRef idx="2">
+        <a:scrgbClr r="0" g="0" b="0"/>
+      </a:lnRef>
+      <a:fillRef idx="1">
+        <a:scrgbClr r="0" g="0" b="0"/>
+      </a:fillRef>
+      <a:effectRef idx="0">
+        <a:scrgbClr r="0" g="0" b="0"/>
+      </a:effectRef>
+      <a:fontRef idx="minor"/>
+    </dgm:style>
+  </dgm:styleLbl>
+  <dgm:styleLbl name="fgAcc2">
+    <dgm:scene3d>
+      <a:camera prst="orthographicFront"/>
+      <a:lightRig rig="threePt" dir="t"/>
+    </dgm:scene3d>
+    <dgm:sp3d/>
+    <dgm:txPr/>
+    <dgm:style>
+      <a:lnRef idx="2">
+        <a:scrgbClr r="0" g="0" b="0"/>
+      </a:lnRef>
+      <a:fillRef idx="1">
+        <a:scrgbClr r="0" g="0" b="0"/>
+      </a:fillRef>
+      <a:effectRef idx="0">
+        <a:scrgbClr r="0" g="0" b="0"/>
+      </a:effectRef>
+      <a:fontRef idx="minor"/>
+    </dgm:style>
+  </dgm:styleLbl>
+  <dgm:styleLbl name="fgAcc3">
+    <dgm:scene3d>
+      <a:camera prst="orthographicFront"/>
+      <a:lightRig rig="threePt" dir="t"/>
+    </dgm:scene3d>
+    <dgm:sp3d/>
+    <dgm:txPr/>
+    <dgm:style>
+      <a:lnRef idx="2">
+        <a:scrgbClr r="0" g="0" b="0"/>
+      </a:lnRef>
+      <a:fillRef idx="1">
+        <a:scrgbClr r="0" g="0" b="0"/>
+      </a:fillRef>
+      <a:effectRef idx="0">
+        <a:scrgbClr r="0" g="0" b="0"/>
+      </a:effectRef>
+      <a:fontRef idx="minor"/>
+    </dgm:style>
+  </dgm:styleLbl>
+  <dgm:styleLbl name="fgAcc4">
+    <dgm:scene3d>
+      <a:camera prst="orthographicFront"/>
+      <a:lightRig rig="threePt" dir="t"/>
+    </dgm:scene3d>
+    <dgm:sp3d/>
+    <dgm:txPr/>
+    <dgm:style>
+      <a:lnRef idx="2">
+        <a:scrgbClr r="0" g="0" b="0"/>
+      </a:lnRef>
+      <a:fillRef idx="1">
+        <a:scrgbClr r="0" g="0" b="0"/>
+      </a:fillRef>
+      <a:effectRef idx="0">
+        <a:scrgbClr r="0" g="0" b="0"/>
+      </a:effectRef>
+      <a:fontRef idx="minor"/>
+    </dgm:style>
+  </dgm:styleLbl>
+  <dgm:styleLbl name="bgShp">
+    <dgm:scene3d>
+      <a:camera prst="orthographicFront"/>
+      <a:lightRig rig="threePt" dir="t"/>
+    </dgm:scene3d>
+    <dgm:sp3d/>
+    <dgm:txPr/>
+    <dgm:style>
+      <a:lnRef idx="0">
+        <a:scrgbClr r="0" g="0" b="0"/>
+      </a:lnRef>
+      <a:fillRef idx="1">
+        <a:scrgbClr r="0" g="0" b="0"/>
+      </a:fillRef>
+      <a:effectRef idx="0">
+        <a:scrgbClr r="0" g="0" b="0"/>
+      </a:effectRef>
+      <a:fontRef idx="minor"/>
+    </dgm:style>
+  </dgm:styleLbl>
+  <dgm:styleLbl name="dkBgShp">
+    <dgm:scene3d>
+      <a:camera prst="orthographicFront"/>
+      <a:lightRig rig="threePt" dir="t"/>
+    </dgm:scene3d>
+    <dgm:sp3d/>
+    <dgm:txPr/>
+    <dgm:style>
+      <a:lnRef idx="0">
+        <a:scrgbClr r="0" g="0" b="0"/>
+      </a:lnRef>
+      <a:fillRef idx="1">
+        <a:scrgbClr r="0" g="0" b="0"/>
+      </a:fillRef>
+      <a:effectRef idx="0">
+        <a:scrgbClr r="0" g="0" b="0"/>
+      </a:effectRef>
+      <a:fontRef idx="minor"/>
+    </dgm:style>
+  </dgm:styleLbl>
+  <dgm:styleLbl name="trBgShp">
+    <dgm:scene3d>
+      <a:camera prst="orthographicFront"/>
+      <a:lightRig rig="threePt" dir="t"/>
+    </dgm:scene3d>
+    <dgm:sp3d/>
+    <dgm:txPr/>
+    <dgm:style>
+      <a:lnRef idx="0">
+        <a:scrgbClr r="0" g="0" b="0"/>
+      </a:lnRef>
+      <a:fillRef idx="1">
+        <a:scrgbClr r="0" g="0" b="0"/>
+      </a:fillRef>
+      <a:effectRef idx="0">
+        <a:scrgbClr r="0" g="0" b="0"/>
+      </a:effectRef>
+      <a:fontRef idx="minor"/>
+    </dgm:style>
+  </dgm:styleLbl>
+  <dgm:styleLbl name="fgShp">
+    <dgm:scene3d>
+      <a:camera prst="orthographicFront"/>
+      <a:lightRig rig="threePt" dir="t"/>
+    </dgm:scene3d>
+    <dgm:sp3d/>
+    <dgm:txPr/>
+    <dgm:style>
+      <a:lnRef idx="2">
+        <a:scrgbClr r="0" g="0" b="0"/>
+      </a:lnRef>
+      <a:fillRef idx="1">
+        <a:scrgbClr r="0" g="0" b="0"/>
+      </a:fillRef>
+      <a:effectRef idx="0">
+        <a:scrgbClr r="0" g="0" b="0"/>
+      </a:effectRef>
+      <a:fontRef idx="minor"/>
+    </dgm:style>
+  </dgm:styleLbl>
+  <dgm:styleLbl name="revTx">
+    <dgm:scene3d>
+      <a:camera prst="orthographicFront"/>
+      <a:lightRig rig="threePt" dir="t"/>
+    </dgm:scene3d>
+    <dgm:sp3d/>
+    <dgm:txPr/>
+    <dgm:style>
+      <a:lnRef idx="0">
+        <a:scrgbClr r="0" g="0" b="0"/>
+      </a:lnRef>
+      <a:fillRef idx="0">
+        <a:scrgbClr r="0" g="0" b="0"/>
+      </a:fillRef>
+      <a:effectRef idx="0">
+        <a:scrgbClr r="0" g="0" b="0"/>
+      </a:effectRef>
+      <a:fontRef idx="minor"/>
+    </dgm:style>
+  </dgm:styleLbl>
+</dgm:styleDef>
+</file>
+
+<file path=ppt/diagrams/quickStyle3.xml><?xml version="1.0" encoding="utf-8"?>
 <dgm:styleDef xmlns:dgm="http://schemas.openxmlformats.org/drawingml/2006/diagram" xmlns:a="http://schemas.openxmlformats.org/drawingml/2006/main" uniqueId="urn:microsoft.com/office/officeart/2005/8/quickstyle/simple4">
   <dgm:title val=""/>
   <dgm:desc val=""/>
@@ -7316,7 +10018,91 @@
           <a:p>
             <a:fld id="{C6B3AB32-59DF-41F1-9618-EDFBF5049629}" type="slidenum">
               <a:rPr lang="en-US" smtClean="0"/>
-              <a:t>4</a:t>
+              <a:t>2</a:t>
+            </a:fld>
+            <a:endParaRPr lang="en-US" dirty="0"/>
+          </a:p>
+        </p:txBody>
+      </p:sp>
+    </p:spTree>
+    <p:extLst>
+      <p:ext uri="{BB962C8B-B14F-4D97-AF65-F5344CB8AC3E}">
+        <p14:creationId xmlns:p14="http://schemas.microsoft.com/office/powerpoint/2010/main" val="47208373"/>
+      </p:ext>
+    </p:extLst>
+  </p:cSld>
+  <p:clrMapOvr>
+    <a:masterClrMapping/>
+  </p:clrMapOvr>
+</p:notes>
+</file>
+
+<file path=ppt/notesSlides/notesSlide3.xml><?xml version="1.0" encoding="utf-8"?>
+<p:notes xmlns:a="http://schemas.openxmlformats.org/drawingml/2006/main" xmlns:r="http://schemas.openxmlformats.org/officeDocument/2006/relationships" xmlns:p="http://schemas.openxmlformats.org/presentationml/2006/main">
+  <p:cSld>
+    <p:spTree>
+      <p:nvGrpSpPr>
+        <p:cNvPr id="1" name=""/>
+        <p:cNvGrpSpPr/>
+        <p:nvPr/>
+      </p:nvGrpSpPr>
+      <p:grpSpPr>
+        <a:xfrm>
+          <a:off x="0" y="0"/>
+          <a:ext cx="0" cy="0"/>
+          <a:chOff x="0" y="0"/>
+          <a:chExt cx="0" cy="0"/>
+        </a:xfrm>
+      </p:grpSpPr>
+      <p:sp>
+        <p:nvSpPr>
+          <p:cNvPr id="2" name="Slide Image Placeholder 1"/>
+          <p:cNvSpPr>
+            <a:spLocks noGrp="1" noRot="1" noChangeAspect="1"/>
+          </p:cNvSpPr>
+          <p:nvPr>
+            <p:ph type="sldImg"/>
+          </p:nvPr>
+        </p:nvSpPr>
+        <p:spPr/>
+      </p:sp>
+      <p:sp>
+        <p:nvSpPr>
+          <p:cNvPr id="3" name="Notes Placeholder 2"/>
+          <p:cNvSpPr>
+            <a:spLocks noGrp="1"/>
+          </p:cNvSpPr>
+          <p:nvPr>
+            <p:ph type="body" idx="1"/>
+          </p:nvPr>
+        </p:nvSpPr>
+        <p:spPr/>
+        <p:txBody>
+          <a:bodyPr/>
+          <a:lstStyle/>
+          <a:p>
+            <a:endParaRPr lang="en-US" dirty="0"/>
+          </a:p>
+        </p:txBody>
+      </p:sp>
+      <p:sp>
+        <p:nvSpPr>
+          <p:cNvPr id="4" name="Slide Number Placeholder 3"/>
+          <p:cNvSpPr>
+            <a:spLocks noGrp="1"/>
+          </p:cNvSpPr>
+          <p:nvPr>
+            <p:ph type="sldNum" sz="quarter" idx="5"/>
+          </p:nvPr>
+        </p:nvSpPr>
+        <p:spPr/>
+        <p:txBody>
+          <a:bodyPr/>
+          <a:lstStyle/>
+          <a:p>
+            <a:fld id="{C6B3AB32-59DF-41F1-9618-EDFBF5049629}" type="slidenum">
+              <a:rPr lang="en-US" smtClean="0"/>
+              <a:t>6</a:t>
             </a:fld>
             <a:endParaRPr lang="en-US" dirty="0"/>
           </a:p>
@@ -7335,7 +10121,7 @@
 </p:notes>
 </file>
 
-<file path=ppt/notesSlides/notesSlide3.xml><?xml version="1.0" encoding="utf-8"?>
+<file path=ppt/notesSlides/notesSlide4.xml><?xml version="1.0" encoding="utf-8"?>
 <p:notes xmlns:a="http://schemas.openxmlformats.org/drawingml/2006/main" xmlns:r="http://schemas.openxmlformats.org/officeDocument/2006/relationships" xmlns:p="http://schemas.openxmlformats.org/presentationml/2006/main">
   <p:cSld>
     <p:spTree>
@@ -7403,7 +10189,7 @@
           <a:p>
             <a:fld id="{C6B3AB32-59DF-41F1-9618-EDFBF5049629}" type="slidenum">
               <a:rPr lang="en-US" smtClean="0"/>
-              <a:t>7</a:t>
+              <a:t>9</a:t>
             </a:fld>
             <a:endParaRPr lang="en-US" dirty="0"/>
           </a:p>
@@ -7413,90 +10199,6 @@
     <p:extLst>
       <p:ext uri="{BB962C8B-B14F-4D97-AF65-F5344CB8AC3E}">
         <p14:creationId xmlns:p14="http://schemas.microsoft.com/office/powerpoint/2010/main" val="1831338742"/>
-      </p:ext>
-    </p:extLst>
-  </p:cSld>
-  <p:clrMapOvr>
-    <a:masterClrMapping/>
-  </p:clrMapOvr>
-</p:notes>
-</file>
-
-<file path=ppt/notesSlides/notesSlide4.xml><?xml version="1.0" encoding="utf-8"?>
-<p:notes xmlns:a="http://schemas.openxmlformats.org/drawingml/2006/main" xmlns:r="http://schemas.openxmlformats.org/officeDocument/2006/relationships" xmlns:p="http://schemas.openxmlformats.org/presentationml/2006/main">
-  <p:cSld>
-    <p:spTree>
-      <p:nvGrpSpPr>
-        <p:cNvPr id="1" name=""/>
-        <p:cNvGrpSpPr/>
-        <p:nvPr/>
-      </p:nvGrpSpPr>
-      <p:grpSpPr>
-        <a:xfrm>
-          <a:off x="0" y="0"/>
-          <a:ext cx="0" cy="0"/>
-          <a:chOff x="0" y="0"/>
-          <a:chExt cx="0" cy="0"/>
-        </a:xfrm>
-      </p:grpSpPr>
-      <p:sp>
-        <p:nvSpPr>
-          <p:cNvPr id="2" name="Slide Image Placeholder 1"/>
-          <p:cNvSpPr>
-            <a:spLocks noGrp="1" noRot="1" noChangeAspect="1"/>
-          </p:cNvSpPr>
-          <p:nvPr>
-            <p:ph type="sldImg"/>
-          </p:nvPr>
-        </p:nvSpPr>
-        <p:spPr/>
-      </p:sp>
-      <p:sp>
-        <p:nvSpPr>
-          <p:cNvPr id="3" name="Notes Placeholder 2"/>
-          <p:cNvSpPr>
-            <a:spLocks noGrp="1"/>
-          </p:cNvSpPr>
-          <p:nvPr>
-            <p:ph type="body" idx="1"/>
-          </p:nvPr>
-        </p:nvSpPr>
-        <p:spPr/>
-        <p:txBody>
-          <a:bodyPr/>
-          <a:lstStyle/>
-          <a:p>
-            <a:endParaRPr lang="en-US" dirty="0"/>
-          </a:p>
-        </p:txBody>
-      </p:sp>
-      <p:sp>
-        <p:nvSpPr>
-          <p:cNvPr id="4" name="Slide Number Placeholder 3"/>
-          <p:cNvSpPr>
-            <a:spLocks noGrp="1"/>
-          </p:cNvSpPr>
-          <p:nvPr>
-            <p:ph type="sldNum" sz="quarter" idx="5"/>
-          </p:nvPr>
-        </p:nvSpPr>
-        <p:spPr/>
-        <p:txBody>
-          <a:bodyPr/>
-          <a:lstStyle/>
-          <a:p>
-            <a:fld id="{C6B3AB32-59DF-41F1-9618-EDFBF5049629}" type="slidenum">
-              <a:rPr lang="en-US" smtClean="0"/>
-              <a:t>12</a:t>
-            </a:fld>
-            <a:endParaRPr lang="en-US" dirty="0"/>
-          </a:p>
-        </p:txBody>
-      </p:sp>
-    </p:spTree>
-    <p:extLst>
-      <p:ext uri="{BB962C8B-B14F-4D97-AF65-F5344CB8AC3E}">
-        <p14:creationId xmlns:p14="http://schemas.microsoft.com/office/powerpoint/2010/main" val="1046714131"/>
       </p:ext>
     </p:extLst>
   </p:cSld>
@@ -7571,7 +10273,91 @@
           <a:p>
             <a:fld id="{C6B3AB32-59DF-41F1-9618-EDFBF5049629}" type="slidenum">
               <a:rPr lang="en-US" smtClean="0"/>
-              <a:t>15</a:t>
+              <a:t>14</a:t>
+            </a:fld>
+            <a:endParaRPr lang="en-US" dirty="0"/>
+          </a:p>
+        </p:txBody>
+      </p:sp>
+    </p:spTree>
+    <p:extLst>
+      <p:ext uri="{BB962C8B-B14F-4D97-AF65-F5344CB8AC3E}">
+        <p14:creationId xmlns:p14="http://schemas.microsoft.com/office/powerpoint/2010/main" val="1046714131"/>
+      </p:ext>
+    </p:extLst>
+  </p:cSld>
+  <p:clrMapOvr>
+    <a:masterClrMapping/>
+  </p:clrMapOvr>
+</p:notes>
+</file>
+
+<file path=ppt/notesSlides/notesSlide6.xml><?xml version="1.0" encoding="utf-8"?>
+<p:notes xmlns:a="http://schemas.openxmlformats.org/drawingml/2006/main" xmlns:r="http://schemas.openxmlformats.org/officeDocument/2006/relationships" xmlns:p="http://schemas.openxmlformats.org/presentationml/2006/main">
+  <p:cSld>
+    <p:spTree>
+      <p:nvGrpSpPr>
+        <p:cNvPr id="1" name=""/>
+        <p:cNvGrpSpPr/>
+        <p:nvPr/>
+      </p:nvGrpSpPr>
+      <p:grpSpPr>
+        <a:xfrm>
+          <a:off x="0" y="0"/>
+          <a:ext cx="0" cy="0"/>
+          <a:chOff x="0" y="0"/>
+          <a:chExt cx="0" cy="0"/>
+        </a:xfrm>
+      </p:grpSpPr>
+      <p:sp>
+        <p:nvSpPr>
+          <p:cNvPr id="2" name="Slide Image Placeholder 1"/>
+          <p:cNvSpPr>
+            <a:spLocks noGrp="1" noRot="1" noChangeAspect="1"/>
+          </p:cNvSpPr>
+          <p:nvPr>
+            <p:ph type="sldImg"/>
+          </p:nvPr>
+        </p:nvSpPr>
+        <p:spPr/>
+      </p:sp>
+      <p:sp>
+        <p:nvSpPr>
+          <p:cNvPr id="3" name="Notes Placeholder 2"/>
+          <p:cNvSpPr>
+            <a:spLocks noGrp="1"/>
+          </p:cNvSpPr>
+          <p:nvPr>
+            <p:ph type="body" idx="1"/>
+          </p:nvPr>
+        </p:nvSpPr>
+        <p:spPr/>
+        <p:txBody>
+          <a:bodyPr/>
+          <a:lstStyle/>
+          <a:p>
+            <a:endParaRPr lang="en-US" dirty="0"/>
+          </a:p>
+        </p:txBody>
+      </p:sp>
+      <p:sp>
+        <p:nvSpPr>
+          <p:cNvPr id="4" name="Slide Number Placeholder 3"/>
+          <p:cNvSpPr>
+            <a:spLocks noGrp="1"/>
+          </p:cNvSpPr>
+          <p:nvPr>
+            <p:ph type="sldNum" sz="quarter" idx="5"/>
+          </p:nvPr>
+        </p:nvSpPr>
+        <p:spPr/>
+        <p:txBody>
+          <a:bodyPr/>
+          <a:lstStyle/>
+          <a:p>
+            <a:fld id="{C6B3AB32-59DF-41F1-9618-EDFBF5049629}" type="slidenum">
+              <a:rPr lang="en-US" smtClean="0"/>
+              <a:t>17</a:t>
             </a:fld>
             <a:endParaRPr lang="en-US" dirty="0"/>
           </a:p>
@@ -11798,13 +14584,13 @@
   <p:clrMapOvr>
     <a:masterClrMapping/>
   </p:clrMapOvr>
-  <mc:AlternateContent xmlns:mc="http://schemas.openxmlformats.org/markup-compatibility/2006">
-    <mc:Choice xmlns:p159="http://schemas.microsoft.com/office/powerpoint/2015/09/main" Requires="p159">
+  <mc:AlternateContent xmlns:mc="http://schemas.openxmlformats.org/markup-compatibility/2006" xmlns:p159="http://schemas.microsoft.com/office/powerpoint/2015/09/main">
+    <mc:Choice Requires="p159">
       <p:transition xmlns:p14="http://schemas.microsoft.com/office/powerpoint/2010/main" spd="slow" p14:dur="2000">
         <p159:morph option="byObject"/>
       </p:transition>
     </mc:Choice>
-    <mc:Fallback>
+    <mc:Fallback xmlns="">
       <p:transition spd="slow">
         <p:fade/>
       </p:transition>
@@ -11814,6 +14600,206 @@
 </file>
 
 <file path=ppt/slides/slide10.xml><?xml version="1.0" encoding="utf-8"?>
+<p:sld xmlns:a="http://schemas.openxmlformats.org/drawingml/2006/main" xmlns:r="http://schemas.openxmlformats.org/officeDocument/2006/relationships" xmlns:p="http://schemas.openxmlformats.org/presentationml/2006/main">
+  <p:cSld>
+    <p:spTree>
+      <p:nvGrpSpPr>
+        <p:cNvPr id="1" name=""/>
+        <p:cNvGrpSpPr/>
+        <p:nvPr/>
+      </p:nvGrpSpPr>
+      <p:grpSpPr>
+        <a:xfrm>
+          <a:off x="0" y="0"/>
+          <a:ext cx="0" cy="0"/>
+          <a:chOff x="0" y="0"/>
+          <a:chExt cx="0" cy="0"/>
+        </a:xfrm>
+      </p:grpSpPr>
+      <p:sp>
+        <p:nvSpPr>
+          <p:cNvPr id="4" name="Title 3">
+            <a:extLst>
+              <a:ext uri="{FF2B5EF4-FFF2-40B4-BE49-F238E27FC236}">
+                <a16:creationId xmlns:a16="http://schemas.microsoft.com/office/drawing/2014/main" id="{DB056804-DCC2-473D-8229-101CED2564CC}"/>
+              </a:ext>
+            </a:extLst>
+          </p:cNvPr>
+          <p:cNvSpPr>
+            <a:spLocks noGrp="1"/>
+          </p:cNvSpPr>
+          <p:nvPr>
+            <p:ph type="title"/>
+          </p:nvPr>
+        </p:nvSpPr>
+        <p:spPr/>
+        <p:txBody>
+          <a:bodyPr/>
+          <a:lstStyle/>
+          <a:p>
+            <a:r>
+              <a:rPr lang="en-US" dirty="0"/>
+              <a:t>Crawling – explore Sitemap</a:t>
+            </a:r>
+          </a:p>
+        </p:txBody>
+      </p:sp>
+      <p:pic>
+        <p:nvPicPr>
+          <p:cNvPr id="7" name="Picture 6">
+            <a:extLst>
+              <a:ext uri="{FF2B5EF4-FFF2-40B4-BE49-F238E27FC236}">
+                <a16:creationId xmlns:a16="http://schemas.microsoft.com/office/drawing/2014/main" id="{0A11F817-EBE2-48C8-A946-C3426EA2B920}"/>
+              </a:ext>
+            </a:extLst>
+          </p:cNvPr>
+          <p:cNvPicPr>
+            <a:picLocks noChangeAspect="1"/>
+          </p:cNvPicPr>
+          <p:nvPr/>
+        </p:nvPicPr>
+        <p:blipFill>
+          <a:blip r:embed="rId2"/>
+          <a:stretch>
+            <a:fillRect/>
+          </a:stretch>
+        </p:blipFill>
+        <p:spPr>
+          <a:xfrm>
+            <a:off x="4772121" y="1899820"/>
+            <a:ext cx="2647757" cy="4958179"/>
+          </a:xfrm>
+          <a:prstGeom prst="rect">
+            <a:avLst/>
+          </a:prstGeom>
+        </p:spPr>
+      </p:pic>
+    </p:spTree>
+    <p:extLst>
+      <p:ext uri="{BB962C8B-B14F-4D97-AF65-F5344CB8AC3E}">
+        <p14:creationId xmlns:p14="http://schemas.microsoft.com/office/powerpoint/2010/main" val="1173577491"/>
+      </p:ext>
+    </p:extLst>
+  </p:cSld>
+  <p:clrMapOvr>
+    <a:masterClrMapping/>
+  </p:clrMapOvr>
+  <mc:AlternateContent xmlns:mc="http://schemas.openxmlformats.org/markup-compatibility/2006" xmlns:p159="http://schemas.microsoft.com/office/powerpoint/2015/09/main">
+    <mc:Choice Requires="p159">
+      <p:transition xmlns:p14="http://schemas.microsoft.com/office/powerpoint/2010/main" spd="slow" p14:dur="2000">
+        <p159:morph option="byObject"/>
+      </p:transition>
+    </mc:Choice>
+    <mc:Fallback xmlns="">
+      <p:transition spd="slow">
+        <p:fade/>
+      </p:transition>
+    </mc:Fallback>
+  </mc:AlternateContent>
+</p:sld>
+</file>
+
+<file path=ppt/slides/slide11.xml><?xml version="1.0" encoding="utf-8"?>
+<p:sld xmlns:a="http://schemas.openxmlformats.org/drawingml/2006/main" xmlns:r="http://schemas.openxmlformats.org/officeDocument/2006/relationships" xmlns:p="http://schemas.openxmlformats.org/presentationml/2006/main">
+  <p:cSld>
+    <p:spTree>
+      <p:nvGrpSpPr>
+        <p:cNvPr id="1" name=""/>
+        <p:cNvGrpSpPr/>
+        <p:nvPr/>
+      </p:nvGrpSpPr>
+      <p:grpSpPr>
+        <a:xfrm>
+          <a:off x="0" y="0"/>
+          <a:ext cx="0" cy="0"/>
+          <a:chOff x="0" y="0"/>
+          <a:chExt cx="0" cy="0"/>
+        </a:xfrm>
+      </p:grpSpPr>
+      <p:sp>
+        <p:nvSpPr>
+          <p:cNvPr id="4" name="Title 3">
+            <a:extLst>
+              <a:ext uri="{FF2B5EF4-FFF2-40B4-BE49-F238E27FC236}">
+                <a16:creationId xmlns:a16="http://schemas.microsoft.com/office/drawing/2014/main" id="{DB056804-DCC2-473D-8229-101CED2564CC}"/>
+              </a:ext>
+            </a:extLst>
+          </p:cNvPr>
+          <p:cNvSpPr>
+            <a:spLocks noGrp="1"/>
+          </p:cNvSpPr>
+          <p:nvPr>
+            <p:ph type="title"/>
+          </p:nvPr>
+        </p:nvSpPr>
+        <p:spPr/>
+        <p:txBody>
+          <a:bodyPr/>
+          <a:lstStyle/>
+          <a:p>
+            <a:r>
+              <a:rPr lang="en-US" dirty="0"/>
+              <a:t>Crawling – explore BY FOLLOWING</a:t>
+            </a:r>
+          </a:p>
+        </p:txBody>
+      </p:sp>
+      <p:pic>
+        <p:nvPicPr>
+          <p:cNvPr id="5" name="Picture 4">
+            <a:extLst>
+              <a:ext uri="{FF2B5EF4-FFF2-40B4-BE49-F238E27FC236}">
+                <a16:creationId xmlns:a16="http://schemas.microsoft.com/office/drawing/2014/main" id="{01E1B4B7-7FC5-4F07-A027-C1398A85125D}"/>
+              </a:ext>
+            </a:extLst>
+          </p:cNvPr>
+          <p:cNvPicPr>
+            <a:picLocks noChangeAspect="1"/>
+          </p:cNvPicPr>
+          <p:nvPr/>
+        </p:nvPicPr>
+        <p:blipFill>
+          <a:blip r:embed="rId2"/>
+          <a:stretch>
+            <a:fillRect/>
+          </a:stretch>
+        </p:blipFill>
+        <p:spPr>
+          <a:xfrm>
+            <a:off x="4978367" y="1890944"/>
+            <a:ext cx="2235265" cy="4934192"/>
+          </a:xfrm>
+          <a:prstGeom prst="rect">
+            <a:avLst/>
+          </a:prstGeom>
+        </p:spPr>
+      </p:pic>
+    </p:spTree>
+    <p:extLst>
+      <p:ext uri="{BB962C8B-B14F-4D97-AF65-F5344CB8AC3E}">
+        <p14:creationId xmlns:p14="http://schemas.microsoft.com/office/powerpoint/2010/main" val="2695168328"/>
+      </p:ext>
+    </p:extLst>
+  </p:cSld>
+  <p:clrMapOvr>
+    <a:masterClrMapping/>
+  </p:clrMapOvr>
+  <mc:AlternateContent xmlns:mc="http://schemas.openxmlformats.org/markup-compatibility/2006" xmlns:p159="http://schemas.microsoft.com/office/powerpoint/2015/09/main">
+    <mc:Choice Requires="p159">
+      <p:transition xmlns:p14="http://schemas.microsoft.com/office/powerpoint/2010/main" spd="slow" p14:dur="2000">
+        <p159:morph option="byObject"/>
+      </p:transition>
+    </mc:Choice>
+    <mc:Fallback xmlns="">
+      <p:transition spd="slow">
+        <p:fade/>
+      </p:transition>
+    </mc:Fallback>
+  </mc:AlternateContent>
+</p:sld>
+</file>
+
+<file path=ppt/slides/slide12.xml><?xml version="1.0" encoding="utf-8"?>
 <p:sld xmlns:a="http://schemas.openxmlformats.org/drawingml/2006/main" xmlns:r="http://schemas.openxmlformats.org/officeDocument/2006/relationships" xmlns:p="http://schemas.openxmlformats.org/presentationml/2006/main">
   <p:cSld>
     <p:spTree>
@@ -11899,13 +14885,13 @@
   <p:clrMapOvr>
     <a:masterClrMapping/>
   </p:clrMapOvr>
-  <mc:AlternateContent xmlns:mc="http://schemas.openxmlformats.org/markup-compatibility/2006">
-    <mc:Choice xmlns:p159="http://schemas.microsoft.com/office/powerpoint/2015/09/main" Requires="p159">
+  <mc:AlternateContent xmlns:mc="http://schemas.openxmlformats.org/markup-compatibility/2006" xmlns:p159="http://schemas.microsoft.com/office/powerpoint/2015/09/main">
+    <mc:Choice Requires="p159">
       <p:transition xmlns:p14="http://schemas.microsoft.com/office/powerpoint/2010/main" spd="slow" p14:dur="2000">
         <p159:morph option="byObject"/>
       </p:transition>
     </mc:Choice>
-    <mc:Fallback>
+    <mc:Fallback xmlns="">
       <p:transition spd="slow">
         <p:fade/>
       </p:transition>
@@ -11914,7 +14900,7 @@
 </p:sld>
 </file>
 
-<file path=ppt/slides/slide11.xml><?xml version="1.0" encoding="utf-8"?>
+<file path=ppt/slides/slide13.xml><?xml version="1.0" encoding="utf-8"?>
 <p:sld xmlns:a="http://schemas.openxmlformats.org/drawingml/2006/main" xmlns:r="http://schemas.openxmlformats.org/officeDocument/2006/relationships" xmlns:p="http://schemas.openxmlformats.org/presentationml/2006/main">
   <p:cSld>
     <p:bg>
@@ -11983,13 +14969,13 @@
   <p:clrMapOvr>
     <a:masterClrMapping/>
   </p:clrMapOvr>
-  <mc:AlternateContent xmlns:mc="http://schemas.openxmlformats.org/markup-compatibility/2006">
-    <mc:Choice xmlns:p159="http://schemas.microsoft.com/office/powerpoint/2015/09/main" Requires="p159">
+  <mc:AlternateContent xmlns:mc="http://schemas.openxmlformats.org/markup-compatibility/2006" xmlns:p159="http://schemas.microsoft.com/office/powerpoint/2015/09/main">
+    <mc:Choice Requires="p159">
       <p:transition xmlns:p14="http://schemas.microsoft.com/office/powerpoint/2010/main" spd="slow" p14:dur="2000">
         <p159:morph option="byObject"/>
       </p:transition>
     </mc:Choice>
-    <mc:Fallback>
+    <mc:Fallback xmlns="">
       <p:transition spd="slow">
         <p:fade/>
       </p:transition>
@@ -11998,7 +14984,7 @@
 </p:sld>
 </file>
 
-<file path=ppt/slides/slide12.xml><?xml version="1.0" encoding="utf-8"?>
+<file path=ppt/slides/slide14.xml><?xml version="1.0" encoding="utf-8"?>
 <p:sld xmlns:a="http://schemas.openxmlformats.org/drawingml/2006/main" xmlns:r="http://schemas.openxmlformats.org/officeDocument/2006/relationships" xmlns:p="http://schemas.openxmlformats.org/presentationml/2006/main">
   <p:cSld>
     <p:bg>
@@ -12471,13 +15457,13 @@
   <p:clrMapOvr>
     <a:masterClrMapping/>
   </p:clrMapOvr>
-  <mc:AlternateContent xmlns:mc="http://schemas.openxmlformats.org/markup-compatibility/2006">
-    <mc:Choice xmlns:p159="http://schemas.microsoft.com/office/powerpoint/2015/09/main" Requires="p159">
+  <mc:AlternateContent xmlns:mc="http://schemas.openxmlformats.org/markup-compatibility/2006" xmlns:p159="http://schemas.microsoft.com/office/powerpoint/2015/09/main">
+    <mc:Choice Requires="p159">
       <p:transition xmlns:p14="http://schemas.microsoft.com/office/powerpoint/2010/main" spd="slow" p14:dur="2000">
         <p159:morph option="byObject"/>
       </p:transition>
     </mc:Choice>
-    <mc:Fallback>
+    <mc:Fallback xmlns="">
       <p:transition spd="slow">
         <p:fade/>
       </p:transition>
@@ -12486,7 +15472,7 @@
 </p:sld>
 </file>
 
-<file path=ppt/slides/slide13.xml><?xml version="1.0" encoding="utf-8"?>
+<file path=ppt/slides/slide15.xml><?xml version="1.0" encoding="utf-8"?>
 <p:sld xmlns:a="http://schemas.openxmlformats.org/drawingml/2006/main" xmlns:r="http://schemas.openxmlformats.org/officeDocument/2006/relationships" xmlns:p="http://schemas.openxmlformats.org/presentationml/2006/main">
   <p:cSld>
     <p:spTree>
@@ -12563,13 +15549,13 @@
   <p:clrMapOvr>
     <a:masterClrMapping/>
   </p:clrMapOvr>
-  <mc:AlternateContent xmlns:mc="http://schemas.openxmlformats.org/markup-compatibility/2006">
-    <mc:Choice xmlns:p159="http://schemas.microsoft.com/office/powerpoint/2015/09/main" Requires="p159">
+  <mc:AlternateContent xmlns:mc="http://schemas.openxmlformats.org/markup-compatibility/2006" xmlns:p159="http://schemas.microsoft.com/office/powerpoint/2015/09/main">
+    <mc:Choice Requires="p159">
       <p:transition xmlns:p14="http://schemas.microsoft.com/office/powerpoint/2010/main" spd="slow" p14:dur="2000">
         <p159:morph option="byObject"/>
       </p:transition>
     </mc:Choice>
-    <mc:Fallback>
+    <mc:Fallback xmlns="">
       <p:transition spd="slow">
         <p:fade/>
       </p:transition>
@@ -12578,7 +15564,7 @@
 </p:sld>
 </file>
 
-<file path=ppt/slides/slide14.xml><?xml version="1.0" encoding="utf-8"?>
+<file path=ppt/slides/slide16.xml><?xml version="1.0" encoding="utf-8"?>
 <p:sld xmlns:a="http://schemas.openxmlformats.org/drawingml/2006/main" xmlns:r="http://schemas.openxmlformats.org/officeDocument/2006/relationships" xmlns:p="http://schemas.openxmlformats.org/presentationml/2006/main">
   <p:cSld>
     <p:spTree>
@@ -12655,13 +15641,13 @@
   <p:clrMapOvr>
     <a:masterClrMapping/>
   </p:clrMapOvr>
-  <mc:AlternateContent xmlns:mc="http://schemas.openxmlformats.org/markup-compatibility/2006">
-    <mc:Choice xmlns:p159="http://schemas.microsoft.com/office/powerpoint/2015/09/main" Requires="p159">
+  <mc:AlternateContent xmlns:mc="http://schemas.openxmlformats.org/markup-compatibility/2006" xmlns:p159="http://schemas.microsoft.com/office/powerpoint/2015/09/main">
+    <mc:Choice Requires="p159">
       <p:transition xmlns:p14="http://schemas.microsoft.com/office/powerpoint/2010/main" spd="slow" p14:dur="2000">
         <p159:morph option="byObject"/>
       </p:transition>
     </mc:Choice>
-    <mc:Fallback>
+    <mc:Fallback xmlns="">
       <p:transition spd="slow">
         <p:fade/>
       </p:transition>
@@ -12670,7 +15656,7 @@
 </p:sld>
 </file>
 
-<file path=ppt/slides/slide15.xml><?xml version="1.0" encoding="utf-8"?>
+<file path=ppt/slides/slide17.xml><?xml version="1.0" encoding="utf-8"?>
 <p:sld xmlns:a="http://schemas.openxmlformats.org/drawingml/2006/main" xmlns:r="http://schemas.openxmlformats.org/officeDocument/2006/relationships" xmlns:p="http://schemas.openxmlformats.org/presentationml/2006/main">
   <p:cSld>
     <p:bg>
@@ -13057,13 +16043,13 @@
   <p:clrMapOvr>
     <a:masterClrMapping/>
   </p:clrMapOvr>
-  <mc:AlternateContent xmlns:mc="http://schemas.openxmlformats.org/markup-compatibility/2006">
-    <mc:Choice xmlns:p159="http://schemas.microsoft.com/office/powerpoint/2015/09/main" Requires="p159">
+  <mc:AlternateContent xmlns:mc="http://schemas.openxmlformats.org/markup-compatibility/2006" xmlns:p159="http://schemas.microsoft.com/office/powerpoint/2015/09/main">
+    <mc:Choice Requires="p159">
       <p:transition xmlns:p14="http://schemas.microsoft.com/office/powerpoint/2010/main" spd="slow" p14:dur="2000">
         <p159:morph option="byObject"/>
       </p:transition>
     </mc:Choice>
-    <mc:Fallback>
+    <mc:Fallback xmlns="">
       <p:transition spd="slow">
         <p:fade/>
       </p:transition>
@@ -13073,6 +16059,243 @@
 </file>
 
 <file path=ppt/slides/slide2.xml><?xml version="1.0" encoding="utf-8"?>
+<p:sld xmlns:a="http://schemas.openxmlformats.org/drawingml/2006/main" xmlns:r="http://schemas.openxmlformats.org/officeDocument/2006/relationships" xmlns:p="http://schemas.openxmlformats.org/presentationml/2006/main">
+  <p:cSld>
+    <p:spTree>
+      <p:nvGrpSpPr>
+        <p:cNvPr id="1" name=""/>
+        <p:cNvGrpSpPr/>
+        <p:nvPr/>
+      </p:nvGrpSpPr>
+      <p:grpSpPr>
+        <a:xfrm>
+          <a:off x="0" y="0"/>
+          <a:ext cx="0" cy="0"/>
+          <a:chOff x="0" y="0"/>
+          <a:chExt cx="0" cy="0"/>
+        </a:xfrm>
+      </p:grpSpPr>
+      <p:sp>
+        <p:nvSpPr>
+          <p:cNvPr id="4" name="Title 3">
+            <a:extLst>
+              <a:ext uri="{FF2B5EF4-FFF2-40B4-BE49-F238E27FC236}">
+                <a16:creationId xmlns:a16="http://schemas.microsoft.com/office/drawing/2014/main" id="{DB056804-DCC2-473D-8229-101CED2564CC}"/>
+              </a:ext>
+            </a:extLst>
+          </p:cNvPr>
+          <p:cNvSpPr>
+            <a:spLocks noGrp="1"/>
+          </p:cNvSpPr>
+          <p:nvPr>
+            <p:ph type="title"/>
+          </p:nvPr>
+        </p:nvSpPr>
+        <p:spPr/>
+        <p:txBody>
+          <a:bodyPr/>
+          <a:lstStyle/>
+          <a:p>
+            <a:r>
+              <a:rPr lang="en-US" dirty="0"/>
+              <a:t>CORE MEMBERS</a:t>
+            </a:r>
+          </a:p>
+        </p:txBody>
+      </p:sp>
+      <p:graphicFrame>
+        <p:nvGraphicFramePr>
+          <p:cNvPr id="10" name="Content Placeholder 3" descr="icon SmartArt graphic">
+            <a:extLst>
+              <a:ext uri="{FF2B5EF4-FFF2-40B4-BE49-F238E27FC236}">
+                <a16:creationId xmlns:a16="http://schemas.microsoft.com/office/drawing/2014/main" id="{34C6D995-4E02-4B01-A6BC-696484E5709C}"/>
+              </a:ext>
+            </a:extLst>
+          </p:cNvPr>
+          <p:cNvGraphicFramePr>
+            <a:graphicFrameLocks noGrp="1"/>
+          </p:cNvGraphicFramePr>
+          <p:nvPr>
+            <p:ph idx="1"/>
+            <p:extLst>
+              <p:ext uri="{D42A27DB-BD31-4B8C-83A1-F6EECF244321}">
+                <p14:modId xmlns:p14="http://schemas.microsoft.com/office/powerpoint/2010/main" val="2880866509"/>
+              </p:ext>
+            </p:extLst>
+          </p:nvPr>
+        </p:nvGraphicFramePr>
+        <p:xfrm>
+          <a:off x="581192" y="2194639"/>
+          <a:ext cx="10906125" cy="3961205"/>
+        </p:xfrm>
+        <a:graphic>
+          <a:graphicData uri="http://schemas.openxmlformats.org/drawingml/2006/diagram">
+            <dgm:relIds xmlns:dgm="http://schemas.openxmlformats.org/drawingml/2006/diagram" xmlns:r="http://schemas.openxmlformats.org/officeDocument/2006/relationships" r:dm="rId3" r:lo="rId4" r:qs="rId5" r:cs="rId6"/>
+          </a:graphicData>
+        </a:graphic>
+      </p:graphicFrame>
+    </p:spTree>
+    <p:extLst>
+      <p:ext uri="{BB962C8B-B14F-4D97-AF65-F5344CB8AC3E}">
+        <p14:creationId xmlns:p14="http://schemas.microsoft.com/office/powerpoint/2010/main" val="1126181290"/>
+      </p:ext>
+    </p:extLst>
+  </p:cSld>
+  <p:clrMapOvr>
+    <a:masterClrMapping/>
+  </p:clrMapOvr>
+  <mc:AlternateContent xmlns:mc="http://schemas.openxmlformats.org/markup-compatibility/2006" xmlns:p159="http://schemas.microsoft.com/office/powerpoint/2015/09/main">
+    <mc:Choice Requires="p159">
+      <p:transition xmlns:p14="http://schemas.microsoft.com/office/powerpoint/2010/main" spd="slow" p14:dur="2000">
+        <p159:morph option="byObject"/>
+      </p:transition>
+    </mc:Choice>
+    <mc:Fallback xmlns="">
+      <p:transition spd="slow">
+        <p:fade/>
+      </p:transition>
+    </mc:Fallback>
+  </mc:AlternateContent>
+</p:sld>
+</file>
+
+<file path=ppt/slides/slide3.xml><?xml version="1.0" encoding="utf-8"?>
+<p:sld xmlns:a="http://schemas.openxmlformats.org/drawingml/2006/main" xmlns:r="http://schemas.openxmlformats.org/officeDocument/2006/relationships" xmlns:p="http://schemas.openxmlformats.org/presentationml/2006/main">
+  <p:cSld>
+    <p:spTree>
+      <p:nvGrpSpPr>
+        <p:cNvPr id="1" name=""/>
+        <p:cNvGrpSpPr/>
+        <p:nvPr/>
+      </p:nvGrpSpPr>
+      <p:grpSpPr>
+        <a:xfrm>
+          <a:off x="0" y="0"/>
+          <a:ext cx="0" cy="0"/>
+          <a:chOff x="0" y="0"/>
+          <a:chExt cx="0" cy="0"/>
+        </a:xfrm>
+      </p:grpSpPr>
+      <p:sp>
+        <p:nvSpPr>
+          <p:cNvPr id="4" name="Title 3">
+            <a:extLst>
+              <a:ext uri="{FF2B5EF4-FFF2-40B4-BE49-F238E27FC236}">
+                <a16:creationId xmlns:a16="http://schemas.microsoft.com/office/drawing/2014/main" id="{DB056804-DCC2-473D-8229-101CED2564CC}"/>
+              </a:ext>
+            </a:extLst>
+          </p:cNvPr>
+          <p:cNvSpPr>
+            <a:spLocks noGrp="1"/>
+          </p:cNvSpPr>
+          <p:nvPr>
+            <p:ph type="title"/>
+          </p:nvPr>
+        </p:nvSpPr>
+        <p:spPr/>
+        <p:txBody>
+          <a:bodyPr/>
+          <a:lstStyle/>
+          <a:p>
+            <a:r>
+              <a:rPr lang="en-US" dirty="0"/>
+              <a:t>Content</a:t>
+            </a:r>
+          </a:p>
+        </p:txBody>
+      </p:sp>
+      <p:sp>
+        <p:nvSpPr>
+          <p:cNvPr id="3" name="Content Placeholder 2">
+            <a:extLst>
+              <a:ext uri="{FF2B5EF4-FFF2-40B4-BE49-F238E27FC236}">
+                <a16:creationId xmlns:a16="http://schemas.microsoft.com/office/drawing/2014/main" id="{BB6ABDC9-DFFA-43A9-8D3F-7AF9A8BE8A97}"/>
+              </a:ext>
+            </a:extLst>
+          </p:cNvPr>
+          <p:cNvSpPr>
+            <a:spLocks noGrp="1"/>
+          </p:cNvSpPr>
+          <p:nvPr>
+            <p:ph idx="1"/>
+          </p:nvPr>
+        </p:nvSpPr>
+        <p:spPr/>
+        <p:txBody>
+          <a:bodyPr anchor="t"/>
+          <a:lstStyle/>
+          <a:p>
+            <a:pPr>
+              <a:lnSpc>
+                <a:spcPct val="200000"/>
+              </a:lnSpc>
+            </a:pPr>
+            <a:r>
+              <a:rPr lang="en-US" dirty="0"/>
+              <a:t>System Architecture</a:t>
+            </a:r>
+          </a:p>
+          <a:p>
+            <a:pPr>
+              <a:lnSpc>
+                <a:spcPct val="200000"/>
+              </a:lnSpc>
+            </a:pPr>
+            <a:r>
+              <a:rPr lang="en-US" dirty="0"/>
+              <a:t>Model</a:t>
+            </a:r>
+          </a:p>
+          <a:p>
+            <a:pPr>
+              <a:lnSpc>
+                <a:spcPct val="200000"/>
+              </a:lnSpc>
+            </a:pPr>
+            <a:r>
+              <a:rPr lang="en-US" dirty="0"/>
+              <a:t>Processes</a:t>
+            </a:r>
+          </a:p>
+          <a:p>
+            <a:pPr>
+              <a:lnSpc>
+                <a:spcPct val="200000"/>
+              </a:lnSpc>
+            </a:pPr>
+            <a:r>
+              <a:rPr lang="en-US" dirty="0"/>
+              <a:t>Demo</a:t>
+            </a:r>
+          </a:p>
+        </p:txBody>
+      </p:sp>
+    </p:spTree>
+    <p:extLst>
+      <p:ext uri="{BB962C8B-B14F-4D97-AF65-F5344CB8AC3E}">
+        <p14:creationId xmlns:p14="http://schemas.microsoft.com/office/powerpoint/2010/main" val="814285861"/>
+      </p:ext>
+    </p:extLst>
+  </p:cSld>
+  <p:clrMapOvr>
+    <a:masterClrMapping/>
+  </p:clrMapOvr>
+  <mc:AlternateContent xmlns:mc="http://schemas.openxmlformats.org/markup-compatibility/2006" xmlns:p159="http://schemas.microsoft.com/office/powerpoint/2015/09/main">
+    <mc:Choice Requires="p159">
+      <p:transition xmlns:p14="http://schemas.microsoft.com/office/powerpoint/2010/main" spd="slow" p14:dur="2000">
+        <p159:morph option="byObject"/>
+      </p:transition>
+    </mc:Choice>
+    <mc:Fallback xmlns="">
+      <p:transition spd="slow">
+        <p:fade/>
+      </p:transition>
+    </mc:Fallback>
+  </mc:AlternateContent>
+</p:sld>
+</file>
+
+<file path=ppt/slides/slide4.xml><?xml version="1.0" encoding="utf-8"?>
 <p:sld xmlns:a="http://schemas.openxmlformats.org/drawingml/2006/main" xmlns:r="http://schemas.openxmlformats.org/officeDocument/2006/relationships" xmlns:p="http://schemas.openxmlformats.org/presentationml/2006/main">
   <p:cSld>
     <p:bg>
@@ -13160,13 +16383,13 @@
   <p:clrMapOvr>
     <a:masterClrMapping/>
   </p:clrMapOvr>
-  <mc:AlternateContent xmlns:mc="http://schemas.openxmlformats.org/markup-compatibility/2006">
-    <mc:Choice xmlns:p159="http://schemas.microsoft.com/office/powerpoint/2015/09/main" Requires="p159">
+  <mc:AlternateContent xmlns:mc="http://schemas.openxmlformats.org/markup-compatibility/2006" xmlns:p159="http://schemas.microsoft.com/office/powerpoint/2015/09/main">
+    <mc:Choice Requires="p159">
       <p:transition xmlns:p14="http://schemas.microsoft.com/office/powerpoint/2010/main" spd="slow" p14:dur="2000">
         <p159:morph option="byObject"/>
       </p:transition>
     </mc:Choice>
-    <mc:Fallback>
+    <mc:Fallback xmlns="">
       <p:transition spd="slow">
         <p:fade/>
       </p:transition>
@@ -13175,7 +16398,7 @@
 </p:sld>
 </file>
 
-<file path=ppt/slides/slide3.xml><?xml version="1.0" encoding="utf-8"?>
+<file path=ppt/slides/slide5.xml><?xml version="1.0" encoding="utf-8"?>
 <p:sld xmlns:a="http://schemas.openxmlformats.org/drawingml/2006/main" xmlns:r="http://schemas.openxmlformats.org/officeDocument/2006/relationships" xmlns:p="http://schemas.openxmlformats.org/presentationml/2006/main">
   <p:cSld>
     <p:spTree>
@@ -13241,12 +16464,22 @@
           <a:bodyPr anchor="t"/>
           <a:lstStyle/>
           <a:p>
+            <a:pPr>
+              <a:lnSpc>
+                <a:spcPct val="200000"/>
+              </a:lnSpc>
+            </a:pPr>
             <a:r>
               <a:rPr lang="en-US" dirty="0"/>
               <a:t>Flask Framework</a:t>
             </a:r>
           </a:p>
           <a:p>
+            <a:pPr>
+              <a:lnSpc>
+                <a:spcPct val="200000"/>
+              </a:lnSpc>
+            </a:pPr>
             <a:r>
               <a:rPr lang="en-US" dirty="0"/>
               <a:t>Graph Database (Neo4J)</a:t>
@@ -13264,13 +16497,13 @@
   <p:clrMapOvr>
     <a:masterClrMapping/>
   </p:clrMapOvr>
-  <mc:AlternateContent xmlns:mc="http://schemas.openxmlformats.org/markup-compatibility/2006">
-    <mc:Choice xmlns:p159="http://schemas.microsoft.com/office/powerpoint/2015/09/main" Requires="p159">
+  <mc:AlternateContent xmlns:mc="http://schemas.openxmlformats.org/markup-compatibility/2006" xmlns:p159="http://schemas.microsoft.com/office/powerpoint/2015/09/main">
+    <mc:Choice Requires="p159">
       <p:transition xmlns:p14="http://schemas.microsoft.com/office/powerpoint/2010/main" spd="slow" p14:dur="2000">
         <p159:morph option="byObject"/>
       </p:transition>
     </mc:Choice>
-    <mc:Fallback>
+    <mc:Fallback xmlns="">
       <p:transition spd="slow">
         <p:fade/>
       </p:transition>
@@ -13279,7 +16512,7 @@
 </p:sld>
 </file>
 
-<file path=ppt/slides/slide4.xml><?xml version="1.0" encoding="utf-8"?>
+<file path=ppt/slides/slide6.xml><?xml version="1.0" encoding="utf-8"?>
 <p:sld xmlns:a="http://schemas.openxmlformats.org/drawingml/2006/main" xmlns:r="http://schemas.openxmlformats.org/officeDocument/2006/relationships" xmlns:p="http://schemas.openxmlformats.org/presentationml/2006/main">
   <p:cSld>
     <p:spTree>
@@ -13360,13 +16593,13 @@
   <p:clrMapOvr>
     <a:masterClrMapping/>
   </p:clrMapOvr>
-  <mc:AlternateContent xmlns:mc="http://schemas.openxmlformats.org/markup-compatibility/2006">
-    <mc:Choice xmlns:p159="http://schemas.microsoft.com/office/powerpoint/2015/09/main" Requires="p159">
+  <mc:AlternateContent xmlns:mc="http://schemas.openxmlformats.org/markup-compatibility/2006" xmlns:p159="http://schemas.microsoft.com/office/powerpoint/2015/09/main">
+    <mc:Choice Requires="p159">
       <p:transition xmlns:p14="http://schemas.microsoft.com/office/powerpoint/2010/main" spd="slow" p14:dur="2000">
         <p159:morph option="byObject"/>
       </p:transition>
     </mc:Choice>
-    <mc:Fallback>
+    <mc:Fallback xmlns="">
       <p:transition spd="slow">
         <p:fade/>
       </p:transition>
@@ -13375,7 +16608,7 @@
 </p:sld>
 </file>
 
-<file path=ppt/slides/slide5.xml><?xml version="1.0" encoding="utf-8"?>
+<file path=ppt/slides/slide7.xml><?xml version="1.0" encoding="utf-8"?>
 <p:sld xmlns:a="http://schemas.openxmlformats.org/drawingml/2006/main" xmlns:r="http://schemas.openxmlformats.org/officeDocument/2006/relationships" xmlns:p="http://schemas.openxmlformats.org/presentationml/2006/main">
   <p:cSld>
     <p:spTree>
@@ -13455,13 +16688,13 @@
   <p:clrMapOvr>
     <a:masterClrMapping/>
   </p:clrMapOvr>
-  <mc:AlternateContent xmlns:mc="http://schemas.openxmlformats.org/markup-compatibility/2006">
-    <mc:Choice xmlns:p159="http://schemas.microsoft.com/office/powerpoint/2015/09/main" Requires="p159">
+  <mc:AlternateContent xmlns:mc="http://schemas.openxmlformats.org/markup-compatibility/2006" xmlns:p159="http://schemas.microsoft.com/office/powerpoint/2015/09/main">
+    <mc:Choice Requires="p159">
       <p:transition xmlns:p14="http://schemas.microsoft.com/office/powerpoint/2010/main" spd="slow" p14:dur="2000">
         <p159:morph option="byObject"/>
       </p:transition>
     </mc:Choice>
-    <mc:Fallback>
+    <mc:Fallback xmlns="">
       <p:transition spd="slow">
         <p:fade/>
       </p:transition>
@@ -13470,7 +16703,7 @@
 </p:sld>
 </file>
 
-<file path=ppt/slides/slide6.xml><?xml version="1.0" encoding="utf-8"?>
+<file path=ppt/slides/slide8.xml><?xml version="1.0" encoding="utf-8"?>
 <p:sld xmlns:a="http://schemas.openxmlformats.org/drawingml/2006/main" xmlns:r="http://schemas.openxmlformats.org/officeDocument/2006/relationships" xmlns:p="http://schemas.openxmlformats.org/presentationml/2006/main">
   <p:cSld>
     <p:spTree>
@@ -13555,13 +16788,13 @@
   <p:clrMapOvr>
     <a:masterClrMapping/>
   </p:clrMapOvr>
-  <mc:AlternateContent xmlns:mc="http://schemas.openxmlformats.org/markup-compatibility/2006">
-    <mc:Choice xmlns:p159="http://schemas.microsoft.com/office/powerpoint/2015/09/main" Requires="p159">
+  <mc:AlternateContent xmlns:mc="http://schemas.openxmlformats.org/markup-compatibility/2006" xmlns:p159="http://schemas.microsoft.com/office/powerpoint/2015/09/main">
+    <mc:Choice Requires="p159">
       <p:transition xmlns:p14="http://schemas.microsoft.com/office/powerpoint/2010/main" spd="slow" p14:dur="2000">
         <p159:morph option="byObject"/>
       </p:transition>
     </mc:Choice>
-    <mc:Fallback>
+    <mc:Fallback xmlns="">
       <p:transition spd="slow">
         <p:fade/>
       </p:transition>
@@ -13570,7 +16803,7 @@
 </p:sld>
 </file>
 
-<file path=ppt/slides/slide7.xml><?xml version="1.0" encoding="utf-8"?>
+<file path=ppt/slides/slide9.xml><?xml version="1.0" encoding="utf-8"?>
 <p:sld xmlns:a="http://schemas.openxmlformats.org/drawingml/2006/main" xmlns:r="http://schemas.openxmlformats.org/officeDocument/2006/relationships" xmlns:p="http://schemas.openxmlformats.org/presentationml/2006/main">
   <p:cSld>
     <p:spTree>
@@ -13625,213 +16858,13 @@
   <p:clrMapOvr>
     <a:masterClrMapping/>
   </p:clrMapOvr>
-  <mc:AlternateContent xmlns:mc="http://schemas.openxmlformats.org/markup-compatibility/2006">
-    <mc:Choice xmlns:p159="http://schemas.microsoft.com/office/powerpoint/2015/09/main" Requires="p159">
+  <mc:AlternateContent xmlns:mc="http://schemas.openxmlformats.org/markup-compatibility/2006" xmlns:p159="http://schemas.microsoft.com/office/powerpoint/2015/09/main">
+    <mc:Choice Requires="p159">
       <p:transition xmlns:p14="http://schemas.microsoft.com/office/powerpoint/2010/main" spd="slow" p14:dur="2000">
         <p159:morph option="byObject"/>
       </p:transition>
     </mc:Choice>
-    <mc:Fallback>
-      <p:transition spd="slow">
-        <p:fade/>
-      </p:transition>
-    </mc:Fallback>
-  </mc:AlternateContent>
-</p:sld>
-</file>
-
-<file path=ppt/slides/slide8.xml><?xml version="1.0" encoding="utf-8"?>
-<p:sld xmlns:a="http://schemas.openxmlformats.org/drawingml/2006/main" xmlns:r="http://schemas.openxmlformats.org/officeDocument/2006/relationships" xmlns:p="http://schemas.openxmlformats.org/presentationml/2006/main">
-  <p:cSld>
-    <p:spTree>
-      <p:nvGrpSpPr>
-        <p:cNvPr id="1" name=""/>
-        <p:cNvGrpSpPr/>
-        <p:nvPr/>
-      </p:nvGrpSpPr>
-      <p:grpSpPr>
-        <a:xfrm>
-          <a:off x="0" y="0"/>
-          <a:ext cx="0" cy="0"/>
-          <a:chOff x="0" y="0"/>
-          <a:chExt cx="0" cy="0"/>
-        </a:xfrm>
-      </p:grpSpPr>
-      <p:sp>
-        <p:nvSpPr>
-          <p:cNvPr id="4" name="Title 3">
-            <a:extLst>
-              <a:ext uri="{FF2B5EF4-FFF2-40B4-BE49-F238E27FC236}">
-                <a16:creationId xmlns:a16="http://schemas.microsoft.com/office/drawing/2014/main" id="{DB056804-DCC2-473D-8229-101CED2564CC}"/>
-              </a:ext>
-            </a:extLst>
-          </p:cNvPr>
-          <p:cNvSpPr>
-            <a:spLocks noGrp="1"/>
-          </p:cNvSpPr>
-          <p:nvPr>
-            <p:ph type="title"/>
-          </p:nvPr>
-        </p:nvSpPr>
-        <p:spPr/>
-        <p:txBody>
-          <a:bodyPr/>
-          <a:lstStyle/>
-          <a:p>
-            <a:r>
-              <a:rPr lang="en-US" dirty="0"/>
-              <a:t>Crawling – explore Sitemap</a:t>
-            </a:r>
-          </a:p>
-        </p:txBody>
-      </p:sp>
-      <p:pic>
-        <p:nvPicPr>
-          <p:cNvPr id="7" name="Picture 6">
-            <a:extLst>
-              <a:ext uri="{FF2B5EF4-FFF2-40B4-BE49-F238E27FC236}">
-                <a16:creationId xmlns:a16="http://schemas.microsoft.com/office/drawing/2014/main" id="{0A11F817-EBE2-48C8-A946-C3426EA2B920}"/>
-              </a:ext>
-            </a:extLst>
-          </p:cNvPr>
-          <p:cNvPicPr>
-            <a:picLocks noChangeAspect="1"/>
-          </p:cNvPicPr>
-          <p:nvPr/>
-        </p:nvPicPr>
-        <p:blipFill>
-          <a:blip r:embed="rId2"/>
-          <a:stretch>
-            <a:fillRect/>
-          </a:stretch>
-        </p:blipFill>
-        <p:spPr>
-          <a:xfrm>
-            <a:off x="4772121" y="1899820"/>
-            <a:ext cx="2647757" cy="4958179"/>
-          </a:xfrm>
-          <a:prstGeom prst="rect">
-            <a:avLst/>
-          </a:prstGeom>
-        </p:spPr>
-      </p:pic>
-    </p:spTree>
-    <p:extLst>
-      <p:ext uri="{BB962C8B-B14F-4D97-AF65-F5344CB8AC3E}">
-        <p14:creationId xmlns:p14="http://schemas.microsoft.com/office/powerpoint/2010/main" val="1173577491"/>
-      </p:ext>
-    </p:extLst>
-  </p:cSld>
-  <p:clrMapOvr>
-    <a:masterClrMapping/>
-  </p:clrMapOvr>
-  <mc:AlternateContent xmlns:mc="http://schemas.openxmlformats.org/markup-compatibility/2006">
-    <mc:Choice xmlns:p159="http://schemas.microsoft.com/office/powerpoint/2015/09/main" Requires="p159">
-      <p:transition xmlns:p14="http://schemas.microsoft.com/office/powerpoint/2010/main" spd="slow" p14:dur="2000">
-        <p159:morph option="byObject"/>
-      </p:transition>
-    </mc:Choice>
-    <mc:Fallback>
-      <p:transition spd="slow">
-        <p:fade/>
-      </p:transition>
-    </mc:Fallback>
-  </mc:AlternateContent>
-</p:sld>
-</file>
-
-<file path=ppt/slides/slide9.xml><?xml version="1.0" encoding="utf-8"?>
-<p:sld xmlns:a="http://schemas.openxmlformats.org/drawingml/2006/main" xmlns:r="http://schemas.openxmlformats.org/officeDocument/2006/relationships" xmlns:p="http://schemas.openxmlformats.org/presentationml/2006/main">
-  <p:cSld>
-    <p:spTree>
-      <p:nvGrpSpPr>
-        <p:cNvPr id="1" name=""/>
-        <p:cNvGrpSpPr/>
-        <p:nvPr/>
-      </p:nvGrpSpPr>
-      <p:grpSpPr>
-        <a:xfrm>
-          <a:off x="0" y="0"/>
-          <a:ext cx="0" cy="0"/>
-          <a:chOff x="0" y="0"/>
-          <a:chExt cx="0" cy="0"/>
-        </a:xfrm>
-      </p:grpSpPr>
-      <p:sp>
-        <p:nvSpPr>
-          <p:cNvPr id="4" name="Title 3">
-            <a:extLst>
-              <a:ext uri="{FF2B5EF4-FFF2-40B4-BE49-F238E27FC236}">
-                <a16:creationId xmlns:a16="http://schemas.microsoft.com/office/drawing/2014/main" id="{DB056804-DCC2-473D-8229-101CED2564CC}"/>
-              </a:ext>
-            </a:extLst>
-          </p:cNvPr>
-          <p:cNvSpPr>
-            <a:spLocks noGrp="1"/>
-          </p:cNvSpPr>
-          <p:nvPr>
-            <p:ph type="title"/>
-          </p:nvPr>
-        </p:nvSpPr>
-        <p:spPr/>
-        <p:txBody>
-          <a:bodyPr/>
-          <a:lstStyle/>
-          <a:p>
-            <a:r>
-              <a:rPr lang="en-US" dirty="0"/>
-              <a:t>Crawling – explore BY FOLLOWING</a:t>
-            </a:r>
-          </a:p>
-        </p:txBody>
-      </p:sp>
-      <p:pic>
-        <p:nvPicPr>
-          <p:cNvPr id="5" name="Picture 4">
-            <a:extLst>
-              <a:ext uri="{FF2B5EF4-FFF2-40B4-BE49-F238E27FC236}">
-                <a16:creationId xmlns:a16="http://schemas.microsoft.com/office/drawing/2014/main" id="{01E1B4B7-7FC5-4F07-A027-C1398A85125D}"/>
-              </a:ext>
-            </a:extLst>
-          </p:cNvPr>
-          <p:cNvPicPr>
-            <a:picLocks noChangeAspect="1"/>
-          </p:cNvPicPr>
-          <p:nvPr/>
-        </p:nvPicPr>
-        <p:blipFill>
-          <a:blip r:embed="rId2"/>
-          <a:stretch>
-            <a:fillRect/>
-          </a:stretch>
-        </p:blipFill>
-        <p:spPr>
-          <a:xfrm>
-            <a:off x="4978367" y="1890944"/>
-            <a:ext cx="2235265" cy="4934192"/>
-          </a:xfrm>
-          <a:prstGeom prst="rect">
-            <a:avLst/>
-          </a:prstGeom>
-        </p:spPr>
-      </p:pic>
-    </p:spTree>
-    <p:extLst>
-      <p:ext uri="{BB962C8B-B14F-4D97-AF65-F5344CB8AC3E}">
-        <p14:creationId xmlns:p14="http://schemas.microsoft.com/office/powerpoint/2010/main" val="2695168328"/>
-      </p:ext>
-    </p:extLst>
-  </p:cSld>
-  <p:clrMapOvr>
-    <a:masterClrMapping/>
-  </p:clrMapOvr>
-  <mc:AlternateContent xmlns:mc="http://schemas.openxmlformats.org/markup-compatibility/2006">
-    <mc:Choice xmlns:p159="http://schemas.microsoft.com/office/powerpoint/2015/09/main" Requires="p159">
-      <p:transition xmlns:p14="http://schemas.microsoft.com/office/powerpoint/2010/main" spd="slow" p14:dur="2000">
-        <p159:morph option="byObject"/>
-      </p:transition>
-    </mc:Choice>
-    <mc:Fallback>
+    <mc:Fallback xmlns="">
       <p:transition spd="slow">
         <p:fade/>
       </p:transition>
@@ -14709,15 +17742,6 @@
 </file>
 
 <file path=customXml/item2.xml><?xml version="1.0" encoding="utf-8"?>
-<?mso-contentType ?>
-<FormTemplates xmlns="http://schemas.microsoft.com/sharepoint/v3/contenttype/forms">
-  <Display>DocumentLibraryForm</Display>
-  <Edit>DocumentLibraryForm</Edit>
-  <New>DocumentLibraryForm</New>
-</FormTemplates>
-</file>
-
-<file path=customXml/item3.xml><?xml version="1.0" encoding="utf-8"?>
 <ct:contentTypeSchema xmlns:ct="http://schemas.microsoft.com/office/2006/metadata/contentType" xmlns:ma="http://schemas.microsoft.com/office/2006/metadata/properties/metaAttributes" ct:_="" ma:_="" ma:contentTypeName="Document" ma:contentTypeID="0x01010079F111ED35F8CC479449609E8A0923A6" ma:contentTypeVersion="12" ma:contentTypeDescription="Create a new document." ma:contentTypeScope="" ma:versionID="93813dd7ca6ad654711aa0ab317e03a3">
   <xsd:schema xmlns:xsd="http://www.w3.org/2001/XMLSchema" xmlns:xs="http://www.w3.org/2001/XMLSchema" xmlns:p="http://schemas.microsoft.com/office/2006/metadata/properties" xmlns:ns2="71af3243-3dd4-4a8d-8c0d-dd76da1f02a5" xmlns:ns3="16c05727-aa75-4e4a-9b5f-8a80a1165891" targetNamespace="http://schemas.microsoft.com/office/2006/metadata/properties" ma:root="true" ma:fieldsID="f11dc0ce689dd3925e84e4e35398c6e7" ns2:_="" ns3:_="">
     <xsd:import namespace="71af3243-3dd4-4a8d-8c0d-dd76da1f02a5"/>
@@ -14938,6 +17962,15 @@
 </ct:contentTypeSchema>
 </file>
 
+<file path=customXml/item3.xml><?xml version="1.0" encoding="utf-8"?>
+<?mso-contentType ?>
+<FormTemplates xmlns="http://schemas.microsoft.com/sharepoint/v3/contenttype/forms">
+  <Display>DocumentLibraryForm</Display>
+  <Edit>DocumentLibraryForm</Edit>
+  <New>DocumentLibraryForm</New>
+</FormTemplates>
+</file>
+
 <file path=customXml/itemProps1.xml><?xml version="1.0" encoding="utf-8"?>
 <ds:datastoreItem xmlns:ds="http://schemas.openxmlformats.org/officeDocument/2006/customXml" ds:itemID="{55B48092-4A2C-4E16-B971-9ACADFFF69E4}">
   <ds:schemaRefs>
@@ -14949,14 +17982,6 @@
 </file>
 
 <file path=customXml/itemProps2.xml><?xml version="1.0" encoding="utf-8"?>
-<ds:datastoreItem xmlns:ds="http://schemas.openxmlformats.org/officeDocument/2006/customXml" ds:itemID="{3E586370-B0FB-4108-8B4F-329716A22E3A}">
-  <ds:schemaRefs>
-    <ds:schemaRef ds:uri="http://schemas.microsoft.com/sharepoint/v3/contenttype/forms"/>
-  </ds:schemaRefs>
-</ds:datastoreItem>
-</file>
-
-<file path=customXml/itemProps3.xml><?xml version="1.0" encoding="utf-8"?>
 <ds:datastoreItem xmlns:ds="http://schemas.openxmlformats.org/officeDocument/2006/customXml" ds:itemID="{E503B719-B9A6-4DC9-AA9D-06F16B758BCB}">
   <ds:schemaRefs>
     <ds:schemaRef ds:uri="http://schemas.microsoft.com/office/2006/metadata/contentType"/>
@@ -14973,4 +17998,12 @@
     <ds:schemaRef ds:uri="http://schemas.microsoft.com/internal/obd"/>
   </ds:schemaRefs>
 </ds:datastoreItem>
+</file>
+
+<file path=customXml/itemProps3.xml><?xml version="1.0" encoding="utf-8"?>
+<ds:datastoreItem xmlns:ds="http://schemas.openxmlformats.org/officeDocument/2006/customXml" ds:itemID="{3E586370-B0FB-4108-8B4F-329716A22E3A}">
+  <ds:schemaRefs>
+    <ds:schemaRef ds:uri="http://schemas.microsoft.com/sharepoint/v3/contenttype/forms"/>
+  </ds:schemaRefs>
+</ds:datastoreItem>
 </file>
</xml_diff>

<commit_message>
added: multi threading for crawling
</commit_message>
<xml_diff>
--- a/docs/find_me.pptx
+++ b/docs/find_me.pptx
@@ -8347,7 +8347,7 @@
           <a:p>
             <a:fld id="{AF869721-F543-4A6C-BF9D-65D7CC540427}" type="datetimeFigureOut">
               <a:rPr lang="en-US" smtClean="0"/>
-              <a:t>7/8/2021</a:t>
+              <a:t>7/14/2021</a:t>
             </a:fld>
             <a:endParaRPr lang="en-US" dirty="0"/>
           </a:p>
@@ -8524,7 +8524,7 @@
           <a:p>
             <a:fld id="{C732326A-4C88-4AFB-AA5B-5919D81DFF5B}" type="datetimeFigureOut">
               <a:rPr lang="en-US" smtClean="0"/>
-              <a:t>7/8/2021</a:t>
+              <a:t>7/14/2021</a:t>
             </a:fld>
             <a:endParaRPr lang="en-US" dirty="0"/>
           </a:p>
@@ -9280,18 +9280,9 @@
           <a:lstStyle/>
           <a:p>
             <a:r>
-              <a:rPr lang="en-US" dirty="0" err="1">
-                <a:hlinkClick r:id="rId3"/>
-              </a:rPr>
-              <a:t>find_me_model.drawio</a:t>
+              <a:rPr lang="en-US" dirty="0"/>
+              <a:t>https://app.diagrams.net/#G17DjBDN78j0e-FsorBzU61J3DlUEmU9Wt</a:t>
             </a:r>
-            <a:r>
-              <a:rPr lang="en-US" dirty="0">
-                <a:hlinkClick r:id="rId3"/>
-              </a:rPr>
-              <a:t> - diagrams.net</a:t>
-            </a:r>
-            <a:endParaRPr lang="en-US" dirty="0"/>
           </a:p>
         </p:txBody>
       </p:sp>
@@ -10129,7 +10120,7 @@
             <a:fld id="{B61BEF0D-F0BB-DE4B-95CE-6DB70DBA9567}" type="datetimeFigureOut">
               <a:rPr lang="en-US" smtClean="0"/>
               <a:pPr/>
-              <a:t>7/8/2021</a:t>
+              <a:t>7/14/2021</a:t>
             </a:fld>
             <a:endParaRPr lang="en-US" dirty="0"/>
           </a:p>
@@ -10393,7 +10384,7 @@
             <a:fld id="{B61BEF0D-F0BB-DE4B-95CE-6DB70DBA9567}" type="datetimeFigureOut">
               <a:rPr lang="en-US" smtClean="0"/>
               <a:pPr/>
-              <a:t>7/8/2021</a:t>
+              <a:t>7/14/2021</a:t>
             </a:fld>
             <a:endParaRPr lang="en-US" dirty="0"/>
           </a:p>
@@ -10630,7 +10621,7 @@
             <a:fld id="{B61BEF0D-F0BB-DE4B-95CE-6DB70DBA9567}" type="datetimeFigureOut">
               <a:rPr lang="en-US" smtClean="0"/>
               <a:pPr/>
-              <a:t>7/8/2021</a:t>
+              <a:t>7/14/2021</a:t>
             </a:fld>
             <a:endParaRPr lang="en-US" dirty="0"/>
           </a:p>
@@ -10872,7 +10863,7 @@
             <a:fld id="{B61BEF0D-F0BB-DE4B-95CE-6DB70DBA9567}" type="datetimeFigureOut">
               <a:rPr lang="en-US" smtClean="0"/>
               <a:pPr/>
-              <a:t>7/8/2021</a:t>
+              <a:t>7/14/2021</a:t>
             </a:fld>
             <a:endParaRPr lang="en-US" dirty="0"/>
           </a:p>
@@ -11181,7 +11172,7 @@
             <a:fld id="{B61BEF0D-F0BB-DE4B-95CE-6DB70DBA9567}" type="datetimeFigureOut">
               <a:rPr lang="en-US" smtClean="0"/>
               <a:pPr/>
-              <a:t>7/8/2021</a:t>
+              <a:t>7/14/2021</a:t>
             </a:fld>
             <a:endParaRPr lang="en-US" dirty="0"/>
           </a:p>
@@ -11485,7 +11476,7 @@
             <a:fld id="{B61BEF0D-F0BB-DE4B-95CE-6DB70DBA9567}" type="datetimeFigureOut">
               <a:rPr lang="en-US" smtClean="0"/>
               <a:pPr/>
-              <a:t>7/8/2021</a:t>
+              <a:t>7/14/2021</a:t>
             </a:fld>
             <a:endParaRPr lang="en-US" dirty="0"/>
           </a:p>
@@ -11909,7 +11900,7 @@
             <a:fld id="{B61BEF0D-F0BB-DE4B-95CE-6DB70DBA9567}" type="datetimeFigureOut">
               <a:rPr lang="en-US" smtClean="0"/>
               <a:pPr/>
-              <a:t>7/8/2021</a:t>
+              <a:t>7/14/2021</a:t>
             </a:fld>
             <a:endParaRPr lang="en-US" dirty="0"/>
           </a:p>
@@ -12006,7 +11997,7 @@
             <a:fld id="{B61BEF0D-F0BB-DE4B-95CE-6DB70DBA9567}" type="datetimeFigureOut">
               <a:rPr lang="en-US" smtClean="0"/>
               <a:pPr/>
-              <a:t>7/8/2021</a:t>
+              <a:t>7/14/2021</a:t>
             </a:fld>
             <a:endParaRPr lang="en-US" dirty="0"/>
           </a:p>
@@ -12170,7 +12161,7 @@
             <a:fld id="{B61BEF0D-F0BB-DE4B-95CE-6DB70DBA9567}" type="datetimeFigureOut">
               <a:rPr lang="en-US" smtClean="0"/>
               <a:pPr/>
-              <a:t>7/8/2021</a:t>
+              <a:t>7/14/2021</a:t>
             </a:fld>
             <a:endParaRPr lang="en-US" dirty="0"/>
           </a:p>
@@ -12550,7 +12541,7 @@
             <a:fld id="{B61BEF0D-F0BB-DE4B-95CE-6DB70DBA9567}" type="datetimeFigureOut">
               <a:rPr lang="en-US" smtClean="0"/>
               <a:pPr/>
-              <a:t>7/8/2021</a:t>
+              <a:t>7/14/2021</a:t>
             </a:fld>
             <a:endParaRPr lang="en-US" dirty="0"/>
           </a:p>
@@ -12841,7 +12832,7 @@
             <a:fld id="{B61BEF0D-F0BB-DE4B-95CE-6DB70DBA9567}" type="datetimeFigureOut">
               <a:rPr lang="en-US" smtClean="0"/>
               <a:pPr/>
-              <a:t>7/8/2021</a:t>
+              <a:t>7/14/2021</a:t>
             </a:fld>
             <a:endParaRPr lang="en-US" dirty="0"/>
           </a:p>
@@ -13054,7 +13045,7 @@
             <a:fld id="{B61BEF0D-F0BB-DE4B-95CE-6DB70DBA9567}" type="datetimeFigureOut">
               <a:rPr lang="en-US" smtClean="0"/>
               <a:pPr/>
-              <a:t>7/8/2021</a:t>
+              <a:t>7/14/2021</a:t>
             </a:fld>
             <a:endParaRPr lang="en-US" dirty="0"/>
           </a:p>
@@ -17577,6 +17568,15 @@
 </file>
 
 <file path=customXml/item1.xml><?xml version="1.0" encoding="utf-8"?>
+<p:properties xmlns:p="http://schemas.microsoft.com/office/2006/metadata/properties" xmlns:xsi="http://www.w3.org/2001/XMLSchema-instance" xmlns:pc="http://schemas.microsoft.com/office/infopath/2007/PartnerControls">
+  <documentManagement>
+    <Status xmlns="71af3243-3dd4-4a8d-8c0d-dd76da1f02a5">Not started</Status>
+    <MediaServiceKeyPoints xmlns="71af3243-3dd4-4a8d-8c0d-dd76da1f02a5" xsi:nil="true"/>
+  </documentManagement>
+</p:properties>
+</file>
+
+<file path=customXml/item2.xml><?xml version="1.0" encoding="utf-8"?>
 <ct:contentTypeSchema xmlns:ct="http://schemas.microsoft.com/office/2006/metadata/contentType" xmlns:ma="http://schemas.microsoft.com/office/2006/metadata/properties/metaAttributes" ct:_="" ma:_="" ma:contentTypeName="Document" ma:contentTypeID="0x01010079F111ED35F8CC479449609E8A0923A6" ma:contentTypeVersion="12" ma:contentTypeDescription="Create a new document." ma:contentTypeScope="" ma:versionID="93813dd7ca6ad654711aa0ab317e03a3">
   <xsd:schema xmlns:xsd="http://www.w3.org/2001/XMLSchema" xmlns:xs="http://www.w3.org/2001/XMLSchema" xmlns:p="http://schemas.microsoft.com/office/2006/metadata/properties" xmlns:ns2="71af3243-3dd4-4a8d-8c0d-dd76da1f02a5" xmlns:ns3="16c05727-aa75-4e4a-9b5f-8a80a1165891" targetNamespace="http://schemas.microsoft.com/office/2006/metadata/properties" ma:root="true" ma:fieldsID="f11dc0ce689dd3925e84e4e35398c6e7" ns2:_="" ns3:_="">
     <xsd:import namespace="71af3243-3dd4-4a8d-8c0d-dd76da1f02a5"/>
@@ -17797,15 +17797,6 @@
 </ct:contentTypeSchema>
 </file>
 
-<file path=customXml/item2.xml><?xml version="1.0" encoding="utf-8"?>
-<p:properties xmlns:p="http://schemas.microsoft.com/office/2006/metadata/properties" xmlns:xsi="http://www.w3.org/2001/XMLSchema-instance" xmlns:pc="http://schemas.microsoft.com/office/infopath/2007/PartnerControls">
-  <documentManagement>
-    <Status xmlns="71af3243-3dd4-4a8d-8c0d-dd76da1f02a5">Not started</Status>
-    <MediaServiceKeyPoints xmlns="71af3243-3dd4-4a8d-8c0d-dd76da1f02a5" xsi:nil="true"/>
-  </documentManagement>
-</p:properties>
-</file>
-
 <file path=customXml/item3.xml><?xml version="1.0" encoding="utf-8"?>
 <?mso-contentType ?>
 <FormTemplates xmlns="http://schemas.microsoft.com/sharepoint/v3/contenttype/forms">
@@ -17816,6 +17807,16 @@
 </file>
 
 <file path=customXml/itemProps1.xml><?xml version="1.0" encoding="utf-8"?>
+<ds:datastoreItem xmlns:ds="http://schemas.openxmlformats.org/officeDocument/2006/customXml" ds:itemID="{55B48092-4A2C-4E16-B971-9ACADFFF69E4}">
+  <ds:schemaRefs>
+    <ds:schemaRef ds:uri="http://schemas.microsoft.com/office/2006/metadata/properties"/>
+    <ds:schemaRef ds:uri="http://schemas.microsoft.com/office/infopath/2007/PartnerControls"/>
+    <ds:schemaRef ds:uri="71af3243-3dd4-4a8d-8c0d-dd76da1f02a5"/>
+  </ds:schemaRefs>
+</ds:datastoreItem>
+</file>
+
+<file path=customXml/itemProps2.xml><?xml version="1.0" encoding="utf-8"?>
 <ds:datastoreItem xmlns:ds="http://schemas.openxmlformats.org/officeDocument/2006/customXml" ds:itemID="{E503B719-B9A6-4DC9-AA9D-06F16B758BCB}">
   <ds:schemaRefs>
     <ds:schemaRef ds:uri="http://schemas.microsoft.com/office/2006/metadata/contentType"/>
@@ -17834,16 +17835,6 @@
 </ds:datastoreItem>
 </file>
 
-<file path=customXml/itemProps2.xml><?xml version="1.0" encoding="utf-8"?>
-<ds:datastoreItem xmlns:ds="http://schemas.openxmlformats.org/officeDocument/2006/customXml" ds:itemID="{55B48092-4A2C-4E16-B971-9ACADFFF69E4}">
-  <ds:schemaRefs>
-    <ds:schemaRef ds:uri="http://schemas.microsoft.com/office/2006/metadata/properties"/>
-    <ds:schemaRef ds:uri="http://schemas.microsoft.com/office/infopath/2007/PartnerControls"/>
-    <ds:schemaRef ds:uri="71af3243-3dd4-4a8d-8c0d-dd76da1f02a5"/>
-  </ds:schemaRefs>
-</ds:datastoreItem>
-</file>
-
 <file path=customXml/itemProps3.xml><?xml version="1.0" encoding="utf-8"?>
 <ds:datastoreItem xmlns:ds="http://schemas.openxmlformats.org/officeDocument/2006/customXml" ds:itemID="{3E586370-B0FB-4108-8B4F-329716A22E3A}">
   <ds:schemaRefs>

</xml_diff>